<commit_message>
Update script and slides a bit
</commit_message>
<xml_diff>
--- a/src/tiPS Welcome.pptx
+++ b/src/tiPS Welcome.pptx
@@ -22,8 +22,8 @@
     <p:sldId id="296" r:id="rId13"/>
     <p:sldId id="298" r:id="rId14"/>
     <p:sldId id="301" r:id="rId15"/>
-    <p:sldId id="302" r:id="rId16"/>
-    <p:sldId id="303" r:id="rId17"/>
+    <p:sldId id="303" r:id="rId16"/>
+    <p:sldId id="302" r:id="rId17"/>
     <p:sldId id="290" r:id="rId18"/>
     <p:sldId id="299" r:id="rId19"/>
     <p:sldId id="293" r:id="rId20"/>
@@ -1655,6 +1655,29 @@
           <a:bodyPr/>
           <a:lstStyle/>
           <a:p>
+            <a:pPr marL="171450" marR="0" lvl="0" indent="-171450" algn="l" defTabSz="914400" rtl="0" eaLnBrk="1" fontAlgn="auto" latinLnBrk="0" hangingPunct="1">
+              <a:lnSpc>
+                <a:spcPct val="100000"/>
+              </a:lnSpc>
+              <a:spcBef>
+                <a:spcPts val="0"/>
+              </a:spcBef>
+              <a:spcAft>
+                <a:spcPts val="0"/>
+              </a:spcAft>
+              <a:buClrTx/>
+              <a:buSzTx/>
+              <a:buFontTx/>
+              <a:buChar char="-"/>
+              <a:tabLst/>
+              <a:defRPr/>
+            </a:pPr>
+            <a:r>
+              <a:rPr lang="en-US" dirty="0"/>
+              <a:t>Wear PowerShell Podcast t-shirt</a:t>
+            </a:r>
+          </a:p>
+          <a:p>
             <a:pPr marL="171450" indent="-171450">
               <a:buFontTx/>
               <a:buChar char="-"/>
@@ -1705,7 +1728,7 @@
             </a:pPr>
             <a:r>
               <a:rPr lang="en-US" dirty="0"/>
-              <a:t>Wear PowerShell Podcast t-shirt</a:t>
+              <a:t>Start recording</a:t>
             </a:r>
           </a:p>
         </p:txBody>
@@ -1970,7 +1993,7 @@
             </a:pPr>
             <a:r>
               <a:rPr lang="en-US" dirty="0"/>
-              <a:t>Caught a Windows PowerShell issue when installing the module with an emoji in the module manifest description</a:t>
+              <a:t>AutomaticModuleUpdateFunctions.Tests.ps1</a:t>
             </a:r>
           </a:p>
           <a:p>
@@ -1980,15 +2003,51 @@
             </a:pPr>
             <a:r>
               <a:rPr lang="en-US" dirty="0"/>
-              <a:t>Caught a cross-platform bug when saving the module settings to the local user’s directory (I think I was using $</a:t>
+              <a:t>Use $</a:t>
             </a:r>
             <a:r>
               <a:rPr lang="en-US" dirty="0" err="1"/>
-              <a:t>Env:AppData</a:t>
+              <a:t>TestDrive</a:t>
             </a:r>
             <a:r>
               <a:rPr lang="en-US" dirty="0"/>
-              <a:t>)</a:t>
+              <a:t> instead of </a:t>
+            </a:r>
+            <a:r>
+              <a:rPr lang="en-US" dirty="0" err="1"/>
+              <a:t>TestDrive</a:t>
+            </a:r>
+            <a:r>
+              <a:rPr lang="en-US" dirty="0"/>
+              <a:t>: so .NET methods can resolve the path</a:t>
+            </a:r>
+          </a:p>
+          <a:p>
+            <a:pPr marL="171450" indent="-171450">
+              <a:buFontTx/>
+              <a:buChar char="-"/>
+            </a:pPr>
+            <a:r>
+              <a:rPr lang="en-US" dirty="0"/>
+              <a:t>We use .NET methods for performance reasons</a:t>
+            </a:r>
+          </a:p>
+          <a:p>
+            <a:pPr marL="171450" indent="-171450">
+              <a:buFontTx/>
+              <a:buChar char="-"/>
+            </a:pPr>
+            <a:r>
+              <a:rPr lang="en-US" dirty="0"/>
+              <a:t>Use </a:t>
+            </a:r>
+            <a:r>
+              <a:rPr lang="en-US" dirty="0" err="1"/>
+              <a:t>InModuleScope</a:t>
+            </a:r>
+            <a:r>
+              <a:rPr lang="en-US" dirty="0"/>
+              <a:t> to be able to access private module functions</a:t>
             </a:r>
           </a:p>
         </p:txBody>
@@ -2011,6 +2070,115 @@
             <a:fld id="{1734D747-9380-41EE-9946-EC9EC0CA5D1E}" type="slidenum">
               <a:rPr lang="en-US" noProof="0" smtClean="0"/>
               <a:t>12</a:t>
+            </a:fld>
+            <a:endParaRPr lang="en-US" noProof="0" dirty="0"/>
+          </a:p>
+        </p:txBody>
+      </p:sp>
+    </p:spTree>
+    <p:extLst>
+      <p:ext uri="{BB962C8B-B14F-4D97-AF65-F5344CB8AC3E}">
+        <p14:creationId xmlns:p14="http://schemas.microsoft.com/office/powerpoint/2010/main" val="3042024888"/>
+      </p:ext>
+    </p:extLst>
+  </p:cSld>
+  <p:clrMapOvr>
+    <a:masterClrMapping/>
+  </p:clrMapOvr>
+</p:notes>
+</file>
+
+<file path=ppt/notesSlides/notesSlide12.xml><?xml version="1.0" encoding="utf-8"?>
+<p:notes xmlns:a="http://schemas.openxmlformats.org/drawingml/2006/main" xmlns:r="http://schemas.openxmlformats.org/officeDocument/2006/relationships" xmlns:p="http://schemas.openxmlformats.org/presentationml/2006/main">
+  <p:cSld>
+    <p:spTree>
+      <p:nvGrpSpPr>
+        <p:cNvPr id="1" name=""/>
+        <p:cNvGrpSpPr/>
+        <p:nvPr/>
+      </p:nvGrpSpPr>
+      <p:grpSpPr>
+        <a:xfrm>
+          <a:off x="0" y="0"/>
+          <a:ext cx="0" cy="0"/>
+          <a:chOff x="0" y="0"/>
+          <a:chExt cx="0" cy="0"/>
+        </a:xfrm>
+      </p:grpSpPr>
+      <p:sp>
+        <p:nvSpPr>
+          <p:cNvPr id="2" name="Slide Image Placeholder 1"/>
+          <p:cNvSpPr>
+            <a:spLocks noGrp="1" noRot="1" noChangeAspect="1"/>
+          </p:cNvSpPr>
+          <p:nvPr>
+            <p:ph type="sldImg"/>
+          </p:nvPr>
+        </p:nvSpPr>
+        <p:spPr/>
+      </p:sp>
+      <p:sp>
+        <p:nvSpPr>
+          <p:cNvPr id="3" name="Notes Placeholder 2"/>
+          <p:cNvSpPr>
+            <a:spLocks noGrp="1"/>
+          </p:cNvSpPr>
+          <p:nvPr>
+            <p:ph type="body" idx="1"/>
+          </p:nvPr>
+        </p:nvSpPr>
+        <p:spPr/>
+        <p:txBody>
+          <a:bodyPr/>
+          <a:lstStyle/>
+          <a:p>
+            <a:pPr marL="171450" indent="-171450">
+              <a:buFontTx/>
+              <a:buChar char="-"/>
+            </a:pPr>
+            <a:r>
+              <a:rPr lang="en-US" dirty="0"/>
+              <a:t>Caught a Windows PowerShell issue when installing the module with an emoji in the module manifest description</a:t>
+            </a:r>
+          </a:p>
+          <a:p>
+            <a:pPr marL="171450" indent="-171450">
+              <a:buFontTx/>
+              <a:buChar char="-"/>
+            </a:pPr>
+            <a:r>
+              <a:rPr lang="en-US" dirty="0"/>
+              <a:t>Caught a cross-platform bug when saving the module settings to the local user’s directory (I think I was using $</a:t>
+            </a:r>
+            <a:r>
+              <a:rPr lang="en-US" dirty="0" err="1"/>
+              <a:t>Env:AppData</a:t>
+            </a:r>
+            <a:r>
+              <a:rPr lang="en-US" dirty="0"/>
+              <a:t>)</a:t>
+            </a:r>
+          </a:p>
+        </p:txBody>
+      </p:sp>
+      <p:sp>
+        <p:nvSpPr>
+          <p:cNvPr id="4" name="Slide Number Placeholder 3"/>
+          <p:cNvSpPr>
+            <a:spLocks noGrp="1"/>
+          </p:cNvSpPr>
+          <p:nvPr>
+            <p:ph type="sldNum" sz="quarter" idx="5"/>
+          </p:nvPr>
+        </p:nvSpPr>
+        <p:spPr/>
+        <p:txBody>
+          <a:bodyPr/>
+          <a:lstStyle/>
+          <a:p>
+            <a:fld id="{1734D747-9380-41EE-9946-EC9EC0CA5D1E}" type="slidenum">
+              <a:rPr lang="en-US" noProof="0" smtClean="0"/>
+              <a:t>13</a:t>
             </a:fld>
             <a:endParaRPr lang="en-US" noProof="0" dirty="0"/>
           </a:p>
@@ -3543,6 +3711,44 @@
               <a:t>Jordan Hammond and Andrew Pla were always talking about the community and giving back, and I was looking for a side project</a:t>
             </a:r>
           </a:p>
+          <a:p>
+            <a:pPr marL="171450" indent="-171450">
+              <a:buFontTx/>
+              <a:buChar char="-"/>
+            </a:pPr>
+            <a:r>
+              <a:rPr lang="en-US" dirty="0"/>
+              <a:t>They also called out people to submit talks for PowerShell Summit</a:t>
+            </a:r>
+          </a:p>
+          <a:p>
+            <a:pPr marL="171450" indent="-171450">
+              <a:buFontTx/>
+              <a:buChar char="-"/>
+            </a:pPr>
+            <a:r>
+              <a:rPr lang="en-US" dirty="0"/>
+              <a:t>Andrew wore the </a:t>
+            </a:r>
+            <a:r>
+              <a:rPr lang="en-US" dirty="0" err="1"/>
+              <a:t>tiPS</a:t>
+            </a:r>
+            <a:r>
+              <a:rPr lang="en-US" dirty="0"/>
+              <a:t> t-shirt on his talk with Justin Grote a couple weeks back</a:t>
+            </a:r>
+          </a:p>
+          <a:p>
+            <a:pPr marL="171450" indent="-171450">
+              <a:buFontTx/>
+              <a:buChar char="-"/>
+            </a:pPr>
+            <a:r>
+              <a:rPr lang="en-US" dirty="0"/>
+              <a:t>James Brundage was just on the PowerShell Podcast as well</a:t>
+            </a:r>
+          </a:p>
         </p:txBody>
       </p:sp>
       <p:sp>
@@ -3928,15 +4134,7 @@
             </a:r>
             <a:r>
               <a:rPr lang="en-US" dirty="0"/>
-              <a:t> Daily -</a:t>
-            </a:r>
-            <a:r>
-              <a:rPr lang="en-US" dirty="0" err="1"/>
-              <a:t>AutomaticallyUpdateModule</a:t>
-            </a:r>
-            <a:r>
-              <a:rPr lang="en-US" dirty="0"/>
-              <a:t> Weekly (show enum autocomplete for free; no </a:t>
+              <a:t> Daily (show enum autocomplete for free; no </a:t>
             </a:r>
             <a:r>
               <a:rPr lang="en-US" dirty="0" err="1"/>
@@ -28817,7 +29015,7 @@
         <p:spPr>
           <a:xfrm>
             <a:off x="2761488" y="3721608"/>
-            <a:ext cx="7941148" cy="868680"/>
+            <a:ext cx="8668512" cy="868680"/>
           </a:xfrm>
         </p:spPr>
         <p:txBody>
@@ -28839,7 +29037,7 @@
             </a:r>
             <a:r>
               <a:rPr lang="en-US" sz="2800" dirty="0"/>
-              <a:t> PowerShell module and lessons learned while developing it</a:t>
+              <a:t> PowerShell module and some lessons learned while developing it</a:t>
             </a:r>
           </a:p>
         </p:txBody>
@@ -29193,6 +29391,12 @@
             <a:endParaRPr lang="en-US" sz="2800" dirty="0"/>
           </a:p>
           <a:p>
+            <a:pPr marL="457200" lvl="1" indent="0">
+              <a:buNone/>
+            </a:pPr>
+            <a:endParaRPr lang="en-US" sz="2800" dirty="0"/>
+          </a:p>
+          <a:p>
             <a:r>
               <a:rPr lang="en-US" sz="2800" dirty="0">
                 <a:solidFill>
@@ -29202,37 +29406,6 @@
                   </a:schemeClr>
                 </a:solidFill>
                 <a:hlinkClick r:id="rId3">
-                  <a:extLst>
-                    <a:ext uri="{A12FA001-AC4F-418D-AE19-62706E023703}">
-                      <ahyp:hlinkClr xmlns:ahyp="http://schemas.microsoft.com/office/drawing/2018/hyperlinkcolor" val="tx"/>
-                    </a:ext>
-                  </a:extLst>
-                </a:hlinkClick>
-              </a:rPr>
-              <a:t>https://github.com/deadlydog/PowerShell.Experiment.ClassPerformanceComparison</a:t>
-            </a:r>
-            <a:r>
-              <a:rPr lang="en-US" sz="2800" dirty="0">
-                <a:solidFill>
-                  <a:schemeClr val="accent1">
-                    <a:lumMod val="60000"/>
-                    <a:lumOff val="40000"/>
-                  </a:schemeClr>
-                </a:solidFill>
-              </a:rPr>
-              <a:t> </a:t>
-            </a:r>
-          </a:p>
-          <a:p>
-            <a:r>
-              <a:rPr lang="en-US" sz="2800" dirty="0">
-                <a:solidFill>
-                  <a:schemeClr val="accent1">
-                    <a:lumMod val="60000"/>
-                    <a:lumOff val="40000"/>
-                  </a:schemeClr>
-                </a:solidFill>
-                <a:hlinkClick r:id="rId4">
                   <a:extLst>
                     <a:ext uri="{A12FA001-AC4F-418D-AE19-62706E023703}">
                       <ahyp:hlinkClr xmlns:ahyp="http://schemas.microsoft.com/office/drawing/2018/hyperlinkcolor" val="tx"/>
@@ -29379,8 +29552,8 @@
         </p:nvSpPr>
         <p:spPr>
           <a:xfrm>
-            <a:off x="444499" y="1625385"/>
-            <a:ext cx="11467867" cy="4689690"/>
+            <a:off x="444499" y="1625384"/>
+            <a:ext cx="11467867" cy="5054815"/>
           </a:xfrm>
         </p:spPr>
         <p:txBody>
@@ -29403,8 +29576,13 @@
             <a:pPr lvl="1"/>
             <a:r>
               <a:rPr lang="en-US" sz="2600" dirty="0"/>
-              <a:t>Avoid reloading VS Code when using Add-Type to import assemblies</a:t>
-            </a:r>
+              <a:t>Avoid reloading VS Code when using Add-Type to import assemblies and working with classes / </a:t>
+            </a:r>
+            <a:r>
+              <a:rPr lang="en-US" sz="2600" dirty="0" err="1"/>
+              <a:t>enums</a:t>
+            </a:r>
+            <a:endParaRPr lang="en-US" sz="2600" dirty="0"/>
           </a:p>
           <a:p>
             <a:endParaRPr lang="en-US" sz="2800" dirty="0"/>
@@ -29534,7 +29712,7 @@
           <a:p>
             <a:r>
               <a:rPr lang="en-US" dirty="0"/>
-              <a:t>Smoke Tests</a:t>
+              <a:t>Pester Tests</a:t>
             </a:r>
           </a:p>
         </p:txBody>
@@ -29567,19 +29745,88 @@
           <a:p>
             <a:r>
               <a:rPr lang="en-US" sz="2800" dirty="0"/>
-              <a:t>Test the real end-user experience</a:t>
-            </a:r>
-          </a:p>
-          <a:p>
+              <a:t>Use $</a:t>
+            </a:r>
+            <a:r>
+              <a:rPr lang="en-US" sz="2800" dirty="0" err="1"/>
+              <a:t>TestDrive</a:t>
+            </a:r>
             <a:r>
               <a:rPr lang="en-US" sz="2800" dirty="0"/>
-              <a:t>Test backward compatibility</a:t>
+              <a:t> to write files to a temp directory</a:t>
+            </a:r>
+          </a:p>
+          <a:p>
+            <a:pPr lvl="1"/>
+            <a:r>
+              <a:rPr lang="en-US" sz="2600" dirty="0" err="1"/>
+              <a:t>TestDrive</a:t>
+            </a:r>
+            <a:r>
+              <a:rPr lang="en-US" sz="2600" dirty="0"/>
+              <a:t>: cannot be resolved in .NET methods</a:t>
+            </a:r>
+          </a:p>
+          <a:p>
+            <a:pPr lvl="1"/>
+            <a:r>
+              <a:rPr lang="en-US" sz="2600" dirty="0"/>
+              <a:t>E.g. use “$</a:t>
+            </a:r>
+            <a:r>
+              <a:rPr lang="en-US" sz="2600" dirty="0" err="1"/>
+              <a:t>TestDrive</a:t>
+            </a:r>
+            <a:r>
+              <a:rPr lang="en-US" sz="2600" dirty="0"/>
+              <a:t>\test.txt” instead of “</a:t>
+            </a:r>
+            <a:r>
+              <a:rPr lang="en-US" sz="2600" dirty="0" err="1"/>
+              <a:t>TestDrive</a:t>
+            </a:r>
+            <a:r>
+              <a:rPr lang="en-US" sz="2600" dirty="0"/>
+              <a:t>:\test.txt”</a:t>
+            </a:r>
+          </a:p>
+          <a:p>
+            <a:pPr lvl="1"/>
+            <a:r>
+              <a:rPr lang="en-US" sz="2600" dirty="0">
+                <a:solidFill>
+                  <a:schemeClr val="accent1">
+                    <a:lumMod val="60000"/>
+                    <a:lumOff val="40000"/>
+                  </a:schemeClr>
+                </a:solidFill>
+                <a:hlinkClick r:id="rId3">
+                  <a:extLst>
+                    <a:ext uri="{A12FA001-AC4F-418D-AE19-62706E023703}">
+                      <ahyp:hlinkClr xmlns:ahyp="http://schemas.microsoft.com/office/drawing/2018/hyperlinkcolor" val="tx"/>
+                    </a:ext>
+                  </a:extLst>
+                </a:hlinkClick>
+              </a:rPr>
+              <a:t>https://pester.dev/docs/usage/testdrive</a:t>
+            </a:r>
+            <a:r>
+              <a:rPr lang="en-US" sz="2600" dirty="0"/>
+              <a:t> </a:t>
             </a:r>
           </a:p>
           <a:p>
             <a:r>
               <a:rPr lang="en-US" sz="2800" dirty="0"/>
-              <a:t>Test cross-platform compatibility</a:t>
+              <a:t>Use </a:t>
+            </a:r>
+            <a:r>
+              <a:rPr lang="en-US" sz="2800" dirty="0" err="1"/>
+              <a:t>InModuleScope</a:t>
+            </a:r>
+            <a:r>
+              <a:rPr lang="en-US" sz="2800" dirty="0"/>
+              <a:t> to access private module functions</a:t>
             </a:r>
           </a:p>
         </p:txBody>
@@ -29617,7 +29864,7 @@
     </p:spTree>
     <p:extLst>
       <p:ext uri="{BB962C8B-B14F-4D97-AF65-F5344CB8AC3E}">
-        <p14:creationId xmlns:p14="http://schemas.microsoft.com/office/powerpoint/2010/main" val="3371413876"/>
+        <p14:creationId xmlns:p14="http://schemas.microsoft.com/office/powerpoint/2010/main" val="289517584"/>
       </p:ext>
     </p:extLst>
   </p:cSld>
@@ -29636,6 +29883,290 @@
       </p:transition>
     </mc:Fallback>
   </mc:AlternateContent>
+  <p:timing>
+    <p:tnLst>
+      <p:par>
+        <p:cTn id="1" dur="indefinite" restart="never" nodeType="tmRoot">
+          <p:childTnLst>
+            <p:seq concurrent="1" nextAc="seek">
+              <p:cTn id="2" dur="indefinite" nodeType="mainSeq">
+                <p:childTnLst>
+                  <p:par>
+                    <p:cTn id="3" fill="hold">
+                      <p:stCondLst>
+                        <p:cond delay="indefinite"/>
+                      </p:stCondLst>
+                      <p:childTnLst>
+                        <p:par>
+                          <p:cTn id="4" fill="hold">
+                            <p:stCondLst>
+                              <p:cond delay="0"/>
+                            </p:stCondLst>
+                            <p:childTnLst>
+                              <p:par>
+                                <p:cTn id="5" presetID="10" presetClass="entr" presetSubtype="0" fill="hold" grpId="0" nodeType="clickEffect">
+                                  <p:stCondLst>
+                                    <p:cond delay="0"/>
+                                  </p:stCondLst>
+                                  <p:childTnLst>
+                                    <p:set>
+                                      <p:cBhvr>
+                                        <p:cTn id="6" dur="1" fill="hold">
+                                          <p:stCondLst>
+                                            <p:cond delay="0"/>
+                                          </p:stCondLst>
+                                        </p:cTn>
+                                        <p:tgtEl>
+                                          <p:spTgt spid="10">
+                                            <p:txEl>
+                                              <p:pRg st="0" end="0"/>
+                                            </p:txEl>
+                                          </p:spTgt>
+                                        </p:tgtEl>
+                                        <p:attrNameLst>
+                                          <p:attrName>style.visibility</p:attrName>
+                                        </p:attrNameLst>
+                                      </p:cBhvr>
+                                      <p:to>
+                                        <p:strVal val="visible"/>
+                                      </p:to>
+                                    </p:set>
+                                    <p:animEffect transition="in" filter="fade">
+                                      <p:cBhvr>
+                                        <p:cTn id="7" dur="500"/>
+                                        <p:tgtEl>
+                                          <p:spTgt spid="10">
+                                            <p:txEl>
+                                              <p:pRg st="0" end="0"/>
+                                            </p:txEl>
+                                          </p:spTgt>
+                                        </p:tgtEl>
+                                      </p:cBhvr>
+                                    </p:animEffect>
+                                  </p:childTnLst>
+                                </p:cTn>
+                              </p:par>
+                              <p:par>
+                                <p:cTn id="8" presetID="10" presetClass="entr" presetSubtype="0" fill="hold" grpId="0" nodeType="withEffect">
+                                  <p:stCondLst>
+                                    <p:cond delay="0"/>
+                                  </p:stCondLst>
+                                  <p:childTnLst>
+                                    <p:set>
+                                      <p:cBhvr>
+                                        <p:cTn id="9" dur="1" fill="hold">
+                                          <p:stCondLst>
+                                            <p:cond delay="0"/>
+                                          </p:stCondLst>
+                                        </p:cTn>
+                                        <p:tgtEl>
+                                          <p:spTgt spid="10">
+                                            <p:txEl>
+                                              <p:pRg st="1" end="1"/>
+                                            </p:txEl>
+                                          </p:spTgt>
+                                        </p:tgtEl>
+                                        <p:attrNameLst>
+                                          <p:attrName>style.visibility</p:attrName>
+                                        </p:attrNameLst>
+                                      </p:cBhvr>
+                                      <p:to>
+                                        <p:strVal val="visible"/>
+                                      </p:to>
+                                    </p:set>
+                                    <p:animEffect transition="in" filter="fade">
+                                      <p:cBhvr>
+                                        <p:cTn id="10" dur="500"/>
+                                        <p:tgtEl>
+                                          <p:spTgt spid="10">
+                                            <p:txEl>
+                                              <p:pRg st="1" end="1"/>
+                                            </p:txEl>
+                                          </p:spTgt>
+                                        </p:tgtEl>
+                                      </p:cBhvr>
+                                    </p:animEffect>
+                                  </p:childTnLst>
+                                </p:cTn>
+                              </p:par>
+                              <p:par>
+                                <p:cTn id="11" presetID="10" presetClass="entr" presetSubtype="0" fill="hold" grpId="0" nodeType="withEffect">
+                                  <p:stCondLst>
+                                    <p:cond delay="0"/>
+                                  </p:stCondLst>
+                                  <p:childTnLst>
+                                    <p:set>
+                                      <p:cBhvr>
+                                        <p:cTn id="12" dur="1" fill="hold">
+                                          <p:stCondLst>
+                                            <p:cond delay="0"/>
+                                          </p:stCondLst>
+                                        </p:cTn>
+                                        <p:tgtEl>
+                                          <p:spTgt spid="10">
+                                            <p:txEl>
+                                              <p:pRg st="2" end="2"/>
+                                            </p:txEl>
+                                          </p:spTgt>
+                                        </p:tgtEl>
+                                        <p:attrNameLst>
+                                          <p:attrName>style.visibility</p:attrName>
+                                        </p:attrNameLst>
+                                      </p:cBhvr>
+                                      <p:to>
+                                        <p:strVal val="visible"/>
+                                      </p:to>
+                                    </p:set>
+                                    <p:animEffect transition="in" filter="fade">
+                                      <p:cBhvr>
+                                        <p:cTn id="13" dur="500"/>
+                                        <p:tgtEl>
+                                          <p:spTgt spid="10">
+                                            <p:txEl>
+                                              <p:pRg st="2" end="2"/>
+                                            </p:txEl>
+                                          </p:spTgt>
+                                        </p:tgtEl>
+                                      </p:cBhvr>
+                                    </p:animEffect>
+                                  </p:childTnLst>
+                                </p:cTn>
+                              </p:par>
+                              <p:par>
+                                <p:cTn id="14" presetID="10" presetClass="entr" presetSubtype="0" fill="hold" grpId="0" nodeType="withEffect">
+                                  <p:stCondLst>
+                                    <p:cond delay="0"/>
+                                  </p:stCondLst>
+                                  <p:childTnLst>
+                                    <p:set>
+                                      <p:cBhvr>
+                                        <p:cTn id="15" dur="1" fill="hold">
+                                          <p:stCondLst>
+                                            <p:cond delay="0"/>
+                                          </p:stCondLst>
+                                        </p:cTn>
+                                        <p:tgtEl>
+                                          <p:spTgt spid="10">
+                                            <p:txEl>
+                                              <p:pRg st="3" end="3"/>
+                                            </p:txEl>
+                                          </p:spTgt>
+                                        </p:tgtEl>
+                                        <p:attrNameLst>
+                                          <p:attrName>style.visibility</p:attrName>
+                                        </p:attrNameLst>
+                                      </p:cBhvr>
+                                      <p:to>
+                                        <p:strVal val="visible"/>
+                                      </p:to>
+                                    </p:set>
+                                    <p:animEffect transition="in" filter="fade">
+                                      <p:cBhvr>
+                                        <p:cTn id="16" dur="500"/>
+                                        <p:tgtEl>
+                                          <p:spTgt spid="10">
+                                            <p:txEl>
+                                              <p:pRg st="3" end="3"/>
+                                            </p:txEl>
+                                          </p:spTgt>
+                                        </p:tgtEl>
+                                      </p:cBhvr>
+                                    </p:animEffect>
+                                  </p:childTnLst>
+                                </p:cTn>
+                              </p:par>
+                            </p:childTnLst>
+                          </p:cTn>
+                        </p:par>
+                      </p:childTnLst>
+                    </p:cTn>
+                  </p:par>
+                  <p:par>
+                    <p:cTn id="17" fill="hold">
+                      <p:stCondLst>
+                        <p:cond delay="indefinite"/>
+                      </p:stCondLst>
+                      <p:childTnLst>
+                        <p:par>
+                          <p:cTn id="18" fill="hold">
+                            <p:stCondLst>
+                              <p:cond delay="0"/>
+                            </p:stCondLst>
+                            <p:childTnLst>
+                              <p:par>
+                                <p:cTn id="19" presetID="10" presetClass="entr" presetSubtype="0" fill="hold" grpId="0" nodeType="clickEffect">
+                                  <p:stCondLst>
+                                    <p:cond delay="0"/>
+                                  </p:stCondLst>
+                                  <p:childTnLst>
+                                    <p:set>
+                                      <p:cBhvr>
+                                        <p:cTn id="20" dur="1" fill="hold">
+                                          <p:stCondLst>
+                                            <p:cond delay="0"/>
+                                          </p:stCondLst>
+                                        </p:cTn>
+                                        <p:tgtEl>
+                                          <p:spTgt spid="10">
+                                            <p:txEl>
+                                              <p:pRg st="4" end="4"/>
+                                            </p:txEl>
+                                          </p:spTgt>
+                                        </p:tgtEl>
+                                        <p:attrNameLst>
+                                          <p:attrName>style.visibility</p:attrName>
+                                        </p:attrNameLst>
+                                      </p:cBhvr>
+                                      <p:to>
+                                        <p:strVal val="visible"/>
+                                      </p:to>
+                                    </p:set>
+                                    <p:animEffect transition="in" filter="fade">
+                                      <p:cBhvr>
+                                        <p:cTn id="21" dur="500"/>
+                                        <p:tgtEl>
+                                          <p:spTgt spid="10">
+                                            <p:txEl>
+                                              <p:pRg st="4" end="4"/>
+                                            </p:txEl>
+                                          </p:spTgt>
+                                        </p:tgtEl>
+                                      </p:cBhvr>
+                                    </p:animEffect>
+                                  </p:childTnLst>
+                                </p:cTn>
+                              </p:par>
+                            </p:childTnLst>
+                          </p:cTn>
+                        </p:par>
+                      </p:childTnLst>
+                    </p:cTn>
+                  </p:par>
+                </p:childTnLst>
+              </p:cTn>
+              <p:prevCondLst>
+                <p:cond evt="onPrev" delay="0">
+                  <p:tgtEl>
+                    <p:sldTgt/>
+                  </p:tgtEl>
+                </p:cond>
+              </p:prevCondLst>
+              <p:nextCondLst>
+                <p:cond evt="onNext" delay="0">
+                  <p:tgtEl>
+                    <p:sldTgt/>
+                  </p:tgtEl>
+                </p:cond>
+              </p:nextCondLst>
+            </p:seq>
+          </p:childTnLst>
+        </p:cTn>
+      </p:par>
+    </p:tnLst>
+    <p:bldLst>
+      <p:bldP spid="10" grpId="0" build="p"/>
+    </p:bldLst>
+  </p:timing>
 </p:sld>
 </file>
 
@@ -29679,7 +30210,7 @@
           <a:p>
             <a:r>
               <a:rPr lang="en-US" dirty="0"/>
-              <a:t>Pester Tests</a:t>
+              <a:t>Smoke Tests</a:t>
             </a:r>
           </a:p>
         </p:txBody>
@@ -29712,15 +30243,28 @@
           <a:p>
             <a:r>
               <a:rPr lang="en-US" sz="2800" dirty="0"/>
-              <a:t>Use $</a:t>
-            </a:r>
-            <a:r>
-              <a:rPr lang="en-US" sz="2800" dirty="0" err="1"/>
-              <a:t>PSDrive</a:t>
-            </a:r>
+              <a:t>Tests the module/app after it has been deployed to ensure it works correctly</a:t>
+            </a:r>
+          </a:p>
+          <a:p>
+            <a:endParaRPr lang="en-US" sz="2800" dirty="0"/>
+          </a:p>
+          <a:p>
             <a:r>
               <a:rPr lang="en-US" sz="2800" dirty="0"/>
-              <a:t> to write files to a temp directory</a:t>
+              <a:t>Test the real end-user experience</a:t>
+            </a:r>
+          </a:p>
+          <a:p>
+            <a:r>
+              <a:rPr lang="en-US" sz="2800" dirty="0"/>
+              <a:t>Test backward compatibility</a:t>
+            </a:r>
+          </a:p>
+          <a:p>
+            <a:r>
+              <a:rPr lang="en-US" sz="2800" dirty="0"/>
+              <a:t>Test cross-platform compatibility</a:t>
             </a:r>
           </a:p>
         </p:txBody>
@@ -29758,7 +30302,7 @@
     </p:spTree>
     <p:extLst>
       <p:ext uri="{BB962C8B-B14F-4D97-AF65-F5344CB8AC3E}">
-        <p14:creationId xmlns:p14="http://schemas.microsoft.com/office/powerpoint/2010/main" val="289517584"/>
+        <p14:creationId xmlns:p14="http://schemas.microsoft.com/office/powerpoint/2010/main" val="3371413876"/>
       </p:ext>
     </p:extLst>
   </p:cSld>
@@ -36788,7 +37332,7 @@
                             </p:stCondLst>
                             <p:childTnLst>
                               <p:par>
-                                <p:cTn id="10" presetID="10" presetClass="entr" presetSubtype="0" fill="hold" nodeType="clickEffect">
+                                <p:cTn id="10" presetID="10" presetClass="entr" presetSubtype="0" fill="hold" grpId="0" nodeType="clickEffect">
                                   <p:stCondLst>
                                     <p:cond delay="0"/>
                                   </p:stCondLst>
@@ -36801,7 +37345,11 @@
                                           </p:stCondLst>
                                         </p:cTn>
                                         <p:tgtEl>
-                                          <p:spTgt spid="5"/>
+                                          <p:spTgt spid="10">
+                                            <p:txEl>
+                                              <p:pRg st="0" end="0"/>
+                                            </p:txEl>
+                                          </p:spTgt>
                                         </p:tgtEl>
                                         <p:attrNameLst>
                                           <p:attrName>style.visibility</p:attrName>
@@ -36815,7 +37363,11 @@
                                       <p:cBhvr>
                                         <p:cTn id="12" dur="500"/>
                                         <p:tgtEl>
-                                          <p:spTgt spid="5"/>
+                                          <p:spTgt spid="10">
+                                            <p:txEl>
+                                              <p:pRg st="0" end="0"/>
+                                            </p:txEl>
+                                          </p:spTgt>
                                         </p:tgtEl>
                                       </p:cBhvr>
                                     </p:animEffect>
@@ -36854,7 +37406,7 @@
                                           </p:stCondLst>
                                         </p:cTn>
                                         <p:tgtEl>
-                                          <p:spTgt spid="4"/>
+                                          <p:spTgt spid="5"/>
                                         </p:tgtEl>
                                         <p:attrNameLst>
                                           <p:attrName>style.visibility</p:attrName>
@@ -36868,7 +37420,121 @@
                                       <p:cBhvr>
                                         <p:cTn id="17" dur="500"/>
                                         <p:tgtEl>
+                                          <p:spTgt spid="5"/>
+                                        </p:tgtEl>
+                                      </p:cBhvr>
+                                    </p:animEffect>
+                                  </p:childTnLst>
+                                </p:cTn>
+                              </p:par>
+                            </p:childTnLst>
+                          </p:cTn>
+                        </p:par>
+                      </p:childTnLst>
+                    </p:cTn>
+                  </p:par>
+                  <p:par>
+                    <p:cTn id="18" fill="hold">
+                      <p:stCondLst>
+                        <p:cond delay="indefinite"/>
+                      </p:stCondLst>
+                      <p:childTnLst>
+                        <p:par>
+                          <p:cTn id="19" fill="hold">
+                            <p:stCondLst>
+                              <p:cond delay="0"/>
+                            </p:stCondLst>
+                            <p:childTnLst>
+                              <p:par>
+                                <p:cTn id="20" presetID="10" presetClass="entr" presetSubtype="0" fill="hold" nodeType="clickEffect">
+                                  <p:stCondLst>
+                                    <p:cond delay="0"/>
+                                  </p:stCondLst>
+                                  <p:childTnLst>
+                                    <p:set>
+                                      <p:cBhvr>
+                                        <p:cTn id="21" dur="1" fill="hold">
+                                          <p:stCondLst>
+                                            <p:cond delay="0"/>
+                                          </p:stCondLst>
+                                        </p:cTn>
+                                        <p:tgtEl>
                                           <p:spTgt spid="4"/>
+                                        </p:tgtEl>
+                                        <p:attrNameLst>
+                                          <p:attrName>style.visibility</p:attrName>
+                                        </p:attrNameLst>
+                                      </p:cBhvr>
+                                      <p:to>
+                                        <p:strVal val="visible"/>
+                                      </p:to>
+                                    </p:set>
+                                    <p:animEffect transition="in" filter="fade">
+                                      <p:cBhvr>
+                                        <p:cTn id="22" dur="500"/>
+                                        <p:tgtEl>
+                                          <p:spTgt spid="4"/>
+                                        </p:tgtEl>
+                                      </p:cBhvr>
+                                    </p:animEffect>
+                                  </p:childTnLst>
+                                </p:cTn>
+                              </p:par>
+                            </p:childTnLst>
+                          </p:cTn>
+                        </p:par>
+                      </p:childTnLst>
+                    </p:cTn>
+                  </p:par>
+                  <p:par>
+                    <p:cTn id="23" fill="hold">
+                      <p:stCondLst>
+                        <p:cond delay="indefinite"/>
+                      </p:stCondLst>
+                      <p:childTnLst>
+                        <p:par>
+                          <p:cTn id="24" fill="hold">
+                            <p:stCondLst>
+                              <p:cond delay="0"/>
+                            </p:stCondLst>
+                            <p:childTnLst>
+                              <p:par>
+                                <p:cTn id="25" presetID="10" presetClass="entr" presetSubtype="0" fill="hold" grpId="0" nodeType="clickEffect">
+                                  <p:stCondLst>
+                                    <p:cond delay="0"/>
+                                  </p:stCondLst>
+                                  <p:childTnLst>
+                                    <p:set>
+                                      <p:cBhvr>
+                                        <p:cTn id="26" dur="1" fill="hold">
+                                          <p:stCondLst>
+                                            <p:cond delay="0"/>
+                                          </p:stCondLst>
+                                        </p:cTn>
+                                        <p:tgtEl>
+                                          <p:spTgt spid="10">
+                                            <p:txEl>
+                                              <p:pRg st="1" end="1"/>
+                                            </p:txEl>
+                                          </p:spTgt>
+                                        </p:tgtEl>
+                                        <p:attrNameLst>
+                                          <p:attrName>style.visibility</p:attrName>
+                                        </p:attrNameLst>
+                                      </p:cBhvr>
+                                      <p:to>
+                                        <p:strVal val="visible"/>
+                                      </p:to>
+                                    </p:set>
+                                    <p:animEffect transition="in" filter="fade">
+                                      <p:cBhvr>
+                                        <p:cTn id="27" dur="500"/>
+                                        <p:tgtEl>
+                                          <p:spTgt spid="10">
+                                            <p:txEl>
+                                              <p:pRg st="1" end="1"/>
+                                            </p:txEl>
+                                          </p:spTgt>
                                         </p:tgtEl>
                                       </p:cBhvr>
                                     </p:animEffect>
@@ -36902,6 +37568,9 @@
         </p:cTn>
       </p:par>
     </p:tnLst>
+    <p:bldLst>
+      <p:bldP spid="10" grpId="0" uiExpand="1" build="p"/>
+    </p:bldLst>
   </p:timing>
 </p:sld>
 </file>
@@ -36986,6 +37655,61 @@
               <a:t>Architecture Decision Records (ADRs)</a:t>
             </a:r>
           </a:p>
+          <a:p>
+            <a:endParaRPr lang="en-US" sz="2800" dirty="0"/>
+          </a:p>
+          <a:p>
+            <a:r>
+              <a:rPr lang="en-US" sz="2800" dirty="0"/>
+              <a:t>Written in PowerShell instead of C# for community support</a:t>
+            </a:r>
+          </a:p>
+          <a:p>
+            <a:r>
+              <a:rPr lang="en-US" sz="2800" dirty="0"/>
+              <a:t>Combine files into a single .psm1 file during build for performance</a:t>
+            </a:r>
+          </a:p>
+          <a:p>
+            <a:r>
+              <a:rPr lang="en-US" sz="2800" dirty="0"/>
+              <a:t>Compile classes to C# assembly for performance</a:t>
+            </a:r>
+          </a:p>
+          <a:p>
+            <a:endParaRPr lang="en-US" sz="2800" dirty="0"/>
+          </a:p>
+          <a:p>
+            <a:r>
+              <a:rPr lang="en-US" sz="2800" dirty="0">
+                <a:solidFill>
+                  <a:schemeClr val="accent1">
+                    <a:lumMod val="60000"/>
+                    <a:lumOff val="40000"/>
+                  </a:schemeClr>
+                </a:solidFill>
+                <a:hlinkClick r:id="rId3">
+                  <a:extLst>
+                    <a:ext uri="{A12FA001-AC4F-418D-AE19-62706E023703}">
+                      <ahyp:hlinkClr xmlns:ahyp="http://schemas.microsoft.com/office/drawing/2018/hyperlinkcolor" val="tx"/>
+                    </a:ext>
+                  </a:extLst>
+                </a:hlinkClick>
+              </a:rPr>
+              <a:t>https://github.com/deadlydog/PowerShell.Experiment.ClassPerformanceComparison</a:t>
+            </a:r>
+            <a:r>
+              <a:rPr lang="en-US" sz="2800" dirty="0">
+                <a:solidFill>
+                  <a:schemeClr val="accent1">
+                    <a:lumMod val="60000"/>
+                    <a:lumOff val="40000"/>
+                  </a:schemeClr>
+                </a:solidFill>
+              </a:rPr>
+              <a:t> </a:t>
+            </a:r>
+          </a:p>
         </p:txBody>
       </p:sp>
       <p:sp>
@@ -37040,6 +37764,290 @@
       </p:transition>
     </mc:Fallback>
   </mc:AlternateContent>
+  <p:timing>
+    <p:tnLst>
+      <p:par>
+        <p:cTn id="1" dur="indefinite" restart="never" nodeType="tmRoot">
+          <p:childTnLst>
+            <p:seq concurrent="1" nextAc="seek">
+              <p:cTn id="2" dur="indefinite" nodeType="mainSeq">
+                <p:childTnLst>
+                  <p:par>
+                    <p:cTn id="3" fill="hold">
+                      <p:stCondLst>
+                        <p:cond delay="indefinite"/>
+                      </p:stCondLst>
+                      <p:childTnLst>
+                        <p:par>
+                          <p:cTn id="4" fill="hold">
+                            <p:stCondLst>
+                              <p:cond delay="0"/>
+                            </p:stCondLst>
+                            <p:childTnLst>
+                              <p:par>
+                                <p:cTn id="5" presetID="10" presetClass="entr" presetSubtype="0" fill="hold" grpId="0" nodeType="clickEffect">
+                                  <p:stCondLst>
+                                    <p:cond delay="0"/>
+                                  </p:stCondLst>
+                                  <p:childTnLst>
+                                    <p:set>
+                                      <p:cBhvr>
+                                        <p:cTn id="6" dur="1" fill="hold">
+                                          <p:stCondLst>
+                                            <p:cond delay="0"/>
+                                          </p:stCondLst>
+                                        </p:cTn>
+                                        <p:tgtEl>
+                                          <p:spTgt spid="10">
+                                            <p:txEl>
+                                              <p:pRg st="0" end="0"/>
+                                            </p:txEl>
+                                          </p:spTgt>
+                                        </p:tgtEl>
+                                        <p:attrNameLst>
+                                          <p:attrName>style.visibility</p:attrName>
+                                        </p:attrNameLst>
+                                      </p:cBhvr>
+                                      <p:to>
+                                        <p:strVal val="visible"/>
+                                      </p:to>
+                                    </p:set>
+                                    <p:animEffect transition="in" filter="fade">
+                                      <p:cBhvr>
+                                        <p:cTn id="7" dur="500"/>
+                                        <p:tgtEl>
+                                          <p:spTgt spid="10">
+                                            <p:txEl>
+                                              <p:pRg st="0" end="0"/>
+                                            </p:txEl>
+                                          </p:spTgt>
+                                        </p:tgtEl>
+                                      </p:cBhvr>
+                                    </p:animEffect>
+                                  </p:childTnLst>
+                                </p:cTn>
+                              </p:par>
+                            </p:childTnLst>
+                          </p:cTn>
+                        </p:par>
+                      </p:childTnLst>
+                    </p:cTn>
+                  </p:par>
+                  <p:par>
+                    <p:cTn id="8" fill="hold">
+                      <p:stCondLst>
+                        <p:cond delay="indefinite"/>
+                      </p:stCondLst>
+                      <p:childTnLst>
+                        <p:par>
+                          <p:cTn id="9" fill="hold">
+                            <p:stCondLst>
+                              <p:cond delay="0"/>
+                            </p:stCondLst>
+                            <p:childTnLst>
+                              <p:par>
+                                <p:cTn id="10" presetID="10" presetClass="entr" presetSubtype="0" fill="hold" grpId="0" nodeType="clickEffect">
+                                  <p:stCondLst>
+                                    <p:cond delay="0"/>
+                                  </p:stCondLst>
+                                  <p:childTnLst>
+                                    <p:set>
+                                      <p:cBhvr>
+                                        <p:cTn id="11" dur="1" fill="hold">
+                                          <p:stCondLst>
+                                            <p:cond delay="0"/>
+                                          </p:stCondLst>
+                                        </p:cTn>
+                                        <p:tgtEl>
+                                          <p:spTgt spid="10">
+                                            <p:txEl>
+                                              <p:pRg st="2" end="2"/>
+                                            </p:txEl>
+                                          </p:spTgt>
+                                        </p:tgtEl>
+                                        <p:attrNameLst>
+                                          <p:attrName>style.visibility</p:attrName>
+                                        </p:attrNameLst>
+                                      </p:cBhvr>
+                                      <p:to>
+                                        <p:strVal val="visible"/>
+                                      </p:to>
+                                    </p:set>
+                                    <p:animEffect transition="in" filter="fade">
+                                      <p:cBhvr>
+                                        <p:cTn id="12" dur="500"/>
+                                        <p:tgtEl>
+                                          <p:spTgt spid="10">
+                                            <p:txEl>
+                                              <p:pRg st="2" end="2"/>
+                                            </p:txEl>
+                                          </p:spTgt>
+                                        </p:tgtEl>
+                                      </p:cBhvr>
+                                    </p:animEffect>
+                                  </p:childTnLst>
+                                </p:cTn>
+                              </p:par>
+                              <p:par>
+                                <p:cTn id="13" presetID="10" presetClass="entr" presetSubtype="0" fill="hold" grpId="0" nodeType="withEffect">
+                                  <p:stCondLst>
+                                    <p:cond delay="0"/>
+                                  </p:stCondLst>
+                                  <p:childTnLst>
+                                    <p:set>
+                                      <p:cBhvr>
+                                        <p:cTn id="14" dur="1" fill="hold">
+                                          <p:stCondLst>
+                                            <p:cond delay="0"/>
+                                          </p:stCondLst>
+                                        </p:cTn>
+                                        <p:tgtEl>
+                                          <p:spTgt spid="10">
+                                            <p:txEl>
+                                              <p:pRg st="3" end="3"/>
+                                            </p:txEl>
+                                          </p:spTgt>
+                                        </p:tgtEl>
+                                        <p:attrNameLst>
+                                          <p:attrName>style.visibility</p:attrName>
+                                        </p:attrNameLst>
+                                      </p:cBhvr>
+                                      <p:to>
+                                        <p:strVal val="visible"/>
+                                      </p:to>
+                                    </p:set>
+                                    <p:animEffect transition="in" filter="fade">
+                                      <p:cBhvr>
+                                        <p:cTn id="15" dur="500"/>
+                                        <p:tgtEl>
+                                          <p:spTgt spid="10">
+                                            <p:txEl>
+                                              <p:pRg st="3" end="3"/>
+                                            </p:txEl>
+                                          </p:spTgt>
+                                        </p:tgtEl>
+                                      </p:cBhvr>
+                                    </p:animEffect>
+                                  </p:childTnLst>
+                                </p:cTn>
+                              </p:par>
+                              <p:par>
+                                <p:cTn id="16" presetID="10" presetClass="entr" presetSubtype="0" fill="hold" grpId="0" nodeType="withEffect">
+                                  <p:stCondLst>
+                                    <p:cond delay="0"/>
+                                  </p:stCondLst>
+                                  <p:childTnLst>
+                                    <p:set>
+                                      <p:cBhvr>
+                                        <p:cTn id="17" dur="1" fill="hold">
+                                          <p:stCondLst>
+                                            <p:cond delay="0"/>
+                                          </p:stCondLst>
+                                        </p:cTn>
+                                        <p:tgtEl>
+                                          <p:spTgt spid="10">
+                                            <p:txEl>
+                                              <p:pRg st="4" end="4"/>
+                                            </p:txEl>
+                                          </p:spTgt>
+                                        </p:tgtEl>
+                                        <p:attrNameLst>
+                                          <p:attrName>style.visibility</p:attrName>
+                                        </p:attrNameLst>
+                                      </p:cBhvr>
+                                      <p:to>
+                                        <p:strVal val="visible"/>
+                                      </p:to>
+                                    </p:set>
+                                    <p:animEffect transition="in" filter="fade">
+                                      <p:cBhvr>
+                                        <p:cTn id="18" dur="500"/>
+                                        <p:tgtEl>
+                                          <p:spTgt spid="10">
+                                            <p:txEl>
+                                              <p:pRg st="4" end="4"/>
+                                            </p:txEl>
+                                          </p:spTgt>
+                                        </p:tgtEl>
+                                      </p:cBhvr>
+                                    </p:animEffect>
+                                  </p:childTnLst>
+                                </p:cTn>
+                              </p:par>
+                              <p:par>
+                                <p:cTn id="19" presetID="10" presetClass="entr" presetSubtype="0" fill="hold" grpId="0" nodeType="withEffect">
+                                  <p:stCondLst>
+                                    <p:cond delay="0"/>
+                                  </p:stCondLst>
+                                  <p:childTnLst>
+                                    <p:set>
+                                      <p:cBhvr>
+                                        <p:cTn id="20" dur="1" fill="hold">
+                                          <p:stCondLst>
+                                            <p:cond delay="0"/>
+                                          </p:stCondLst>
+                                        </p:cTn>
+                                        <p:tgtEl>
+                                          <p:spTgt spid="10">
+                                            <p:txEl>
+                                              <p:pRg st="6" end="6"/>
+                                            </p:txEl>
+                                          </p:spTgt>
+                                        </p:tgtEl>
+                                        <p:attrNameLst>
+                                          <p:attrName>style.visibility</p:attrName>
+                                        </p:attrNameLst>
+                                      </p:cBhvr>
+                                      <p:to>
+                                        <p:strVal val="visible"/>
+                                      </p:to>
+                                    </p:set>
+                                    <p:animEffect transition="in" filter="fade">
+                                      <p:cBhvr>
+                                        <p:cTn id="21" dur="500"/>
+                                        <p:tgtEl>
+                                          <p:spTgt spid="10">
+                                            <p:txEl>
+                                              <p:pRg st="6" end="6"/>
+                                            </p:txEl>
+                                          </p:spTgt>
+                                        </p:tgtEl>
+                                      </p:cBhvr>
+                                    </p:animEffect>
+                                  </p:childTnLst>
+                                </p:cTn>
+                              </p:par>
+                            </p:childTnLst>
+                          </p:cTn>
+                        </p:par>
+                      </p:childTnLst>
+                    </p:cTn>
+                  </p:par>
+                </p:childTnLst>
+              </p:cTn>
+              <p:prevCondLst>
+                <p:cond evt="onPrev" delay="0">
+                  <p:tgtEl>
+                    <p:sldTgt/>
+                  </p:tgtEl>
+                </p:cond>
+              </p:prevCondLst>
+              <p:nextCondLst>
+                <p:cond evt="onNext" delay="0">
+                  <p:tgtEl>
+                    <p:sldTgt/>
+                  </p:tgtEl>
+                </p:cond>
+              </p:nextCondLst>
+            </p:seq>
+          </p:childTnLst>
+        </p:cTn>
+      </p:par>
+    </p:tnLst>
+    <p:bldLst>
+      <p:bldP spid="10" grpId="0" uiExpand="1" build="p"/>
+    </p:bldLst>
+  </p:timing>
 </p:sld>
 </file>
 

</xml_diff>

<commit_message>
Update example script and PowerPoint a bit
</commit_message>
<xml_diff>
--- a/src/tiPS Welcome.pptx
+++ b/src/tiPS Welcome.pptx
@@ -5,10 +5,10 @@
     <p:sldMasterId id="2147483648" r:id="rId4"/>
   </p:sldMasterIdLst>
   <p:notesMasterIdLst>
-    <p:notesMasterId r:id="rId36"/>
+    <p:notesMasterId r:id="rId37"/>
   </p:notesMasterIdLst>
   <p:handoutMasterIdLst>
-    <p:handoutMasterId r:id="rId37"/>
+    <p:handoutMasterId r:id="rId38"/>
   </p:handoutMasterIdLst>
   <p:sldIdLst>
     <p:sldId id="256" r:id="rId5"/>
@@ -18,30 +18,31 @@
     <p:sldId id="287" r:id="rId9"/>
     <p:sldId id="294" r:id="rId10"/>
     <p:sldId id="300" r:id="rId11"/>
-    <p:sldId id="295" r:id="rId12"/>
-    <p:sldId id="296" r:id="rId13"/>
-    <p:sldId id="298" r:id="rId14"/>
-    <p:sldId id="301" r:id="rId15"/>
-    <p:sldId id="303" r:id="rId16"/>
-    <p:sldId id="302" r:id="rId17"/>
-    <p:sldId id="290" r:id="rId18"/>
-    <p:sldId id="299" r:id="rId19"/>
-    <p:sldId id="293" r:id="rId20"/>
-    <p:sldId id="291" r:id="rId21"/>
-    <p:sldId id="292" r:id="rId22"/>
-    <p:sldId id="257" r:id="rId23"/>
-    <p:sldId id="260" r:id="rId24"/>
-    <p:sldId id="288" r:id="rId25"/>
-    <p:sldId id="261" r:id="rId26"/>
-    <p:sldId id="262" r:id="rId27"/>
-    <p:sldId id="283" r:id="rId28"/>
-    <p:sldId id="264" r:id="rId29"/>
-    <p:sldId id="266" r:id="rId30"/>
-    <p:sldId id="284" r:id="rId31"/>
-    <p:sldId id="267" r:id="rId32"/>
-    <p:sldId id="269" r:id="rId33"/>
-    <p:sldId id="268" r:id="rId34"/>
-    <p:sldId id="285" r:id="rId35"/>
+    <p:sldId id="304" r:id="rId12"/>
+    <p:sldId id="295" r:id="rId13"/>
+    <p:sldId id="296" r:id="rId14"/>
+    <p:sldId id="298" r:id="rId15"/>
+    <p:sldId id="301" r:id="rId16"/>
+    <p:sldId id="303" r:id="rId17"/>
+    <p:sldId id="302" r:id="rId18"/>
+    <p:sldId id="305" r:id="rId19"/>
+    <p:sldId id="299" r:id="rId20"/>
+    <p:sldId id="293" r:id="rId21"/>
+    <p:sldId id="291" r:id="rId22"/>
+    <p:sldId id="292" r:id="rId23"/>
+    <p:sldId id="257" r:id="rId24"/>
+    <p:sldId id="260" r:id="rId25"/>
+    <p:sldId id="288" r:id="rId26"/>
+    <p:sldId id="261" r:id="rId27"/>
+    <p:sldId id="262" r:id="rId28"/>
+    <p:sldId id="283" r:id="rId29"/>
+    <p:sldId id="264" r:id="rId30"/>
+    <p:sldId id="266" r:id="rId31"/>
+    <p:sldId id="284" r:id="rId32"/>
+    <p:sldId id="267" r:id="rId33"/>
+    <p:sldId id="269" r:id="rId34"/>
+    <p:sldId id="268" r:id="rId35"/>
+    <p:sldId id="285" r:id="rId36"/>
   </p:sldIdLst>
   <p:sldSz cx="12192000" cy="6858000"/>
   <p:notesSz cx="6858000" cy="9144000"/>
@@ -1924,7 +1925,7 @@
           <a:p>
             <a:fld id="{1734D747-9380-41EE-9946-EC9EC0CA5D1E}" type="slidenum">
               <a:rPr lang="en-US" noProof="0" smtClean="0"/>
-              <a:t>11</a:t>
+              <a:t>12</a:t>
             </a:fld>
             <a:endParaRPr lang="en-US" noProof="0" dirty="0"/>
           </a:p>
@@ -2069,7 +2070,7 @@
           <a:p>
             <a:fld id="{1734D747-9380-41EE-9946-EC9EC0CA5D1E}" type="slidenum">
               <a:rPr lang="en-US" noProof="0" smtClean="0"/>
-              <a:t>12</a:t>
+              <a:t>13</a:t>
             </a:fld>
             <a:endParaRPr lang="en-US" noProof="0" dirty="0"/>
           </a:p>
@@ -2138,6 +2139,16 @@
             </a:pPr>
             <a:r>
               <a:rPr lang="en-US" dirty="0"/>
+              <a:t>Show pipeline for PR we merged in earlier</a:t>
+            </a:r>
+          </a:p>
+          <a:p>
+            <a:pPr marL="171450" indent="-171450">
+              <a:buFontTx/>
+              <a:buChar char="-"/>
+            </a:pPr>
+            <a:r>
+              <a:rPr lang="en-US" dirty="0"/>
               <a:t>Caught a Windows PowerShell issue when installing the module with an emoji in the module manifest description</a:t>
             </a:r>
           </a:p>
@@ -2178,7 +2189,7 @@
           <a:p>
             <a:fld id="{1734D747-9380-41EE-9946-EC9EC0CA5D1E}" type="slidenum">
               <a:rPr lang="en-US" noProof="0" smtClean="0"/>
-              <a:t>13</a:t>
+              <a:t>14</a:t>
             </a:fld>
             <a:endParaRPr lang="en-US" noProof="0" dirty="0"/>
           </a:p>
@@ -2188,6 +2199,195 @@
     <p:extLst>
       <p:ext uri="{BB962C8B-B14F-4D97-AF65-F5344CB8AC3E}">
         <p14:creationId xmlns:p14="http://schemas.microsoft.com/office/powerpoint/2010/main" val="2210032523"/>
+      </p:ext>
+    </p:extLst>
+  </p:cSld>
+  <p:clrMapOvr>
+    <a:masterClrMapping/>
+  </p:clrMapOvr>
+</p:notes>
+</file>
+
+<file path=ppt/notesSlides/notesSlide13.xml><?xml version="1.0" encoding="utf-8"?>
+<p:notes xmlns:a="http://schemas.openxmlformats.org/drawingml/2006/main" xmlns:r="http://schemas.openxmlformats.org/officeDocument/2006/relationships" xmlns:p="http://schemas.openxmlformats.org/presentationml/2006/main">
+  <p:cSld>
+    <p:spTree>
+      <p:nvGrpSpPr>
+        <p:cNvPr id="1" name=""/>
+        <p:cNvGrpSpPr/>
+        <p:nvPr/>
+      </p:nvGrpSpPr>
+      <p:grpSpPr>
+        <a:xfrm>
+          <a:off x="0" y="0"/>
+          <a:ext cx="0" cy="0"/>
+          <a:chOff x="0" y="0"/>
+          <a:chExt cx="0" cy="0"/>
+        </a:xfrm>
+      </p:grpSpPr>
+      <p:sp>
+        <p:nvSpPr>
+          <p:cNvPr id="2" name="Slide Image Placeholder 1"/>
+          <p:cNvSpPr>
+            <a:spLocks noGrp="1" noRot="1" noChangeAspect="1"/>
+          </p:cNvSpPr>
+          <p:nvPr>
+            <p:ph type="sldImg"/>
+          </p:nvPr>
+        </p:nvSpPr>
+        <p:spPr/>
+      </p:sp>
+      <p:sp>
+        <p:nvSpPr>
+          <p:cNvPr id="3" name="Notes Placeholder 2"/>
+          <p:cNvSpPr>
+            <a:spLocks noGrp="1"/>
+          </p:cNvSpPr>
+          <p:nvPr>
+            <p:ph type="body" idx="1"/>
+          </p:nvPr>
+        </p:nvSpPr>
+        <p:spPr/>
+        <p:txBody>
+          <a:bodyPr/>
+          <a:lstStyle/>
+          <a:p>
+            <a:pPr marL="171450" indent="-171450">
+              <a:buFontTx/>
+              <a:buChar char="-"/>
+            </a:pPr>
+            <a:r>
+              <a:rPr lang="en-US" dirty="0"/>
+              <a:t>A lot of things </a:t>
+            </a:r>
+          </a:p>
+        </p:txBody>
+      </p:sp>
+      <p:sp>
+        <p:nvSpPr>
+          <p:cNvPr id="4" name="Slide Number Placeholder 3"/>
+          <p:cNvSpPr>
+            <a:spLocks noGrp="1"/>
+          </p:cNvSpPr>
+          <p:nvPr>
+            <p:ph type="sldNum" sz="quarter" idx="5"/>
+          </p:nvPr>
+        </p:nvSpPr>
+        <p:spPr/>
+        <p:txBody>
+          <a:bodyPr/>
+          <a:lstStyle/>
+          <a:p>
+            <a:fld id="{1734D747-9380-41EE-9946-EC9EC0CA5D1E}" type="slidenum">
+              <a:rPr lang="en-US" noProof="0" smtClean="0"/>
+              <a:t>15</a:t>
+            </a:fld>
+            <a:endParaRPr lang="en-US" noProof="0" dirty="0"/>
+          </a:p>
+        </p:txBody>
+      </p:sp>
+    </p:spTree>
+    <p:extLst>
+      <p:ext uri="{BB962C8B-B14F-4D97-AF65-F5344CB8AC3E}">
+        <p14:creationId xmlns:p14="http://schemas.microsoft.com/office/powerpoint/2010/main" val="4133105507"/>
+      </p:ext>
+    </p:extLst>
+  </p:cSld>
+  <p:clrMapOvr>
+    <a:masterClrMapping/>
+  </p:clrMapOvr>
+</p:notes>
+</file>
+
+<file path=ppt/notesSlides/notesSlide14.xml><?xml version="1.0" encoding="utf-8"?>
+<p:notes xmlns:a="http://schemas.openxmlformats.org/drawingml/2006/main" xmlns:r="http://schemas.openxmlformats.org/officeDocument/2006/relationships" xmlns:p="http://schemas.openxmlformats.org/presentationml/2006/main">
+  <p:cSld>
+    <p:spTree>
+      <p:nvGrpSpPr>
+        <p:cNvPr id="1" name=""/>
+        <p:cNvGrpSpPr/>
+        <p:nvPr/>
+      </p:nvGrpSpPr>
+      <p:grpSpPr>
+        <a:xfrm>
+          <a:off x="0" y="0"/>
+          <a:ext cx="0" cy="0"/>
+          <a:chOff x="0" y="0"/>
+          <a:chExt cx="0" cy="0"/>
+        </a:xfrm>
+      </p:grpSpPr>
+      <p:sp>
+        <p:nvSpPr>
+          <p:cNvPr id="2" name="Slide Image Placeholder 1"/>
+          <p:cNvSpPr>
+            <a:spLocks noGrp="1" noRot="1" noChangeAspect="1"/>
+          </p:cNvSpPr>
+          <p:nvPr>
+            <p:ph type="sldImg"/>
+          </p:nvPr>
+        </p:nvSpPr>
+        <p:spPr/>
+      </p:sp>
+      <p:sp>
+        <p:nvSpPr>
+          <p:cNvPr id="3" name="Notes Placeholder 2"/>
+          <p:cNvSpPr>
+            <a:spLocks noGrp="1"/>
+          </p:cNvSpPr>
+          <p:nvPr>
+            <p:ph type="body" idx="1"/>
+          </p:nvPr>
+        </p:nvSpPr>
+        <p:spPr/>
+        <p:txBody>
+          <a:bodyPr/>
+          <a:lstStyle/>
+          <a:p>
+            <a:pPr marL="171450" indent="-171450">
+              <a:buFontTx/>
+              <a:buChar char="-"/>
+            </a:pPr>
+            <a:r>
+              <a:rPr lang="en-US" dirty="0"/>
+              <a:t>Please consider contributing your own tips</a:t>
+            </a:r>
+          </a:p>
+          <a:p>
+            <a:pPr marL="171450" indent="-171450">
+              <a:buFontTx/>
+              <a:buChar char="-"/>
+            </a:pPr>
+            <a:endParaRPr lang="en-US" dirty="0"/>
+          </a:p>
+        </p:txBody>
+      </p:sp>
+      <p:sp>
+        <p:nvSpPr>
+          <p:cNvPr id="4" name="Slide Number Placeholder 3"/>
+          <p:cNvSpPr>
+            <a:spLocks noGrp="1"/>
+          </p:cNvSpPr>
+          <p:nvPr>
+            <p:ph type="sldNum" sz="quarter" idx="5"/>
+          </p:nvPr>
+        </p:nvSpPr>
+        <p:spPr/>
+        <p:txBody>
+          <a:bodyPr/>
+          <a:lstStyle/>
+          <a:p>
+            <a:fld id="{1734D747-9380-41EE-9946-EC9EC0CA5D1E}" type="slidenum">
+              <a:rPr lang="en-US" noProof="0" smtClean="0"/>
+              <a:t>16</a:t>
+            </a:fld>
+            <a:endParaRPr lang="en-US" noProof="0" dirty="0"/>
+          </a:p>
+        </p:txBody>
+      </p:sp>
+    </p:spTree>
+    <p:extLst>
+      <p:ext uri="{BB962C8B-B14F-4D97-AF65-F5344CB8AC3E}">
+        <p14:creationId xmlns:p14="http://schemas.microsoft.com/office/powerpoint/2010/main" val="2087113364"/>
       </p:ext>
     </p:extLst>
   </p:cSld>
@@ -3768,7 +3968,7 @@
           <a:p>
             <a:fld id="{1734D747-9380-41EE-9946-EC9EC0CA5D1E}" type="slidenum">
               <a:rPr lang="en-US" noProof="0" smtClean="0"/>
-              <a:t>8</a:t>
+              <a:t>9</a:t>
             </a:fld>
             <a:endParaRPr lang="en-US" noProof="0" dirty="0"/>
           </a:p>
@@ -3930,6 +4130,64 @@
               </a:rPr>
               <a:t>Combining all files into a single .psm1 file for load speed </a:t>
             </a:r>
+          </a:p>
+          <a:p>
+            <a:pPr marL="628650" marR="0" lvl="1" indent="-171450" algn="l" defTabSz="914400" rtl="0" eaLnBrk="1" fontAlgn="auto" latinLnBrk="0" hangingPunct="1">
+              <a:lnSpc>
+                <a:spcPct val="100000"/>
+              </a:lnSpc>
+              <a:spcBef>
+                <a:spcPts val="0"/>
+              </a:spcBef>
+              <a:spcAft>
+                <a:spcPts val="0"/>
+              </a:spcAft>
+              <a:buClrTx/>
+              <a:buSzTx/>
+              <a:buFontTx/>
+              <a:buChar char="-"/>
+              <a:tabLst/>
+              <a:defRPr/>
+            </a:pPr>
+            <a:r>
+              <a:rPr lang="en-US" sz="1800" b="0" i="0" u="none" strike="noStrike" dirty="0">
+                <a:solidFill>
+                  <a:srgbClr val="000000"/>
+                </a:solidFill>
+                <a:effectLst/>
+                <a:highlight>
+                  <a:srgbClr val="FFFFFF"/>
+                </a:highlight>
+                <a:latin typeface="Calibri" panose="020F0502020204030204" pitchFamily="34" charset="0"/>
+              </a:rPr>
+              <a:t>Test.ps1 in </a:t>
+            </a:r>
+            <a:r>
+              <a:rPr lang="en-US" sz="1800" b="0" i="0" u="none" strike="noStrike" dirty="0" err="1">
+                <a:solidFill>
+                  <a:srgbClr val="000000"/>
+                </a:solidFill>
+                <a:effectLst/>
+                <a:highlight>
+                  <a:srgbClr val="FFFFFF"/>
+                </a:highlight>
+                <a:latin typeface="Calibri" panose="020F0502020204030204" pitchFamily="34" charset="0"/>
+              </a:rPr>
+              <a:t>tiPS</a:t>
+            </a:r>
+            <a:r>
+              <a:rPr lang="en-US" sz="1800" b="0" i="0" u="none" strike="noStrike" dirty="0">
+                <a:solidFill>
+                  <a:srgbClr val="000000"/>
+                </a:solidFill>
+                <a:effectLst/>
+                <a:highlight>
+                  <a:srgbClr val="FFFFFF"/>
+                </a:highlight>
+                <a:latin typeface="Calibri" panose="020F0502020204030204" pitchFamily="34" charset="0"/>
+              </a:rPr>
+              <a:t> repo</a:t>
+            </a:r>
             <a:endParaRPr lang="en-US" sz="1200" b="0" i="0" u="none" strike="noStrike" dirty="0">
               <a:solidFill>
                 <a:srgbClr val="000000"/>
@@ -4022,7 +4280,7 @@
           <a:p>
             <a:fld id="{1734D747-9380-41EE-9946-EC9EC0CA5D1E}" type="slidenum">
               <a:rPr lang="en-US" noProof="0" smtClean="0"/>
-              <a:t>9</a:t>
+              <a:t>10</a:t>
             </a:fld>
             <a:endParaRPr lang="en-US" noProof="0" dirty="0"/>
           </a:p>
@@ -4164,7 +4422,7 @@
           <a:p>
             <a:fld id="{1734D747-9380-41EE-9946-EC9EC0CA5D1E}" type="slidenum">
               <a:rPr lang="en-US" noProof="0" smtClean="0"/>
-              <a:t>10</a:t>
+              <a:t>11</a:t>
             </a:fld>
             <a:endParaRPr lang="en-US" noProof="0" dirty="0"/>
           </a:p>
@@ -29313,8 +29571,12 @@
           <a:lstStyle/>
           <a:p>
             <a:r>
+              <a:rPr lang="en-US" dirty="0" err="1"/>
+              <a:t>tiPS</a:t>
+            </a:r>
+            <a:r>
               <a:rPr lang="en-US" dirty="0"/>
-              <a:t>Classes and Enums</a:t>
+              <a:t> Decisions</a:t>
             </a:r>
           </a:p>
         </p:txBody>
@@ -29337,8 +29599,8 @@
         </p:nvSpPr>
         <p:spPr>
           <a:xfrm>
-            <a:off x="444499" y="1195755"/>
-            <a:ext cx="11467867" cy="5373858"/>
+            <a:off x="444499" y="1625385"/>
+            <a:ext cx="11467867" cy="4390951"/>
           </a:xfrm>
         </p:spPr>
         <p:txBody>
@@ -29347,58 +29609,48 @@
           <a:p>
             <a:r>
               <a:rPr lang="en-US" sz="2800" dirty="0"/>
-              <a:t>Enum</a:t>
+              <a:t>Architecture Decision Records (ADRs)</a:t>
+            </a:r>
+          </a:p>
+          <a:p>
+            <a:endParaRPr lang="en-US" sz="2800" dirty="0"/>
+          </a:p>
+          <a:p>
+            <a:r>
+              <a:rPr lang="en-US" sz="2800" dirty="0"/>
+              <a:t>Written in PowerShell instead of C# for community support</a:t>
+            </a:r>
+          </a:p>
+          <a:p>
+            <a:r>
+              <a:rPr lang="en-US" sz="2800" dirty="0"/>
+              <a:t>Combine tips files into a single </a:t>
+            </a:r>
+            <a:r>
+              <a:rPr lang="en-US" sz="2800" dirty="0" err="1"/>
+              <a:t>json</a:t>
+            </a:r>
+            <a:r>
+              <a:rPr lang="en-US" sz="2800" dirty="0"/>
+              <a:t> file for performance</a:t>
+            </a:r>
+          </a:p>
+          <a:p>
+            <a:r>
+              <a:rPr lang="en-US" sz="2800" dirty="0"/>
+              <a:t>Combine module files into a single .psm1 file during build for performance</a:t>
+            </a:r>
+          </a:p>
+          <a:p>
+            <a:r>
+              <a:rPr lang="en-US" sz="2800" dirty="0"/>
+              <a:t>Compile classes to C# assembly for performance</a:t>
             </a:r>
           </a:p>
           <a:p>
             <a:pPr lvl="1"/>
             <a:r>
-              <a:rPr lang="en-US" sz="2600" dirty="0"/>
-              <a:t>Predefined set of values to choose from</a:t>
-            </a:r>
-          </a:p>
-          <a:p>
-            <a:pPr lvl="1"/>
-            <a:r>
-              <a:rPr lang="en-US" sz="2600" dirty="0"/>
-              <a:t>Automatic validations and autocomplete</a:t>
-            </a:r>
-          </a:p>
-          <a:p>
-            <a:r>
-              <a:rPr lang="en-US" sz="2800" dirty="0"/>
-              <a:t>Class</a:t>
-            </a:r>
-          </a:p>
-          <a:p>
-            <a:pPr lvl="1"/>
-            <a:r>
-              <a:rPr lang="en-US" sz="2600" dirty="0"/>
-              <a:t>Strongly typed object with data + functions</a:t>
-            </a:r>
-          </a:p>
-          <a:p>
-            <a:pPr lvl="1"/>
-            <a:r>
-              <a:rPr lang="en-US" sz="2600" dirty="0"/>
-              <a:t>All objects guaranteed to have the same properties and functions</a:t>
-            </a:r>
-          </a:p>
-          <a:p>
-            <a:pPr marL="457200" lvl="1" indent="0">
-              <a:buNone/>
-            </a:pPr>
-            <a:endParaRPr lang="en-US" sz="2800" dirty="0"/>
-          </a:p>
-          <a:p>
-            <a:pPr marL="457200" lvl="1" indent="0">
-              <a:buNone/>
-            </a:pPr>
-            <a:endParaRPr lang="en-US" sz="2800" dirty="0"/>
-          </a:p>
-          <a:p>
-            <a:r>
-              <a:rPr lang="en-US" sz="2800" dirty="0">
+              <a:rPr lang="en-US" sz="2600" dirty="0">
                 <a:solidFill>
                   <a:schemeClr val="accent1">
                     <a:lumMod val="60000"/>
@@ -29413,10 +29665,10 @@
                   </a:extLst>
                 </a:hlinkClick>
               </a:rPr>
-              <a:t>https://github.com/deadlydog/PowerShell.Experiment.ClassInModule</a:t>
-            </a:r>
-            <a:r>
-              <a:rPr lang="en-US" sz="2800" dirty="0">
+              <a:t>https://github.com/deadlydog/PowerShell.Experiment.ClassPerformanceComparison</a:t>
+            </a:r>
+            <a:r>
+              <a:rPr lang="en-US" sz="2600" dirty="0">
                 <a:solidFill>
                   <a:schemeClr val="accent1">
                     <a:lumMod val="60000"/>
@@ -29462,7 +29714,7 @@
     </p:spTree>
     <p:extLst>
       <p:ext uri="{BB962C8B-B14F-4D97-AF65-F5344CB8AC3E}">
-        <p14:creationId xmlns:p14="http://schemas.microsoft.com/office/powerpoint/2010/main" val="1089435659"/>
+        <p14:creationId xmlns:p14="http://schemas.microsoft.com/office/powerpoint/2010/main" val="430754784"/>
       </p:ext>
     </p:extLst>
   </p:cSld>
@@ -29481,6 +29733,351 @@
       </p:transition>
     </mc:Fallback>
   </mc:AlternateContent>
+  <p:timing>
+    <p:tnLst>
+      <p:par>
+        <p:cTn id="1" dur="indefinite" restart="never" nodeType="tmRoot">
+          <p:childTnLst>
+            <p:seq concurrent="1" nextAc="seek">
+              <p:cTn id="2" dur="indefinite" nodeType="mainSeq">
+                <p:childTnLst>
+                  <p:par>
+                    <p:cTn id="3" fill="hold">
+                      <p:stCondLst>
+                        <p:cond delay="indefinite"/>
+                      </p:stCondLst>
+                      <p:childTnLst>
+                        <p:par>
+                          <p:cTn id="4" fill="hold">
+                            <p:stCondLst>
+                              <p:cond delay="0"/>
+                            </p:stCondLst>
+                            <p:childTnLst>
+                              <p:par>
+                                <p:cTn id="5" presetID="10" presetClass="entr" presetSubtype="0" fill="hold" grpId="0" nodeType="clickEffect">
+                                  <p:stCondLst>
+                                    <p:cond delay="0"/>
+                                  </p:stCondLst>
+                                  <p:childTnLst>
+                                    <p:set>
+                                      <p:cBhvr>
+                                        <p:cTn id="6" dur="1" fill="hold">
+                                          <p:stCondLst>
+                                            <p:cond delay="0"/>
+                                          </p:stCondLst>
+                                        </p:cTn>
+                                        <p:tgtEl>
+                                          <p:spTgt spid="10">
+                                            <p:txEl>
+                                              <p:pRg st="0" end="0"/>
+                                            </p:txEl>
+                                          </p:spTgt>
+                                        </p:tgtEl>
+                                        <p:attrNameLst>
+                                          <p:attrName>style.visibility</p:attrName>
+                                        </p:attrNameLst>
+                                      </p:cBhvr>
+                                      <p:to>
+                                        <p:strVal val="visible"/>
+                                      </p:to>
+                                    </p:set>
+                                    <p:animEffect transition="in" filter="fade">
+                                      <p:cBhvr>
+                                        <p:cTn id="7" dur="500"/>
+                                        <p:tgtEl>
+                                          <p:spTgt spid="10">
+                                            <p:txEl>
+                                              <p:pRg st="0" end="0"/>
+                                            </p:txEl>
+                                          </p:spTgt>
+                                        </p:tgtEl>
+                                      </p:cBhvr>
+                                    </p:animEffect>
+                                  </p:childTnLst>
+                                </p:cTn>
+                              </p:par>
+                            </p:childTnLst>
+                          </p:cTn>
+                        </p:par>
+                      </p:childTnLst>
+                    </p:cTn>
+                  </p:par>
+                  <p:par>
+                    <p:cTn id="8" fill="hold">
+                      <p:stCondLst>
+                        <p:cond delay="indefinite"/>
+                      </p:stCondLst>
+                      <p:childTnLst>
+                        <p:par>
+                          <p:cTn id="9" fill="hold">
+                            <p:stCondLst>
+                              <p:cond delay="0"/>
+                            </p:stCondLst>
+                            <p:childTnLst>
+                              <p:par>
+                                <p:cTn id="10" presetID="10" presetClass="entr" presetSubtype="0" fill="hold" grpId="0" nodeType="clickEffect">
+                                  <p:stCondLst>
+                                    <p:cond delay="0"/>
+                                  </p:stCondLst>
+                                  <p:childTnLst>
+                                    <p:set>
+                                      <p:cBhvr>
+                                        <p:cTn id="11" dur="1" fill="hold">
+                                          <p:stCondLst>
+                                            <p:cond delay="0"/>
+                                          </p:stCondLst>
+                                        </p:cTn>
+                                        <p:tgtEl>
+                                          <p:spTgt spid="10">
+                                            <p:txEl>
+                                              <p:pRg st="2" end="2"/>
+                                            </p:txEl>
+                                          </p:spTgt>
+                                        </p:tgtEl>
+                                        <p:attrNameLst>
+                                          <p:attrName>style.visibility</p:attrName>
+                                        </p:attrNameLst>
+                                      </p:cBhvr>
+                                      <p:to>
+                                        <p:strVal val="visible"/>
+                                      </p:to>
+                                    </p:set>
+                                    <p:animEffect transition="in" filter="fade">
+                                      <p:cBhvr>
+                                        <p:cTn id="12" dur="500"/>
+                                        <p:tgtEl>
+                                          <p:spTgt spid="10">
+                                            <p:txEl>
+                                              <p:pRg st="2" end="2"/>
+                                            </p:txEl>
+                                          </p:spTgt>
+                                        </p:tgtEl>
+                                      </p:cBhvr>
+                                    </p:animEffect>
+                                  </p:childTnLst>
+                                </p:cTn>
+                              </p:par>
+                            </p:childTnLst>
+                          </p:cTn>
+                        </p:par>
+                      </p:childTnLst>
+                    </p:cTn>
+                  </p:par>
+                  <p:par>
+                    <p:cTn id="13" fill="hold">
+                      <p:stCondLst>
+                        <p:cond delay="indefinite"/>
+                      </p:stCondLst>
+                      <p:childTnLst>
+                        <p:par>
+                          <p:cTn id="14" fill="hold">
+                            <p:stCondLst>
+                              <p:cond delay="0"/>
+                            </p:stCondLst>
+                            <p:childTnLst>
+                              <p:par>
+                                <p:cTn id="15" presetID="10" presetClass="entr" presetSubtype="0" fill="hold" grpId="0" nodeType="clickEffect">
+                                  <p:stCondLst>
+                                    <p:cond delay="0"/>
+                                  </p:stCondLst>
+                                  <p:childTnLst>
+                                    <p:set>
+                                      <p:cBhvr>
+                                        <p:cTn id="16" dur="1" fill="hold">
+                                          <p:stCondLst>
+                                            <p:cond delay="0"/>
+                                          </p:stCondLst>
+                                        </p:cTn>
+                                        <p:tgtEl>
+                                          <p:spTgt spid="10">
+                                            <p:txEl>
+                                              <p:pRg st="3" end="3"/>
+                                            </p:txEl>
+                                          </p:spTgt>
+                                        </p:tgtEl>
+                                        <p:attrNameLst>
+                                          <p:attrName>style.visibility</p:attrName>
+                                        </p:attrNameLst>
+                                      </p:cBhvr>
+                                      <p:to>
+                                        <p:strVal val="visible"/>
+                                      </p:to>
+                                    </p:set>
+                                    <p:animEffect transition="in" filter="fade">
+                                      <p:cBhvr>
+                                        <p:cTn id="17" dur="500"/>
+                                        <p:tgtEl>
+                                          <p:spTgt spid="10">
+                                            <p:txEl>
+                                              <p:pRg st="3" end="3"/>
+                                            </p:txEl>
+                                          </p:spTgt>
+                                        </p:tgtEl>
+                                      </p:cBhvr>
+                                    </p:animEffect>
+                                  </p:childTnLst>
+                                </p:cTn>
+                              </p:par>
+                              <p:par>
+                                <p:cTn id="18" presetID="10" presetClass="entr" presetSubtype="0" fill="hold" grpId="0" nodeType="withEffect">
+                                  <p:stCondLst>
+                                    <p:cond delay="0"/>
+                                  </p:stCondLst>
+                                  <p:childTnLst>
+                                    <p:set>
+                                      <p:cBhvr>
+                                        <p:cTn id="19" dur="1" fill="hold">
+                                          <p:stCondLst>
+                                            <p:cond delay="0"/>
+                                          </p:stCondLst>
+                                        </p:cTn>
+                                        <p:tgtEl>
+                                          <p:spTgt spid="10">
+                                            <p:txEl>
+                                              <p:pRg st="4" end="4"/>
+                                            </p:txEl>
+                                          </p:spTgt>
+                                        </p:tgtEl>
+                                        <p:attrNameLst>
+                                          <p:attrName>style.visibility</p:attrName>
+                                        </p:attrNameLst>
+                                      </p:cBhvr>
+                                      <p:to>
+                                        <p:strVal val="visible"/>
+                                      </p:to>
+                                    </p:set>
+                                    <p:animEffect transition="in" filter="fade">
+                                      <p:cBhvr>
+                                        <p:cTn id="20" dur="500"/>
+                                        <p:tgtEl>
+                                          <p:spTgt spid="10">
+                                            <p:txEl>
+                                              <p:pRg st="4" end="4"/>
+                                            </p:txEl>
+                                          </p:spTgt>
+                                        </p:tgtEl>
+                                      </p:cBhvr>
+                                    </p:animEffect>
+                                  </p:childTnLst>
+                                </p:cTn>
+                              </p:par>
+                              <p:par>
+                                <p:cTn id="21" presetID="10" presetClass="entr" presetSubtype="0" fill="hold" grpId="0" nodeType="withEffect">
+                                  <p:stCondLst>
+                                    <p:cond delay="0"/>
+                                  </p:stCondLst>
+                                  <p:childTnLst>
+                                    <p:set>
+                                      <p:cBhvr>
+                                        <p:cTn id="22" dur="1" fill="hold">
+                                          <p:stCondLst>
+                                            <p:cond delay="0"/>
+                                          </p:stCondLst>
+                                        </p:cTn>
+                                        <p:tgtEl>
+                                          <p:spTgt spid="10">
+                                            <p:txEl>
+                                              <p:pRg st="5" end="5"/>
+                                            </p:txEl>
+                                          </p:spTgt>
+                                        </p:tgtEl>
+                                        <p:attrNameLst>
+                                          <p:attrName>style.visibility</p:attrName>
+                                        </p:attrNameLst>
+                                      </p:cBhvr>
+                                      <p:to>
+                                        <p:strVal val="visible"/>
+                                      </p:to>
+                                    </p:set>
+                                    <p:animEffect transition="in" filter="fade">
+                                      <p:cBhvr>
+                                        <p:cTn id="23" dur="500"/>
+                                        <p:tgtEl>
+                                          <p:spTgt spid="10">
+                                            <p:txEl>
+                                              <p:pRg st="5" end="5"/>
+                                            </p:txEl>
+                                          </p:spTgt>
+                                        </p:tgtEl>
+                                      </p:cBhvr>
+                                    </p:animEffect>
+                                  </p:childTnLst>
+                                </p:cTn>
+                              </p:par>
+                              <p:par>
+                                <p:cTn id="24" presetID="10" presetClass="entr" presetSubtype="0" fill="hold" grpId="0" nodeType="withEffect">
+                                  <p:stCondLst>
+                                    <p:cond delay="0"/>
+                                  </p:stCondLst>
+                                  <p:childTnLst>
+                                    <p:set>
+                                      <p:cBhvr>
+                                        <p:cTn id="25" dur="1" fill="hold">
+                                          <p:stCondLst>
+                                            <p:cond delay="0"/>
+                                          </p:stCondLst>
+                                        </p:cTn>
+                                        <p:tgtEl>
+                                          <p:spTgt spid="10">
+                                            <p:txEl>
+                                              <p:pRg st="6" end="6"/>
+                                            </p:txEl>
+                                          </p:spTgt>
+                                        </p:tgtEl>
+                                        <p:attrNameLst>
+                                          <p:attrName>style.visibility</p:attrName>
+                                        </p:attrNameLst>
+                                      </p:cBhvr>
+                                      <p:to>
+                                        <p:strVal val="visible"/>
+                                      </p:to>
+                                    </p:set>
+                                    <p:animEffect transition="in" filter="fade">
+                                      <p:cBhvr>
+                                        <p:cTn id="26" dur="500"/>
+                                        <p:tgtEl>
+                                          <p:spTgt spid="10">
+                                            <p:txEl>
+                                              <p:pRg st="6" end="6"/>
+                                            </p:txEl>
+                                          </p:spTgt>
+                                        </p:tgtEl>
+                                      </p:cBhvr>
+                                    </p:animEffect>
+                                  </p:childTnLst>
+                                </p:cTn>
+                              </p:par>
+                            </p:childTnLst>
+                          </p:cTn>
+                        </p:par>
+                      </p:childTnLst>
+                    </p:cTn>
+                  </p:par>
+                </p:childTnLst>
+              </p:cTn>
+              <p:prevCondLst>
+                <p:cond evt="onPrev" delay="0">
+                  <p:tgtEl>
+                    <p:sldTgt/>
+                  </p:tgtEl>
+                </p:cond>
+              </p:prevCondLst>
+              <p:nextCondLst>
+                <p:cond evt="onNext" delay="0">
+                  <p:tgtEl>
+                    <p:sldTgt/>
+                  </p:tgtEl>
+                </p:cond>
+              </p:nextCondLst>
+            </p:seq>
+          </p:childTnLst>
+        </p:cTn>
+      </p:par>
+    </p:tnLst>
+    <p:bldLst>
+      <p:bldP spid="10" grpId="0" uiExpand="1" build="p"/>
+    </p:bldLst>
+  </p:timing>
 </p:sld>
 </file>
 
@@ -29524,13 +30121,8 @@
           <a:p>
             <a:r>
               <a:rPr lang="en-US" dirty="0"/>
-              <a:t>Tips: Use Temporary Console and </a:t>
-            </a:r>
-            <a:r>
-              <a:rPr lang="en-US" dirty="0" err="1"/>
-              <a:t>StrictMode</a:t>
-            </a:r>
-            <a:endParaRPr lang="en-US" dirty="0"/>
+              <a:t>Classes and Enums</a:t>
+            </a:r>
           </a:p>
         </p:txBody>
       </p:sp>
@@ -29552,8 +30144,8 @@
         </p:nvSpPr>
         <p:spPr>
           <a:xfrm>
-            <a:off x="444499" y="1625384"/>
-            <a:ext cx="11467867" cy="5054815"/>
+            <a:off x="444499" y="1195755"/>
+            <a:ext cx="11467867" cy="5373858"/>
           </a:xfrm>
         </p:spPr>
         <p:txBody>
@@ -29562,57 +30154,84 @@
           <a:p>
             <a:r>
               <a:rPr lang="en-US" sz="2800" dirty="0"/>
-              <a:t>VS Code Setting: Create Temporary Integrated Console</a:t>
+              <a:t>Enum</a:t>
             </a:r>
           </a:p>
           <a:p>
             <a:pPr lvl="1"/>
             <a:r>
               <a:rPr lang="en-US" sz="2600" dirty="0"/>
-              <a:t>Helps surface errors, especially during refactoring </a:t>
+              <a:t>Predefined set of values to choose from</a:t>
             </a:r>
           </a:p>
           <a:p>
             <a:pPr lvl="1"/>
             <a:r>
               <a:rPr lang="en-US" sz="2600" dirty="0"/>
-              <a:t>Avoid reloading VS Code when using Add-Type to import assemblies and working with classes / </a:t>
-            </a:r>
-            <a:r>
-              <a:rPr lang="en-US" sz="2600" dirty="0" err="1"/>
-              <a:t>enums</a:t>
-            </a:r>
-            <a:endParaRPr lang="en-US" sz="2600" dirty="0"/>
-          </a:p>
-          <a:p>
+              <a:t>Automatic validations and autocomplete</a:t>
+            </a:r>
+          </a:p>
+          <a:p>
+            <a:r>
+              <a:rPr lang="en-US" sz="2800" dirty="0"/>
+              <a:t>Class</a:t>
+            </a:r>
+          </a:p>
+          <a:p>
+            <a:pPr lvl="1"/>
+            <a:r>
+              <a:rPr lang="en-US" sz="2600" dirty="0"/>
+              <a:t>Strongly typed object with data + functions</a:t>
+            </a:r>
+          </a:p>
+          <a:p>
+            <a:pPr lvl="1"/>
+            <a:r>
+              <a:rPr lang="en-US" sz="2600" dirty="0"/>
+              <a:t>All objects guaranteed to have the same properties and functions</a:t>
+            </a:r>
+          </a:p>
+          <a:p>
+            <a:pPr marL="457200" lvl="1" indent="0">
+              <a:buNone/>
+            </a:pPr>
             <a:endParaRPr lang="en-US" sz="2800" dirty="0"/>
           </a:p>
           <a:p>
-            <a:r>
-              <a:rPr lang="en-US" sz="2800" dirty="0"/>
-              <a:t>Set-</a:t>
-            </a:r>
-            <a:r>
-              <a:rPr lang="en-US" sz="2800" dirty="0" err="1"/>
-              <a:t>StrictMode</a:t>
-            </a:r>
-            <a:r>
-              <a:rPr lang="en-US" sz="2800" dirty="0"/>
-              <a:t> -Version Latest</a:t>
-            </a:r>
-          </a:p>
-          <a:p>
-            <a:pPr lvl="1"/>
-            <a:r>
-              <a:rPr lang="en-US" sz="2600" dirty="0"/>
-              <a:t>Helps catch errors that might otherwise go unnoticed</a:t>
-            </a:r>
-          </a:p>
-          <a:p>
-            <a:pPr lvl="1"/>
-            <a:r>
-              <a:rPr lang="en-US" sz="2600" dirty="0"/>
-              <a:t>Caveat: Be careful introducing this into existing scripts, or scripts that are dot-sourced into other scripts, as it applies to the current scope and all child scopes</a:t>
+            <a:pPr marL="457200" lvl="1" indent="0">
+              <a:buNone/>
+            </a:pPr>
+            <a:endParaRPr lang="en-US" sz="2800" dirty="0"/>
+          </a:p>
+          <a:p>
+            <a:r>
+              <a:rPr lang="en-US" sz="2800" dirty="0">
+                <a:solidFill>
+                  <a:schemeClr val="accent1">
+                    <a:lumMod val="60000"/>
+                    <a:lumOff val="40000"/>
+                  </a:schemeClr>
+                </a:solidFill>
+                <a:hlinkClick r:id="rId3">
+                  <a:extLst>
+                    <a:ext uri="{A12FA001-AC4F-418D-AE19-62706E023703}">
+                      <ahyp:hlinkClr xmlns:ahyp="http://schemas.microsoft.com/office/drawing/2018/hyperlinkcolor" val="tx"/>
+                    </a:ext>
+                  </a:extLst>
+                </a:hlinkClick>
+              </a:rPr>
+              <a:t>https://github.com/deadlydog/PowerShell.Experiment.ClassInModule</a:t>
+            </a:r>
+            <a:r>
+              <a:rPr lang="en-US" sz="2800" dirty="0">
+                <a:solidFill>
+                  <a:schemeClr val="accent1">
+                    <a:lumMod val="60000"/>
+                    <a:lumOff val="40000"/>
+                  </a:schemeClr>
+                </a:solidFill>
+              </a:rPr>
+              <a:t> </a:t>
             </a:r>
           </a:p>
         </p:txBody>
@@ -29650,7 +30269,7 @@
     </p:spTree>
     <p:extLst>
       <p:ext uri="{BB962C8B-B14F-4D97-AF65-F5344CB8AC3E}">
-        <p14:creationId xmlns:p14="http://schemas.microsoft.com/office/powerpoint/2010/main" val="670609937"/>
+        <p14:creationId xmlns:p14="http://schemas.microsoft.com/office/powerpoint/2010/main" val="1089435659"/>
       </p:ext>
     </p:extLst>
   </p:cSld>
@@ -29712,6 +30331,194 @@
           <a:p>
             <a:r>
               <a:rPr lang="en-US" dirty="0"/>
+              <a:t>Tips: Use Temporary Console and </a:t>
+            </a:r>
+            <a:r>
+              <a:rPr lang="en-US" dirty="0" err="1"/>
+              <a:t>StrictMode</a:t>
+            </a:r>
+            <a:endParaRPr lang="en-US" dirty="0"/>
+          </a:p>
+        </p:txBody>
+      </p:sp>
+      <p:sp>
+        <p:nvSpPr>
+          <p:cNvPr id="10" name="Text Placeholder 9">
+            <a:extLst>
+              <a:ext uri="{FF2B5EF4-FFF2-40B4-BE49-F238E27FC236}">
+                <a16:creationId xmlns:a16="http://schemas.microsoft.com/office/drawing/2014/main" id="{EF2BC084-E6DB-4DE7-B309-042A85EBA700}"/>
+              </a:ext>
+            </a:extLst>
+          </p:cNvPr>
+          <p:cNvSpPr>
+            <a:spLocks noGrp="1"/>
+          </p:cNvSpPr>
+          <p:nvPr>
+            <p:ph type="body" sz="quarter" idx="13"/>
+          </p:nvPr>
+        </p:nvSpPr>
+        <p:spPr>
+          <a:xfrm>
+            <a:off x="444499" y="1625384"/>
+            <a:ext cx="11467867" cy="5054815"/>
+          </a:xfrm>
+        </p:spPr>
+        <p:txBody>
+          <a:bodyPr/>
+          <a:lstStyle/>
+          <a:p>
+            <a:r>
+              <a:rPr lang="en-US" sz="2800" dirty="0"/>
+              <a:t>VS Code Setting: Create Temporary Integrated Console</a:t>
+            </a:r>
+          </a:p>
+          <a:p>
+            <a:pPr lvl="1"/>
+            <a:r>
+              <a:rPr lang="en-US" sz="2600" dirty="0"/>
+              <a:t>Helps surface errors, especially during refactoring </a:t>
+            </a:r>
+          </a:p>
+          <a:p>
+            <a:pPr lvl="1"/>
+            <a:r>
+              <a:rPr lang="en-US" sz="2600" dirty="0"/>
+              <a:t>Avoid reloading VS Code when using Add-Type to import assemblies and working with classes / </a:t>
+            </a:r>
+            <a:r>
+              <a:rPr lang="en-US" sz="2600" dirty="0" err="1"/>
+              <a:t>enums</a:t>
+            </a:r>
+            <a:endParaRPr lang="en-US" sz="2600" dirty="0"/>
+          </a:p>
+          <a:p>
+            <a:endParaRPr lang="en-US" sz="2800" dirty="0"/>
+          </a:p>
+          <a:p>
+            <a:r>
+              <a:rPr lang="en-US" sz="2800" dirty="0"/>
+              <a:t>Set-</a:t>
+            </a:r>
+            <a:r>
+              <a:rPr lang="en-US" sz="2800" dirty="0" err="1"/>
+              <a:t>StrictMode</a:t>
+            </a:r>
+            <a:r>
+              <a:rPr lang="en-US" sz="2800" dirty="0"/>
+              <a:t> -Version Latest</a:t>
+            </a:r>
+          </a:p>
+          <a:p>
+            <a:pPr lvl="1"/>
+            <a:r>
+              <a:rPr lang="en-US" sz="2600" dirty="0"/>
+              <a:t>Helps catch errors that might otherwise go unnoticed</a:t>
+            </a:r>
+          </a:p>
+          <a:p>
+            <a:pPr lvl="1"/>
+            <a:r>
+              <a:rPr lang="en-US" sz="2600" dirty="0"/>
+              <a:t>Caveat: Be careful introducing this into existing scripts, or scripts that are dot-sourced into other scripts, as it applies to the current scope and all child scopes</a:t>
+            </a:r>
+          </a:p>
+        </p:txBody>
+      </p:sp>
+      <p:sp>
+        <p:nvSpPr>
+          <p:cNvPr id="2" name="Slide Number Placeholder 1">
+            <a:extLst>
+              <a:ext uri="{FF2B5EF4-FFF2-40B4-BE49-F238E27FC236}">
+                <a16:creationId xmlns:a16="http://schemas.microsoft.com/office/drawing/2014/main" id="{BE9800F6-D571-48C4-8466-12AA1ADB6599}"/>
+              </a:ext>
+            </a:extLst>
+          </p:cNvPr>
+          <p:cNvSpPr>
+            <a:spLocks noGrp="1"/>
+          </p:cNvSpPr>
+          <p:nvPr>
+            <p:ph type="sldNum" sz="quarter" idx="12"/>
+          </p:nvPr>
+        </p:nvSpPr>
+        <p:spPr/>
+        <p:txBody>
+          <a:bodyPr/>
+          <a:lstStyle/>
+          <a:p>
+            <a:fld id="{C263D6C4-4840-40CC-AC84-17E24B3B7BDE}" type="slidenum">
+              <a:rPr lang="en-US" smtClean="0"/>
+              <a:pPr/>
+              <a:t>12</a:t>
+            </a:fld>
+            <a:endParaRPr lang="en-US" dirty="0"/>
+          </a:p>
+        </p:txBody>
+      </p:sp>
+    </p:spTree>
+    <p:extLst>
+      <p:ext uri="{BB962C8B-B14F-4D97-AF65-F5344CB8AC3E}">
+        <p14:creationId xmlns:p14="http://schemas.microsoft.com/office/powerpoint/2010/main" val="670609937"/>
+      </p:ext>
+    </p:extLst>
+  </p:cSld>
+  <p:clrMapOvr>
+    <a:masterClrMapping/>
+  </p:clrMapOvr>
+  <mc:AlternateContent xmlns:mc="http://schemas.openxmlformats.org/markup-compatibility/2006" xmlns:p14="http://schemas.microsoft.com/office/powerpoint/2010/main">
+    <mc:Choice Requires="p14">
+      <p:transition spd="med" p14:dur="700">
+        <p:fade/>
+      </p:transition>
+    </mc:Choice>
+    <mc:Fallback xmlns="">
+      <p:transition spd="med">
+        <p:fade/>
+      </p:transition>
+    </mc:Fallback>
+  </mc:AlternateContent>
+</p:sld>
+</file>
+
+<file path=ppt/slides/slide13.xml><?xml version="1.0" encoding="utf-8"?>
+<p:sld xmlns:a="http://schemas.openxmlformats.org/drawingml/2006/main" xmlns:r="http://schemas.openxmlformats.org/officeDocument/2006/relationships" xmlns:p="http://schemas.openxmlformats.org/presentationml/2006/main">
+  <p:cSld>
+    <p:spTree>
+      <p:nvGrpSpPr>
+        <p:cNvPr id="1" name=""/>
+        <p:cNvGrpSpPr/>
+        <p:nvPr/>
+      </p:nvGrpSpPr>
+      <p:grpSpPr>
+        <a:xfrm>
+          <a:off x="0" y="0"/>
+          <a:ext cx="0" cy="0"/>
+          <a:chOff x="0" y="0"/>
+          <a:chExt cx="0" cy="0"/>
+        </a:xfrm>
+      </p:grpSpPr>
+      <p:sp>
+        <p:nvSpPr>
+          <p:cNvPr id="7" name="Title 6">
+            <a:extLst>
+              <a:ext uri="{FF2B5EF4-FFF2-40B4-BE49-F238E27FC236}">
+                <a16:creationId xmlns:a16="http://schemas.microsoft.com/office/drawing/2014/main" id="{7875C19A-1AAE-476A-A316-A2CF92D763D3}"/>
+              </a:ext>
+            </a:extLst>
+          </p:cNvPr>
+          <p:cNvSpPr>
+            <a:spLocks noGrp="1"/>
+          </p:cNvSpPr>
+          <p:nvPr>
+            <p:ph type="title"/>
+          </p:nvPr>
+        </p:nvSpPr>
+        <p:spPr/>
+        <p:txBody>
+          <a:bodyPr/>
+          <a:lstStyle/>
+          <a:p>
+            <a:r>
+              <a:rPr lang="en-US" dirty="0"/>
               <a:t>Pester Tests</a:t>
             </a:r>
           </a:p>
@@ -29855,7 +30662,7 @@
             <a:fld id="{C263D6C4-4840-40CC-AC84-17E24B3B7BDE}" type="slidenum">
               <a:rPr lang="en-US" smtClean="0"/>
               <a:pPr/>
-              <a:t>12</a:t>
+              <a:t>13</a:t>
             </a:fld>
             <a:endParaRPr lang="en-US" dirty="0"/>
           </a:p>
@@ -30170,160 +30977,6 @@
 </p:sld>
 </file>
 
-<file path=ppt/slides/slide13.xml><?xml version="1.0" encoding="utf-8"?>
-<p:sld xmlns:a="http://schemas.openxmlformats.org/drawingml/2006/main" xmlns:r="http://schemas.openxmlformats.org/officeDocument/2006/relationships" xmlns:p="http://schemas.openxmlformats.org/presentationml/2006/main">
-  <p:cSld>
-    <p:spTree>
-      <p:nvGrpSpPr>
-        <p:cNvPr id="1" name=""/>
-        <p:cNvGrpSpPr/>
-        <p:nvPr/>
-      </p:nvGrpSpPr>
-      <p:grpSpPr>
-        <a:xfrm>
-          <a:off x="0" y="0"/>
-          <a:ext cx="0" cy="0"/>
-          <a:chOff x="0" y="0"/>
-          <a:chExt cx="0" cy="0"/>
-        </a:xfrm>
-      </p:grpSpPr>
-      <p:sp>
-        <p:nvSpPr>
-          <p:cNvPr id="7" name="Title 6">
-            <a:extLst>
-              <a:ext uri="{FF2B5EF4-FFF2-40B4-BE49-F238E27FC236}">
-                <a16:creationId xmlns:a16="http://schemas.microsoft.com/office/drawing/2014/main" id="{7875C19A-1AAE-476A-A316-A2CF92D763D3}"/>
-              </a:ext>
-            </a:extLst>
-          </p:cNvPr>
-          <p:cNvSpPr>
-            <a:spLocks noGrp="1"/>
-          </p:cNvSpPr>
-          <p:nvPr>
-            <p:ph type="title"/>
-          </p:nvPr>
-        </p:nvSpPr>
-        <p:spPr/>
-        <p:txBody>
-          <a:bodyPr/>
-          <a:lstStyle/>
-          <a:p>
-            <a:r>
-              <a:rPr lang="en-US" dirty="0"/>
-              <a:t>Smoke Tests</a:t>
-            </a:r>
-          </a:p>
-        </p:txBody>
-      </p:sp>
-      <p:sp>
-        <p:nvSpPr>
-          <p:cNvPr id="10" name="Text Placeholder 9">
-            <a:extLst>
-              <a:ext uri="{FF2B5EF4-FFF2-40B4-BE49-F238E27FC236}">
-                <a16:creationId xmlns:a16="http://schemas.microsoft.com/office/drawing/2014/main" id="{EF2BC084-E6DB-4DE7-B309-042A85EBA700}"/>
-              </a:ext>
-            </a:extLst>
-          </p:cNvPr>
-          <p:cNvSpPr>
-            <a:spLocks noGrp="1"/>
-          </p:cNvSpPr>
-          <p:nvPr>
-            <p:ph type="body" sz="quarter" idx="13"/>
-          </p:nvPr>
-        </p:nvSpPr>
-        <p:spPr>
-          <a:xfrm>
-            <a:off x="444499" y="1625385"/>
-            <a:ext cx="11467867" cy="4390951"/>
-          </a:xfrm>
-        </p:spPr>
-        <p:txBody>
-          <a:bodyPr/>
-          <a:lstStyle/>
-          <a:p>
-            <a:r>
-              <a:rPr lang="en-US" sz="2800" dirty="0"/>
-              <a:t>Tests the module/app after it has been deployed to ensure it works correctly</a:t>
-            </a:r>
-          </a:p>
-          <a:p>
-            <a:endParaRPr lang="en-US" sz="2800" dirty="0"/>
-          </a:p>
-          <a:p>
-            <a:r>
-              <a:rPr lang="en-US" sz="2800" dirty="0"/>
-              <a:t>Test the real end-user experience</a:t>
-            </a:r>
-          </a:p>
-          <a:p>
-            <a:r>
-              <a:rPr lang="en-US" sz="2800" dirty="0"/>
-              <a:t>Test backward compatibility</a:t>
-            </a:r>
-          </a:p>
-          <a:p>
-            <a:r>
-              <a:rPr lang="en-US" sz="2800" dirty="0"/>
-              <a:t>Test cross-platform compatibility</a:t>
-            </a:r>
-          </a:p>
-        </p:txBody>
-      </p:sp>
-      <p:sp>
-        <p:nvSpPr>
-          <p:cNvPr id="2" name="Slide Number Placeholder 1">
-            <a:extLst>
-              <a:ext uri="{FF2B5EF4-FFF2-40B4-BE49-F238E27FC236}">
-                <a16:creationId xmlns:a16="http://schemas.microsoft.com/office/drawing/2014/main" id="{BE9800F6-D571-48C4-8466-12AA1ADB6599}"/>
-              </a:ext>
-            </a:extLst>
-          </p:cNvPr>
-          <p:cNvSpPr>
-            <a:spLocks noGrp="1"/>
-          </p:cNvSpPr>
-          <p:nvPr>
-            <p:ph type="sldNum" sz="quarter" idx="12"/>
-          </p:nvPr>
-        </p:nvSpPr>
-        <p:spPr/>
-        <p:txBody>
-          <a:bodyPr/>
-          <a:lstStyle/>
-          <a:p>
-            <a:fld id="{C263D6C4-4840-40CC-AC84-17E24B3B7BDE}" type="slidenum">
-              <a:rPr lang="en-US" smtClean="0"/>
-              <a:pPr/>
-              <a:t>13</a:t>
-            </a:fld>
-            <a:endParaRPr lang="en-US" dirty="0"/>
-          </a:p>
-        </p:txBody>
-      </p:sp>
-    </p:spTree>
-    <p:extLst>
-      <p:ext uri="{BB962C8B-B14F-4D97-AF65-F5344CB8AC3E}">
-        <p14:creationId xmlns:p14="http://schemas.microsoft.com/office/powerpoint/2010/main" val="3371413876"/>
-      </p:ext>
-    </p:extLst>
-  </p:cSld>
-  <p:clrMapOvr>
-    <a:masterClrMapping/>
-  </p:clrMapOvr>
-  <mc:AlternateContent xmlns:mc="http://schemas.openxmlformats.org/markup-compatibility/2006" xmlns:p14="http://schemas.microsoft.com/office/powerpoint/2010/main">
-    <mc:Choice Requires="p14">
-      <p:transition spd="med" p14:dur="700">
-        <p:fade/>
-      </p:transition>
-    </mc:Choice>
-    <mc:Fallback xmlns="">
-      <p:transition spd="med">
-        <p:fade/>
-      </p:transition>
-    </mc:Fallback>
-  </mc:AlternateContent>
-</p:sld>
-</file>
-
 <file path=ppt/slides/slide14.xml><?xml version="1.0" encoding="utf-8"?>
 <p:sld xmlns:a="http://schemas.openxmlformats.org/drawingml/2006/main" xmlns:r="http://schemas.openxmlformats.org/officeDocument/2006/relationships" xmlns:p="http://schemas.openxmlformats.org/presentationml/2006/main">
   <p:cSld>
@@ -30364,7 +31017,7 @@
           <a:p>
             <a:r>
               <a:rPr lang="en-US" dirty="0"/>
-              <a:t>When should you contribute a tip?</a:t>
+              <a:t>Smoke Tests</a:t>
             </a:r>
           </a:p>
         </p:txBody>
@@ -30397,58 +31050,29 @@
           <a:p>
             <a:r>
               <a:rPr lang="en-US" sz="2800" dirty="0"/>
-              <a:t>Learned something new about PowerShell</a:t>
-            </a:r>
+              <a:t>Tests the module/app after it has been deployed to ensure it works correctly</a:t>
+            </a:r>
+          </a:p>
+          <a:p>
+            <a:endParaRPr lang="en-US" sz="2800" dirty="0"/>
           </a:p>
           <a:p>
             <a:r>
               <a:rPr lang="en-US" sz="2800" dirty="0"/>
-              <a:t>Promote your own scripts, modules, and </a:t>
-            </a:r>
-            <a:r>
-              <a:rPr lang="en-US" sz="2800" dirty="0" err="1"/>
-              <a:t>gists</a:t>
-            </a:r>
-            <a:endParaRPr lang="en-US" sz="2800" dirty="0"/>
+              <a:t>Test the real end-user experience</a:t>
+            </a:r>
           </a:p>
           <a:p>
             <a:r>
               <a:rPr lang="en-US" sz="2800" dirty="0"/>
-              <a:t>See a cool PS-related post on social media</a:t>
+              <a:t>Test backward compatibility</a:t>
             </a:r>
           </a:p>
           <a:p>
             <a:r>
               <a:rPr lang="en-US" sz="2800" dirty="0"/>
-              <a:t>Blogged about something PS-related</a:t>
-            </a:r>
-          </a:p>
-          <a:p>
-            <a:endParaRPr lang="en-US" sz="2800" dirty="0"/>
-          </a:p>
-          <a:p>
-            <a:r>
-              <a:rPr lang="en-US" sz="2800" dirty="0"/>
-              <a:t>Tip:</a:t>
-            </a:r>
-          </a:p>
-          <a:p>
-            <a:pPr lvl="1"/>
-            <a:r>
-              <a:rPr lang="en-US" sz="2600" dirty="0"/>
-              <a:t>Fork </a:t>
-            </a:r>
-            <a:r>
-              <a:rPr lang="en-US" sz="2600" dirty="0" err="1"/>
-              <a:t>tiPS</a:t>
-            </a:r>
-            <a:r>
-              <a:rPr lang="en-US" sz="2600" dirty="0"/>
-              <a:t> and leave it cloned on your machine for easy PR submissions</a:t>
-            </a:r>
-          </a:p>
-          <a:p>
-            <a:endParaRPr lang="en-US" sz="2800" dirty="0"/>
+              <a:t>Test cross-platform compatibility</a:t>
+            </a:r>
           </a:p>
         </p:txBody>
       </p:sp>
@@ -30485,7 +31109,7 @@
     </p:spTree>
     <p:extLst>
       <p:ext uri="{BB962C8B-B14F-4D97-AF65-F5344CB8AC3E}">
-        <p14:creationId xmlns:p14="http://schemas.microsoft.com/office/powerpoint/2010/main" val="852257853"/>
+        <p14:creationId xmlns:p14="http://schemas.microsoft.com/office/powerpoint/2010/main" val="3371413876"/>
       </p:ext>
     </p:extLst>
   </p:cSld>
@@ -30508,6 +31132,185 @@
 </file>
 
 <file path=ppt/slides/slide15.xml><?xml version="1.0" encoding="utf-8"?>
+<p:sld xmlns:a="http://schemas.openxmlformats.org/drawingml/2006/main" xmlns:r="http://schemas.openxmlformats.org/officeDocument/2006/relationships" xmlns:p="http://schemas.openxmlformats.org/presentationml/2006/main">
+  <p:cSld>
+    <p:spTree>
+      <p:nvGrpSpPr>
+        <p:cNvPr id="1" name=""/>
+        <p:cNvGrpSpPr/>
+        <p:nvPr/>
+      </p:nvGrpSpPr>
+      <p:grpSpPr>
+        <a:xfrm>
+          <a:off x="0" y="0"/>
+          <a:ext cx="0" cy="0"/>
+          <a:chOff x="0" y="0"/>
+          <a:chExt cx="0" cy="0"/>
+        </a:xfrm>
+      </p:grpSpPr>
+      <p:sp>
+        <p:nvSpPr>
+          <p:cNvPr id="7" name="Title 6">
+            <a:extLst>
+              <a:ext uri="{FF2B5EF4-FFF2-40B4-BE49-F238E27FC236}">
+                <a16:creationId xmlns:a16="http://schemas.microsoft.com/office/drawing/2014/main" id="{7875C19A-1AAE-476A-A316-A2CF92D763D3}"/>
+              </a:ext>
+            </a:extLst>
+          </p:cNvPr>
+          <p:cNvSpPr>
+            <a:spLocks noGrp="1"/>
+          </p:cNvSpPr>
+          <p:nvPr>
+            <p:ph type="title"/>
+          </p:nvPr>
+        </p:nvSpPr>
+        <p:spPr/>
+        <p:txBody>
+          <a:bodyPr/>
+          <a:lstStyle/>
+          <a:p>
+            <a:r>
+              <a:rPr lang="en-US" dirty="0"/>
+              <a:t>Questions and Discussion</a:t>
+            </a:r>
+          </a:p>
+        </p:txBody>
+      </p:sp>
+      <p:sp>
+        <p:nvSpPr>
+          <p:cNvPr id="10" name="Text Placeholder 9">
+            <a:extLst>
+              <a:ext uri="{FF2B5EF4-FFF2-40B4-BE49-F238E27FC236}">
+                <a16:creationId xmlns:a16="http://schemas.microsoft.com/office/drawing/2014/main" id="{EF2BC084-E6DB-4DE7-B309-042A85EBA700}"/>
+              </a:ext>
+            </a:extLst>
+          </p:cNvPr>
+          <p:cNvSpPr>
+            <a:spLocks noGrp="1"/>
+          </p:cNvSpPr>
+          <p:nvPr>
+            <p:ph type="body" sz="quarter" idx="13"/>
+          </p:nvPr>
+        </p:nvSpPr>
+        <p:spPr>
+          <a:xfrm>
+            <a:off x="444499" y="1625385"/>
+            <a:ext cx="11467867" cy="4390951"/>
+          </a:xfrm>
+        </p:spPr>
+        <p:txBody>
+          <a:bodyPr/>
+          <a:lstStyle/>
+          <a:p>
+            <a:r>
+              <a:rPr lang="en-US" sz="2800" dirty="0"/>
+              <a:t>Anything you want to know more about?</a:t>
+            </a:r>
+          </a:p>
+          <a:p>
+            <a:r>
+              <a:rPr lang="en-US" sz="2800" dirty="0"/>
+              <a:t>What was your favourite thing you learned or saw?</a:t>
+            </a:r>
+          </a:p>
+          <a:p>
+            <a:endParaRPr lang="en-US" sz="2800" dirty="0"/>
+          </a:p>
+          <a:p>
+            <a:pPr marL="0" indent="0">
+              <a:buNone/>
+            </a:pPr>
+            <a:endParaRPr lang="en-US" sz="2800" dirty="0"/>
+          </a:p>
+          <a:p>
+            <a:endParaRPr lang="en-US" sz="2800" dirty="0"/>
+          </a:p>
+          <a:p>
+            <a:r>
+              <a:rPr lang="en-US" sz="2800" dirty="0"/>
+              <a:t>Shout out to the Profiler module for finding perf issues:</a:t>
+            </a:r>
+            <a:r>
+              <a:rPr lang="en-US" sz="2800" dirty="0">
+                <a:solidFill>
+                  <a:schemeClr val="accent1">
+                    <a:lumMod val="60000"/>
+                    <a:lumOff val="40000"/>
+                  </a:schemeClr>
+                </a:solidFill>
+                <a:hlinkClick r:id="rId3">
+                  <a:extLst>
+                    <a:ext uri="{A12FA001-AC4F-418D-AE19-62706E023703}">
+                      <ahyp:hlinkClr xmlns:ahyp="http://schemas.microsoft.com/office/drawing/2018/hyperlinkcolor" val="tx"/>
+                    </a:ext>
+                  </a:extLst>
+                </a:hlinkClick>
+              </a:rPr>
+              <a:t> https://blog.danskingdom.com/Easily-profile-your-PowerShell-code-with-the-Profiler-module/</a:t>
+            </a:r>
+            <a:r>
+              <a:rPr lang="en-US" sz="2800" dirty="0"/>
+              <a:t> </a:t>
+            </a:r>
+          </a:p>
+        </p:txBody>
+      </p:sp>
+      <p:sp>
+        <p:nvSpPr>
+          <p:cNvPr id="2" name="Slide Number Placeholder 1">
+            <a:extLst>
+              <a:ext uri="{FF2B5EF4-FFF2-40B4-BE49-F238E27FC236}">
+                <a16:creationId xmlns:a16="http://schemas.microsoft.com/office/drawing/2014/main" id="{BE9800F6-D571-48C4-8466-12AA1ADB6599}"/>
+              </a:ext>
+            </a:extLst>
+          </p:cNvPr>
+          <p:cNvSpPr>
+            <a:spLocks noGrp="1"/>
+          </p:cNvSpPr>
+          <p:nvPr>
+            <p:ph type="sldNum" sz="quarter" idx="12"/>
+          </p:nvPr>
+        </p:nvSpPr>
+        <p:spPr/>
+        <p:txBody>
+          <a:bodyPr/>
+          <a:lstStyle/>
+          <a:p>
+            <a:fld id="{C263D6C4-4840-40CC-AC84-17E24B3B7BDE}" type="slidenum">
+              <a:rPr lang="en-US" smtClean="0"/>
+              <a:pPr/>
+              <a:t>15</a:t>
+            </a:fld>
+            <a:endParaRPr lang="en-US" dirty="0"/>
+          </a:p>
+        </p:txBody>
+      </p:sp>
+    </p:spTree>
+    <p:extLst>
+      <p:ext uri="{BB962C8B-B14F-4D97-AF65-F5344CB8AC3E}">
+        <p14:creationId xmlns:p14="http://schemas.microsoft.com/office/powerpoint/2010/main" val="3946810922"/>
+      </p:ext>
+    </p:extLst>
+  </p:cSld>
+  <p:clrMapOvr>
+    <a:masterClrMapping/>
+  </p:clrMapOvr>
+  <mc:AlternateContent xmlns:mc="http://schemas.openxmlformats.org/markup-compatibility/2006" xmlns:p14="http://schemas.microsoft.com/office/powerpoint/2010/main">
+    <mc:Choice Requires="p14">
+      <p:transition spd="med" p14:dur="700">
+        <p:fade/>
+      </p:transition>
+    </mc:Choice>
+    <mc:Fallback xmlns="">
+      <p:transition spd="med">
+        <p:fade/>
+      </p:transition>
+    </mc:Fallback>
+  </mc:AlternateContent>
+</p:sld>
+</file>
+
+<file path=ppt/slides/slide16.xml><?xml version="1.0" encoding="utf-8"?>
 <p:sld xmlns:a="http://schemas.openxmlformats.org/drawingml/2006/main" xmlns:r="http://schemas.openxmlformats.org/officeDocument/2006/relationships" xmlns:p="http://schemas.openxmlformats.org/presentationml/2006/main">
   <p:cSld>
     <p:spTree>
@@ -30622,7 +31425,7 @@
                   </a:schemeClr>
                 </a:solidFill>
                 <a:latin typeface="+mn-lt"/>
-                <a:hlinkClick r:id="rId2">
+                <a:hlinkClick r:id="rId3">
                   <a:extLst>
                     <a:ext uri="{A12FA001-AC4F-418D-AE19-62706E023703}">
                       <ahyp:hlinkClr xmlns:ahyp="http://schemas.microsoft.com/office/drawing/2018/hyperlinkcolor" val="tx"/>
@@ -30709,7 +31512,7 @@
                   </a:schemeClr>
                 </a:solidFill>
                 <a:latin typeface="+mn-lt"/>
-                <a:hlinkClick r:id="rId3">
+                <a:hlinkClick r:id="rId4">
                   <a:extLst>
                     <a:ext uri="{A12FA001-AC4F-418D-AE19-62706E023703}">
                       <ahyp:hlinkClr xmlns:ahyp="http://schemas.microsoft.com/office/drawing/2018/hyperlinkcolor" val="tx"/>
@@ -30796,7 +31599,7 @@
                   </a:schemeClr>
                 </a:solidFill>
                 <a:latin typeface="+mn-lt"/>
-                <a:hlinkClick r:id="rId4">
+                <a:hlinkClick r:id="rId5">
                   <a:extLst>
                     <a:ext uri="{A12FA001-AC4F-418D-AE19-62706E023703}">
                       <ahyp:hlinkClr xmlns:ahyp="http://schemas.microsoft.com/office/drawing/2018/hyperlinkcolor" val="tx"/>
@@ -30883,7 +31686,7 @@
                   </a:schemeClr>
                 </a:solidFill>
                 <a:latin typeface="+mn-lt"/>
-                <a:hlinkClick r:id="rId5">
+                <a:hlinkClick r:id="rId6">
                   <a:extLst>
                     <a:ext uri="{A12FA001-AC4F-418D-AE19-62706E023703}">
                       <ahyp:hlinkClr xmlns:ahyp="http://schemas.microsoft.com/office/drawing/2018/hyperlinkcolor" val="tx"/>
@@ -30921,139 +31724,6 @@
   <p:transition spd="slow">
     <p:wipe/>
   </p:transition>
-</p:sld>
-</file>
-
-<file path=ppt/slides/slide16.xml><?xml version="1.0" encoding="utf-8"?>
-<p:sld xmlns:a="http://schemas.openxmlformats.org/drawingml/2006/main" xmlns:r="http://schemas.openxmlformats.org/officeDocument/2006/relationships" xmlns:p="http://schemas.openxmlformats.org/presentationml/2006/main">
-  <p:cSld>
-    <p:spTree>
-      <p:nvGrpSpPr>
-        <p:cNvPr id="1" name=""/>
-        <p:cNvGrpSpPr/>
-        <p:nvPr/>
-      </p:nvGrpSpPr>
-      <p:grpSpPr>
-        <a:xfrm>
-          <a:off x="0" y="0"/>
-          <a:ext cx="0" cy="0"/>
-          <a:chOff x="0" y="0"/>
-          <a:chExt cx="0" cy="0"/>
-        </a:xfrm>
-      </p:grpSpPr>
-      <p:sp>
-        <p:nvSpPr>
-          <p:cNvPr id="7" name="Title 6">
-            <a:extLst>
-              <a:ext uri="{FF2B5EF4-FFF2-40B4-BE49-F238E27FC236}">
-                <a16:creationId xmlns:a16="http://schemas.microsoft.com/office/drawing/2014/main" id="{7875C19A-1AAE-476A-A316-A2CF92D763D3}"/>
-              </a:ext>
-            </a:extLst>
-          </p:cNvPr>
-          <p:cNvSpPr>
-            <a:spLocks noGrp="1"/>
-          </p:cNvSpPr>
-          <p:nvPr>
-            <p:ph type="title"/>
-          </p:nvPr>
-        </p:nvSpPr>
-        <p:spPr/>
-        <p:txBody>
-          <a:bodyPr/>
-          <a:lstStyle/>
-          <a:p>
-            <a:r>
-              <a:rPr lang="en-US" dirty="0"/>
-              <a:t>Content Title</a:t>
-            </a:r>
-          </a:p>
-        </p:txBody>
-      </p:sp>
-      <p:sp>
-        <p:nvSpPr>
-          <p:cNvPr id="10" name="Text Placeholder 9">
-            <a:extLst>
-              <a:ext uri="{FF2B5EF4-FFF2-40B4-BE49-F238E27FC236}">
-                <a16:creationId xmlns:a16="http://schemas.microsoft.com/office/drawing/2014/main" id="{EF2BC084-E6DB-4DE7-B309-042A85EBA700}"/>
-              </a:ext>
-            </a:extLst>
-          </p:cNvPr>
-          <p:cNvSpPr>
-            <a:spLocks noGrp="1"/>
-          </p:cNvSpPr>
-          <p:nvPr>
-            <p:ph type="body" sz="quarter" idx="13"/>
-          </p:nvPr>
-        </p:nvSpPr>
-        <p:spPr>
-          <a:xfrm>
-            <a:off x="444500" y="1625385"/>
-            <a:ext cx="11214100" cy="4390951"/>
-          </a:xfrm>
-        </p:spPr>
-        <p:txBody>
-          <a:bodyPr/>
-          <a:lstStyle/>
-          <a:p>
-            <a:r>
-              <a:rPr lang="en-US" sz="2800" dirty="0"/>
-              <a:t>Lorem</a:t>
-            </a:r>
-          </a:p>
-        </p:txBody>
-      </p:sp>
-      <p:sp>
-        <p:nvSpPr>
-          <p:cNvPr id="2" name="Slide Number Placeholder 1">
-            <a:extLst>
-              <a:ext uri="{FF2B5EF4-FFF2-40B4-BE49-F238E27FC236}">
-                <a16:creationId xmlns:a16="http://schemas.microsoft.com/office/drawing/2014/main" id="{BE9800F6-D571-48C4-8466-12AA1ADB6599}"/>
-              </a:ext>
-            </a:extLst>
-          </p:cNvPr>
-          <p:cNvSpPr>
-            <a:spLocks noGrp="1"/>
-          </p:cNvSpPr>
-          <p:nvPr>
-            <p:ph type="sldNum" sz="quarter" idx="12"/>
-          </p:nvPr>
-        </p:nvSpPr>
-        <p:spPr/>
-        <p:txBody>
-          <a:bodyPr/>
-          <a:lstStyle/>
-          <a:p>
-            <a:fld id="{C263D6C4-4840-40CC-AC84-17E24B3B7BDE}" type="slidenum">
-              <a:rPr lang="en-US" smtClean="0"/>
-              <a:pPr/>
-              <a:t>16</a:t>
-            </a:fld>
-            <a:endParaRPr lang="en-US" dirty="0"/>
-          </a:p>
-        </p:txBody>
-      </p:sp>
-    </p:spTree>
-    <p:extLst>
-      <p:ext uri="{BB962C8B-B14F-4D97-AF65-F5344CB8AC3E}">
-        <p14:creationId xmlns:p14="http://schemas.microsoft.com/office/powerpoint/2010/main" val="1161962822"/>
-      </p:ext>
-    </p:extLst>
-  </p:cSld>
-  <p:clrMapOvr>
-    <a:masterClrMapping/>
-  </p:clrMapOvr>
-  <mc:AlternateContent xmlns:mc="http://schemas.openxmlformats.org/markup-compatibility/2006" xmlns:p14="http://schemas.microsoft.com/office/powerpoint/2010/main">
-    <mc:Choice Requires="p14">
-      <p:transition spd="med" p14:dur="700">
-        <p:fade/>
-      </p:transition>
-    </mc:Choice>
-    <mc:Fallback xmlns="">
-      <p:transition spd="med">
-        <p:fade/>
-      </p:transition>
-    </mc:Fallback>
-  </mc:AlternateContent>
 </p:sld>
 </file>
 
@@ -31168,7 +31838,7 @@
     </p:spTree>
     <p:extLst>
       <p:ext uri="{BB962C8B-B14F-4D97-AF65-F5344CB8AC3E}">
-        <p14:creationId xmlns:p14="http://schemas.microsoft.com/office/powerpoint/2010/main" val="2688477632"/>
+        <p14:creationId xmlns:p14="http://schemas.microsoft.com/office/powerpoint/2010/main" val="1161962822"/>
       </p:ext>
     </p:extLst>
   </p:cSld>
@@ -31301,7 +31971,7 @@
     </p:spTree>
     <p:extLst>
       <p:ext uri="{BB962C8B-B14F-4D97-AF65-F5344CB8AC3E}">
-        <p14:creationId xmlns:p14="http://schemas.microsoft.com/office/powerpoint/2010/main" val="761298797"/>
+        <p14:creationId xmlns:p14="http://schemas.microsoft.com/office/powerpoint/2010/main" val="2688477632"/>
       </p:ext>
     </p:extLst>
   </p:cSld>
@@ -31342,10 +32012,10 @@
       </p:grpSpPr>
       <p:sp>
         <p:nvSpPr>
-          <p:cNvPr id="4" name="Title 3">
+          <p:cNvPr id="7" name="Title 6">
             <a:extLst>
               <a:ext uri="{FF2B5EF4-FFF2-40B4-BE49-F238E27FC236}">
-                <a16:creationId xmlns:a16="http://schemas.microsoft.com/office/drawing/2014/main" id="{E3BD8413-C238-49D7-A4E1-E8FEF1811A0E}"/>
+                <a16:creationId xmlns:a16="http://schemas.microsoft.com/office/drawing/2014/main" id="{7875C19A-1AAE-476A-A316-A2CF92D763D3}"/>
               </a:ext>
             </a:extLst>
           </p:cNvPr>
@@ -31363,17 +32033,17 @@
           <a:p>
             <a:r>
               <a:rPr lang="en-US" dirty="0"/>
-              <a:t>Section Header01</a:t>
+              <a:t>Content Title</a:t>
             </a:r>
           </a:p>
         </p:txBody>
       </p:sp>
       <p:sp>
         <p:nvSpPr>
-          <p:cNvPr id="5" name="Text Placeholder 4">
+          <p:cNvPr id="10" name="Text Placeholder 9">
             <a:extLst>
               <a:ext uri="{FF2B5EF4-FFF2-40B4-BE49-F238E27FC236}">
-                <a16:creationId xmlns:a16="http://schemas.microsoft.com/office/drawing/2014/main" id="{0A95F4DE-39B7-4CE2-BC1E-8B8AE662A895}"/>
+                <a16:creationId xmlns:a16="http://schemas.microsoft.com/office/drawing/2014/main" id="{EF2BC084-E6DB-4DE7-B309-042A85EBA700}"/>
               </a:ext>
             </a:extLst>
           </p:cNvPr>
@@ -31381,17 +32051,22 @@
             <a:spLocks noGrp="1"/>
           </p:cNvSpPr>
           <p:nvPr>
-            <p:ph type="body" idx="1"/>
+            <p:ph type="body" sz="quarter" idx="13"/>
           </p:nvPr>
         </p:nvSpPr>
-        <p:spPr/>
+        <p:spPr>
+          <a:xfrm>
+            <a:off x="444500" y="1625385"/>
+            <a:ext cx="11214100" cy="4390951"/>
+          </a:xfrm>
+        </p:spPr>
         <p:txBody>
           <a:bodyPr/>
           <a:lstStyle/>
           <a:p>
             <a:r>
-              <a:rPr lang="en-US" dirty="0"/>
-              <a:t>Subtitle</a:t>
+              <a:rPr lang="en-US" sz="2800" dirty="0"/>
+              <a:t>Lorem</a:t>
             </a:r>
           </a:p>
         </p:txBody>
@@ -31401,7 +32076,7 @@
           <p:cNvPr id="2" name="Slide Number Placeholder 1">
             <a:extLst>
               <a:ext uri="{FF2B5EF4-FFF2-40B4-BE49-F238E27FC236}">
-                <a16:creationId xmlns:a16="http://schemas.microsoft.com/office/drawing/2014/main" id="{0B24BF10-2B55-43AB-9F77-F1A1410384A9}"/>
+                <a16:creationId xmlns:a16="http://schemas.microsoft.com/office/drawing/2014/main" id="{BE9800F6-D571-48C4-8466-12AA1ADB6599}"/>
               </a:ext>
             </a:extLst>
           </p:cNvPr>
@@ -31429,7 +32104,7 @@
     </p:spTree>
     <p:extLst>
       <p:ext uri="{BB962C8B-B14F-4D97-AF65-F5344CB8AC3E}">
-        <p14:creationId xmlns:p14="http://schemas.microsoft.com/office/powerpoint/2010/main" val="2902794312"/>
+        <p14:creationId xmlns:p14="http://schemas.microsoft.com/office/powerpoint/2010/main" val="761298797"/>
       </p:ext>
     </p:extLst>
   </p:cSld>
@@ -31659,7 +32334,7 @@
           <p:cNvPr id="4" name="Title 3">
             <a:extLst>
               <a:ext uri="{FF2B5EF4-FFF2-40B4-BE49-F238E27FC236}">
-                <a16:creationId xmlns:a16="http://schemas.microsoft.com/office/drawing/2014/main" id="{BD179B88-D43C-4A31-9A52-3498E9430782}"/>
+                <a16:creationId xmlns:a16="http://schemas.microsoft.com/office/drawing/2014/main" id="{E3BD8413-C238-49D7-A4E1-E8FEF1811A0E}"/>
               </a:ext>
             </a:extLst>
           </p:cNvPr>
@@ -31677,7 +32352,7 @@
           <a:p>
             <a:r>
               <a:rPr lang="en-US" dirty="0"/>
-              <a:t>Section Header02</a:t>
+              <a:t>Section Header01</a:t>
             </a:r>
           </a:p>
         </p:txBody>
@@ -31687,7 +32362,7 @@
           <p:cNvPr id="5" name="Text Placeholder 4">
             <a:extLst>
               <a:ext uri="{FF2B5EF4-FFF2-40B4-BE49-F238E27FC236}">
-                <a16:creationId xmlns:a16="http://schemas.microsoft.com/office/drawing/2014/main" id="{DCDDBE65-9AB1-4989-AF86-726591A6A128}"/>
+                <a16:creationId xmlns:a16="http://schemas.microsoft.com/office/drawing/2014/main" id="{0A95F4DE-39B7-4CE2-BC1E-8B8AE662A895}"/>
               </a:ext>
             </a:extLst>
           </p:cNvPr>
@@ -31715,7 +32390,7 @@
           <p:cNvPr id="2" name="Slide Number Placeholder 1">
             <a:extLst>
               <a:ext uri="{FF2B5EF4-FFF2-40B4-BE49-F238E27FC236}">
-                <a16:creationId xmlns:a16="http://schemas.microsoft.com/office/drawing/2014/main" id="{8B065C75-272B-4BB5-BA23-D80E8654D621}"/>
+                <a16:creationId xmlns:a16="http://schemas.microsoft.com/office/drawing/2014/main" id="{0B24BF10-2B55-43AB-9F77-F1A1410384A9}"/>
               </a:ext>
             </a:extLst>
           </p:cNvPr>
@@ -31743,7 +32418,7 @@
     </p:spTree>
     <p:extLst>
       <p:ext uri="{BB962C8B-B14F-4D97-AF65-F5344CB8AC3E}">
-        <p14:creationId xmlns:p14="http://schemas.microsoft.com/office/powerpoint/2010/main" val="709828751"/>
+        <p14:creationId xmlns:p14="http://schemas.microsoft.com/office/powerpoint/2010/main" val="2902794312"/>
       </p:ext>
     </p:extLst>
   </p:cSld>
@@ -31784,10 +32459,10 @@
       </p:grpSpPr>
       <p:sp>
         <p:nvSpPr>
-          <p:cNvPr id="7" name="Title 6">
+          <p:cNvPr id="4" name="Title 3">
             <a:extLst>
               <a:ext uri="{FF2B5EF4-FFF2-40B4-BE49-F238E27FC236}">
-                <a16:creationId xmlns:a16="http://schemas.microsoft.com/office/drawing/2014/main" id="{7875C19A-1AAE-476A-A316-A2CF92D763D3}"/>
+                <a16:creationId xmlns:a16="http://schemas.microsoft.com/office/drawing/2014/main" id="{BD179B88-D43C-4A31-9A52-3498E9430782}"/>
               </a:ext>
             </a:extLst>
           </p:cNvPr>
@@ -31805,17 +32480,17 @@
           <a:p>
             <a:r>
               <a:rPr lang="en-US" dirty="0"/>
-              <a:t>Content Title 01</a:t>
+              <a:t>Section Header02</a:t>
             </a:r>
           </a:p>
         </p:txBody>
       </p:sp>
       <p:sp>
         <p:nvSpPr>
-          <p:cNvPr id="10" name="Text Placeholder 9">
+          <p:cNvPr id="5" name="Text Placeholder 4">
             <a:extLst>
               <a:ext uri="{FF2B5EF4-FFF2-40B4-BE49-F238E27FC236}">
-                <a16:creationId xmlns:a16="http://schemas.microsoft.com/office/drawing/2014/main" id="{EF2BC084-E6DB-4DE7-B309-042A85EBA700}"/>
+                <a16:creationId xmlns:a16="http://schemas.microsoft.com/office/drawing/2014/main" id="{DCDDBE65-9AB1-4989-AF86-726591A6A128}"/>
               </a:ext>
             </a:extLst>
           </p:cNvPr>
@@ -31823,7 +32498,7 @@
             <a:spLocks noGrp="1"/>
           </p:cNvSpPr>
           <p:nvPr>
-            <p:ph type="body" sz="quarter" idx="13"/>
+            <p:ph type="body" idx="1"/>
           </p:nvPr>
         </p:nvSpPr>
         <p:spPr/>
@@ -31833,19 +32508,7 @@
           <a:p>
             <a:r>
               <a:rPr lang="en-US" dirty="0"/>
-              <a:t>Lorem ipsum dolor sit amet, consectetuer adipiscing elit. Maecenas porttitor congue massa. Fusce posuere, magna sed pulvinar ultricies, purus lectus malesuada libero, sit amet commodo magna eros quis urna.</a:t>
-            </a:r>
-          </a:p>
-          <a:p>
-            <a:r>
-              <a:rPr lang="en-US" dirty="0"/>
-              <a:t>Nunc viverra imperdiet enim. Fusce est. Vivamus a tellus.</a:t>
-            </a:r>
-          </a:p>
-          <a:p>
-            <a:r>
-              <a:rPr lang="en-US" dirty="0"/>
-              <a:t>Pellentesque habitant morbi tristique senectus et netus et malesuada fames ac turpis egestas. Proin pharetra nonummy pede. Mauris et orci.</a:t>
+              <a:t>Subtitle</a:t>
             </a:r>
           </a:p>
         </p:txBody>
@@ -31855,7 +32518,7 @@
           <p:cNvPr id="2" name="Slide Number Placeholder 1">
             <a:extLst>
               <a:ext uri="{FF2B5EF4-FFF2-40B4-BE49-F238E27FC236}">
-                <a16:creationId xmlns:a16="http://schemas.microsoft.com/office/drawing/2014/main" id="{BE9800F6-D571-48C4-8466-12AA1ADB6599}"/>
+                <a16:creationId xmlns:a16="http://schemas.microsoft.com/office/drawing/2014/main" id="{8B065C75-272B-4BB5-BA23-D80E8654D621}"/>
               </a:ext>
             </a:extLst>
           </p:cNvPr>
@@ -31883,7 +32546,7 @@
     </p:spTree>
     <p:extLst>
       <p:ext uri="{BB962C8B-B14F-4D97-AF65-F5344CB8AC3E}">
-        <p14:creationId xmlns:p14="http://schemas.microsoft.com/office/powerpoint/2010/main" val="1788966512"/>
+        <p14:creationId xmlns:p14="http://schemas.microsoft.com/office/powerpoint/2010/main" val="709828751"/>
       </p:ext>
     </p:extLst>
   </p:cSld>
@@ -31924,6 +32587,146 @@
       </p:grpSpPr>
       <p:sp>
         <p:nvSpPr>
+          <p:cNvPr id="7" name="Title 6">
+            <a:extLst>
+              <a:ext uri="{FF2B5EF4-FFF2-40B4-BE49-F238E27FC236}">
+                <a16:creationId xmlns:a16="http://schemas.microsoft.com/office/drawing/2014/main" id="{7875C19A-1AAE-476A-A316-A2CF92D763D3}"/>
+              </a:ext>
+            </a:extLst>
+          </p:cNvPr>
+          <p:cNvSpPr>
+            <a:spLocks noGrp="1"/>
+          </p:cNvSpPr>
+          <p:nvPr>
+            <p:ph type="title"/>
+          </p:nvPr>
+        </p:nvSpPr>
+        <p:spPr/>
+        <p:txBody>
+          <a:bodyPr/>
+          <a:lstStyle/>
+          <a:p>
+            <a:r>
+              <a:rPr lang="en-US" dirty="0"/>
+              <a:t>Content Title 01</a:t>
+            </a:r>
+          </a:p>
+        </p:txBody>
+      </p:sp>
+      <p:sp>
+        <p:nvSpPr>
+          <p:cNvPr id="10" name="Text Placeholder 9">
+            <a:extLst>
+              <a:ext uri="{FF2B5EF4-FFF2-40B4-BE49-F238E27FC236}">
+                <a16:creationId xmlns:a16="http://schemas.microsoft.com/office/drawing/2014/main" id="{EF2BC084-E6DB-4DE7-B309-042A85EBA700}"/>
+              </a:ext>
+            </a:extLst>
+          </p:cNvPr>
+          <p:cNvSpPr>
+            <a:spLocks noGrp="1"/>
+          </p:cNvSpPr>
+          <p:nvPr>
+            <p:ph type="body" sz="quarter" idx="13"/>
+          </p:nvPr>
+        </p:nvSpPr>
+        <p:spPr/>
+        <p:txBody>
+          <a:bodyPr/>
+          <a:lstStyle/>
+          <a:p>
+            <a:r>
+              <a:rPr lang="en-US" dirty="0"/>
+              <a:t>Lorem ipsum dolor sit amet, consectetuer adipiscing elit. Maecenas porttitor congue massa. Fusce posuere, magna sed pulvinar ultricies, purus lectus malesuada libero, sit amet commodo magna eros quis urna.</a:t>
+            </a:r>
+          </a:p>
+          <a:p>
+            <a:r>
+              <a:rPr lang="en-US" dirty="0"/>
+              <a:t>Nunc viverra imperdiet enim. Fusce est. Vivamus a tellus.</a:t>
+            </a:r>
+          </a:p>
+          <a:p>
+            <a:r>
+              <a:rPr lang="en-US" dirty="0"/>
+              <a:t>Pellentesque habitant morbi tristique senectus et netus et malesuada fames ac turpis egestas. Proin pharetra nonummy pede. Mauris et orci.</a:t>
+            </a:r>
+          </a:p>
+        </p:txBody>
+      </p:sp>
+      <p:sp>
+        <p:nvSpPr>
+          <p:cNvPr id="2" name="Slide Number Placeholder 1">
+            <a:extLst>
+              <a:ext uri="{FF2B5EF4-FFF2-40B4-BE49-F238E27FC236}">
+                <a16:creationId xmlns:a16="http://schemas.microsoft.com/office/drawing/2014/main" id="{BE9800F6-D571-48C4-8466-12AA1ADB6599}"/>
+              </a:ext>
+            </a:extLst>
+          </p:cNvPr>
+          <p:cNvSpPr>
+            <a:spLocks noGrp="1"/>
+          </p:cNvSpPr>
+          <p:nvPr>
+            <p:ph type="sldNum" sz="quarter" idx="12"/>
+          </p:nvPr>
+        </p:nvSpPr>
+        <p:spPr/>
+        <p:txBody>
+          <a:bodyPr/>
+          <a:lstStyle/>
+          <a:p>
+            <a:fld id="{C263D6C4-4840-40CC-AC84-17E24B3B7BDE}" type="slidenum">
+              <a:rPr lang="en-US" smtClean="0"/>
+              <a:pPr/>
+              <a:t>22</a:t>
+            </a:fld>
+            <a:endParaRPr lang="en-US" dirty="0"/>
+          </a:p>
+        </p:txBody>
+      </p:sp>
+    </p:spTree>
+    <p:extLst>
+      <p:ext uri="{BB962C8B-B14F-4D97-AF65-F5344CB8AC3E}">
+        <p14:creationId xmlns:p14="http://schemas.microsoft.com/office/powerpoint/2010/main" val="1788966512"/>
+      </p:ext>
+    </p:extLst>
+  </p:cSld>
+  <p:clrMapOvr>
+    <a:masterClrMapping/>
+  </p:clrMapOvr>
+  <mc:AlternateContent xmlns:mc="http://schemas.openxmlformats.org/markup-compatibility/2006" xmlns:p14="http://schemas.microsoft.com/office/powerpoint/2010/main">
+    <mc:Choice Requires="p14">
+      <p:transition spd="med" p14:dur="700">
+        <p:fade/>
+      </p:transition>
+    </mc:Choice>
+    <mc:Fallback xmlns="">
+      <p:transition spd="med">
+        <p:fade/>
+      </p:transition>
+    </mc:Fallback>
+  </mc:AlternateContent>
+</p:sld>
+</file>
+
+<file path=ppt/slides/slide23.xml><?xml version="1.0" encoding="utf-8"?>
+<p:sld xmlns:a="http://schemas.openxmlformats.org/drawingml/2006/main" xmlns:r="http://schemas.openxmlformats.org/officeDocument/2006/relationships" xmlns:p="http://schemas.openxmlformats.org/presentationml/2006/main">
+  <p:cSld>
+    <p:spTree>
+      <p:nvGrpSpPr>
+        <p:cNvPr id="1" name=""/>
+        <p:cNvGrpSpPr/>
+        <p:nvPr/>
+      </p:nvGrpSpPr>
+      <p:grpSpPr>
+        <a:xfrm>
+          <a:off x="0" y="0"/>
+          <a:ext cx="0" cy="0"/>
+          <a:chOff x="0" y="0"/>
+          <a:chExt cx="0" cy="0"/>
+        </a:xfrm>
+      </p:grpSpPr>
+      <p:sp>
+        <p:nvSpPr>
           <p:cNvPr id="4" name="Title 3">
             <a:extLst>
               <a:ext uri="{FF2B5EF4-FFF2-40B4-BE49-F238E27FC236}">
@@ -31974,7 +32777,7 @@
             <a:fld id="{C263D6C4-4840-40CC-AC84-17E24B3B7BDE}" type="slidenum">
               <a:rPr lang="en-US" smtClean="0"/>
               <a:pPr/>
-              <a:t>22</a:t>
+              <a:t>23</a:t>
             </a:fld>
             <a:endParaRPr lang="en-US" dirty="0"/>
           </a:p>
@@ -32138,7 +32941,7 @@
 </p:sld>
 </file>
 
-<file path=ppt/slides/slide23.xml><?xml version="1.0" encoding="utf-8"?>
+<file path=ppt/slides/slide24.xml><?xml version="1.0" encoding="utf-8"?>
 <p:sld xmlns:a="http://schemas.openxmlformats.org/drawingml/2006/main" xmlns:r="http://schemas.openxmlformats.org/officeDocument/2006/relationships" xmlns:p="http://schemas.openxmlformats.org/presentationml/2006/main">
   <p:cSld>
     <p:spTree>
@@ -32522,7 +33325,7 @@
             <a:fld id="{C263D6C4-4840-40CC-AC84-17E24B3B7BDE}" type="slidenum">
               <a:rPr lang="en-US" smtClean="0"/>
               <a:pPr/>
-              <a:t>23</a:t>
+              <a:t>24</a:t>
             </a:fld>
             <a:endParaRPr lang="en-US" dirty="0"/>
           </a:p>
@@ -32532,221 +33335,6 @@
     <p:extLst>
       <p:ext uri="{BB962C8B-B14F-4D97-AF65-F5344CB8AC3E}">
         <p14:creationId xmlns:p14="http://schemas.microsoft.com/office/powerpoint/2010/main" val="3892131414"/>
-      </p:ext>
-    </p:extLst>
-  </p:cSld>
-  <p:clrMapOvr>
-    <a:masterClrMapping/>
-  </p:clrMapOvr>
-  <mc:AlternateContent xmlns:mc="http://schemas.openxmlformats.org/markup-compatibility/2006" xmlns:p14="http://schemas.microsoft.com/office/powerpoint/2010/main">
-    <mc:Choice Requires="p14">
-      <p:transition spd="med" p14:dur="700">
-        <p:fade/>
-      </p:transition>
-    </mc:Choice>
-    <mc:Fallback xmlns="">
-      <p:transition spd="med">
-        <p:fade/>
-      </p:transition>
-    </mc:Fallback>
-  </mc:AlternateContent>
-</p:sld>
-</file>
-
-<file path=ppt/slides/slide24.xml><?xml version="1.0" encoding="utf-8"?>
-<p:sld xmlns:a="http://schemas.openxmlformats.org/drawingml/2006/main" xmlns:r="http://schemas.openxmlformats.org/officeDocument/2006/relationships" xmlns:p="http://schemas.openxmlformats.org/presentationml/2006/main">
-  <p:cSld>
-    <p:spTree>
-      <p:nvGrpSpPr>
-        <p:cNvPr id="1" name=""/>
-        <p:cNvGrpSpPr/>
-        <p:nvPr/>
-      </p:nvGrpSpPr>
-      <p:grpSpPr>
-        <a:xfrm>
-          <a:off x="0" y="0"/>
-          <a:ext cx="0" cy="0"/>
-          <a:chOff x="0" y="0"/>
-          <a:chExt cx="0" cy="0"/>
-        </a:xfrm>
-      </p:grpSpPr>
-      <p:sp>
-        <p:nvSpPr>
-          <p:cNvPr id="4" name="Title 3">
-            <a:extLst>
-              <a:ext uri="{FF2B5EF4-FFF2-40B4-BE49-F238E27FC236}">
-                <a16:creationId xmlns:a16="http://schemas.microsoft.com/office/drawing/2014/main" id="{315E3981-F0D7-482C-A8E0-6A57700BECA7}"/>
-              </a:ext>
-            </a:extLst>
-          </p:cNvPr>
-          <p:cNvSpPr>
-            <a:spLocks noGrp="1"/>
-          </p:cNvSpPr>
-          <p:nvPr>
-            <p:ph type="title"/>
-          </p:nvPr>
-        </p:nvSpPr>
-        <p:spPr/>
-        <p:txBody>
-          <a:bodyPr/>
-          <a:lstStyle/>
-          <a:p>
-            <a:r>
-              <a:rPr lang="en-US" dirty="0"/>
-              <a:t>Content Title 03</a:t>
-            </a:r>
-          </a:p>
-        </p:txBody>
-      </p:sp>
-      <p:pic>
-        <p:nvPicPr>
-          <p:cNvPr id="20" name="Picture Placeholder 19" descr="Triangular pattern design with dimension">
-            <a:extLst>
-              <a:ext uri="{FF2B5EF4-FFF2-40B4-BE49-F238E27FC236}">
-                <a16:creationId xmlns:a16="http://schemas.microsoft.com/office/drawing/2014/main" id="{3DCA2B8E-64D3-7645-8DEB-688ED5756F52}"/>
-              </a:ext>
-            </a:extLst>
-          </p:cNvPr>
-          <p:cNvPicPr>
-            <a:picLocks noGrp="1" noChangeAspect="1"/>
-          </p:cNvPicPr>
-          <p:nvPr>
-            <p:ph type="pic" sz="quarter" idx="19"/>
-          </p:nvPr>
-        </p:nvPicPr>
-        <p:blipFill>
-          <a:blip r:embed="rId2">
-            <a:extLst>
-              <a:ext uri="{28A0092B-C50C-407E-A947-70E740481C1C}">
-                <a14:useLocalDpi xmlns:a14="http://schemas.microsoft.com/office/drawing/2010/main" val="0"/>
-              </a:ext>
-            </a:extLst>
-          </a:blip>
-          <a:srcRect/>
-          <a:stretch>
-            <a:fillRect/>
-          </a:stretch>
-        </p:blipFill>
-        <p:spPr/>
-      </p:pic>
-      <p:sp>
-        <p:nvSpPr>
-          <p:cNvPr id="19" name="Text Placeholder 18">
-            <a:extLst>
-              <a:ext uri="{FF2B5EF4-FFF2-40B4-BE49-F238E27FC236}">
-                <a16:creationId xmlns:a16="http://schemas.microsoft.com/office/drawing/2014/main" id="{782206B1-586F-4254-9B36-D06C4E294ACF}"/>
-              </a:ext>
-            </a:extLst>
-          </p:cNvPr>
-          <p:cNvSpPr>
-            <a:spLocks noGrp="1"/>
-          </p:cNvSpPr>
-          <p:nvPr>
-            <p:ph type="body" sz="quarter" idx="18"/>
-          </p:nvPr>
-        </p:nvSpPr>
-        <p:spPr/>
-        <p:txBody>
-          <a:bodyPr/>
-          <a:lstStyle/>
-          <a:p>
-            <a:r>
-              <a:rPr lang="en-US" dirty="0"/>
-              <a:t>Caption01 appears here</a:t>
-            </a:r>
-          </a:p>
-        </p:txBody>
-      </p:sp>
-      <p:sp>
-        <p:nvSpPr>
-          <p:cNvPr id="21" name="Text Placeholder 20">
-            <a:extLst>
-              <a:ext uri="{FF2B5EF4-FFF2-40B4-BE49-F238E27FC236}">
-                <a16:creationId xmlns:a16="http://schemas.microsoft.com/office/drawing/2014/main" id="{1B8F0371-4F69-4131-91BF-9AB99E6EE89B}"/>
-              </a:ext>
-            </a:extLst>
-          </p:cNvPr>
-          <p:cNvSpPr>
-            <a:spLocks noGrp="1"/>
-          </p:cNvSpPr>
-          <p:nvPr>
-            <p:ph type="body" sz="quarter" idx="20"/>
-          </p:nvPr>
-        </p:nvSpPr>
-        <p:spPr/>
-        <p:txBody>
-          <a:bodyPr/>
-          <a:lstStyle/>
-          <a:p>
-            <a:r>
-              <a:rPr lang="en-US" dirty="0"/>
-              <a:t>Caption03 appears here</a:t>
-            </a:r>
-          </a:p>
-        </p:txBody>
-      </p:sp>
-      <p:sp>
-        <p:nvSpPr>
-          <p:cNvPr id="22" name="Text Placeholder 21">
-            <a:extLst>
-              <a:ext uri="{FF2B5EF4-FFF2-40B4-BE49-F238E27FC236}">
-                <a16:creationId xmlns:a16="http://schemas.microsoft.com/office/drawing/2014/main" id="{78CACAF1-61EA-4605-A8FE-2EEE752B49FF}"/>
-              </a:ext>
-            </a:extLst>
-          </p:cNvPr>
-          <p:cNvSpPr>
-            <a:spLocks noGrp="1"/>
-          </p:cNvSpPr>
-          <p:nvPr>
-            <p:ph type="body" sz="quarter" idx="21"/>
-          </p:nvPr>
-        </p:nvSpPr>
-        <p:spPr/>
-        <p:txBody>
-          <a:bodyPr/>
-          <a:lstStyle/>
-          <a:p>
-            <a:r>
-              <a:rPr lang="en-US" dirty="0"/>
-              <a:t>Caption04 appears here</a:t>
-            </a:r>
-          </a:p>
-        </p:txBody>
-      </p:sp>
-      <p:sp>
-        <p:nvSpPr>
-          <p:cNvPr id="2" name="Slide Number Placeholder 1">
-            <a:extLst>
-              <a:ext uri="{FF2B5EF4-FFF2-40B4-BE49-F238E27FC236}">
-                <a16:creationId xmlns:a16="http://schemas.microsoft.com/office/drawing/2014/main" id="{2F478C69-0A1D-45FF-8600-ED903803FFE1}"/>
-              </a:ext>
-            </a:extLst>
-          </p:cNvPr>
-          <p:cNvSpPr>
-            <a:spLocks noGrp="1"/>
-          </p:cNvSpPr>
-          <p:nvPr>
-            <p:ph type="sldNum" sz="quarter" idx="12"/>
-          </p:nvPr>
-        </p:nvSpPr>
-        <p:spPr/>
-        <p:txBody>
-          <a:bodyPr/>
-          <a:lstStyle/>
-          <a:p>
-            <a:fld id="{C263D6C4-4840-40CC-AC84-17E24B3B7BDE}" type="slidenum">
-              <a:rPr lang="en-US" smtClean="0"/>
-              <a:pPr/>
-              <a:t>24</a:t>
-            </a:fld>
-            <a:endParaRPr lang="en-US" dirty="0"/>
-          </a:p>
-        </p:txBody>
-      </p:sp>
-    </p:spTree>
-    <p:extLst>
-      <p:ext uri="{BB962C8B-B14F-4D97-AF65-F5344CB8AC3E}">
-        <p14:creationId xmlns:p14="http://schemas.microsoft.com/office/powerpoint/2010/main" val="451187730"/>
       </p:ext>
     </p:extLst>
   </p:cSld>
@@ -32808,6 +33396,221 @@
           <a:p>
             <a:r>
               <a:rPr lang="en-US" dirty="0"/>
+              <a:t>Content Title 03</a:t>
+            </a:r>
+          </a:p>
+        </p:txBody>
+      </p:sp>
+      <p:pic>
+        <p:nvPicPr>
+          <p:cNvPr id="20" name="Picture Placeholder 19" descr="Triangular pattern design with dimension">
+            <a:extLst>
+              <a:ext uri="{FF2B5EF4-FFF2-40B4-BE49-F238E27FC236}">
+                <a16:creationId xmlns:a16="http://schemas.microsoft.com/office/drawing/2014/main" id="{3DCA2B8E-64D3-7645-8DEB-688ED5756F52}"/>
+              </a:ext>
+            </a:extLst>
+          </p:cNvPr>
+          <p:cNvPicPr>
+            <a:picLocks noGrp="1" noChangeAspect="1"/>
+          </p:cNvPicPr>
+          <p:nvPr>
+            <p:ph type="pic" sz="quarter" idx="19"/>
+          </p:nvPr>
+        </p:nvPicPr>
+        <p:blipFill>
+          <a:blip r:embed="rId2">
+            <a:extLst>
+              <a:ext uri="{28A0092B-C50C-407E-A947-70E740481C1C}">
+                <a14:useLocalDpi xmlns:a14="http://schemas.microsoft.com/office/drawing/2010/main" val="0"/>
+              </a:ext>
+            </a:extLst>
+          </a:blip>
+          <a:srcRect/>
+          <a:stretch>
+            <a:fillRect/>
+          </a:stretch>
+        </p:blipFill>
+        <p:spPr/>
+      </p:pic>
+      <p:sp>
+        <p:nvSpPr>
+          <p:cNvPr id="19" name="Text Placeholder 18">
+            <a:extLst>
+              <a:ext uri="{FF2B5EF4-FFF2-40B4-BE49-F238E27FC236}">
+                <a16:creationId xmlns:a16="http://schemas.microsoft.com/office/drawing/2014/main" id="{782206B1-586F-4254-9B36-D06C4E294ACF}"/>
+              </a:ext>
+            </a:extLst>
+          </p:cNvPr>
+          <p:cNvSpPr>
+            <a:spLocks noGrp="1"/>
+          </p:cNvSpPr>
+          <p:nvPr>
+            <p:ph type="body" sz="quarter" idx="18"/>
+          </p:nvPr>
+        </p:nvSpPr>
+        <p:spPr/>
+        <p:txBody>
+          <a:bodyPr/>
+          <a:lstStyle/>
+          <a:p>
+            <a:r>
+              <a:rPr lang="en-US" dirty="0"/>
+              <a:t>Caption01 appears here</a:t>
+            </a:r>
+          </a:p>
+        </p:txBody>
+      </p:sp>
+      <p:sp>
+        <p:nvSpPr>
+          <p:cNvPr id="21" name="Text Placeholder 20">
+            <a:extLst>
+              <a:ext uri="{FF2B5EF4-FFF2-40B4-BE49-F238E27FC236}">
+                <a16:creationId xmlns:a16="http://schemas.microsoft.com/office/drawing/2014/main" id="{1B8F0371-4F69-4131-91BF-9AB99E6EE89B}"/>
+              </a:ext>
+            </a:extLst>
+          </p:cNvPr>
+          <p:cNvSpPr>
+            <a:spLocks noGrp="1"/>
+          </p:cNvSpPr>
+          <p:nvPr>
+            <p:ph type="body" sz="quarter" idx="20"/>
+          </p:nvPr>
+        </p:nvSpPr>
+        <p:spPr/>
+        <p:txBody>
+          <a:bodyPr/>
+          <a:lstStyle/>
+          <a:p>
+            <a:r>
+              <a:rPr lang="en-US" dirty="0"/>
+              <a:t>Caption03 appears here</a:t>
+            </a:r>
+          </a:p>
+        </p:txBody>
+      </p:sp>
+      <p:sp>
+        <p:nvSpPr>
+          <p:cNvPr id="22" name="Text Placeholder 21">
+            <a:extLst>
+              <a:ext uri="{FF2B5EF4-FFF2-40B4-BE49-F238E27FC236}">
+                <a16:creationId xmlns:a16="http://schemas.microsoft.com/office/drawing/2014/main" id="{78CACAF1-61EA-4605-A8FE-2EEE752B49FF}"/>
+              </a:ext>
+            </a:extLst>
+          </p:cNvPr>
+          <p:cNvSpPr>
+            <a:spLocks noGrp="1"/>
+          </p:cNvSpPr>
+          <p:nvPr>
+            <p:ph type="body" sz="quarter" idx="21"/>
+          </p:nvPr>
+        </p:nvSpPr>
+        <p:spPr/>
+        <p:txBody>
+          <a:bodyPr/>
+          <a:lstStyle/>
+          <a:p>
+            <a:r>
+              <a:rPr lang="en-US" dirty="0"/>
+              <a:t>Caption04 appears here</a:t>
+            </a:r>
+          </a:p>
+        </p:txBody>
+      </p:sp>
+      <p:sp>
+        <p:nvSpPr>
+          <p:cNvPr id="2" name="Slide Number Placeholder 1">
+            <a:extLst>
+              <a:ext uri="{FF2B5EF4-FFF2-40B4-BE49-F238E27FC236}">
+                <a16:creationId xmlns:a16="http://schemas.microsoft.com/office/drawing/2014/main" id="{2F478C69-0A1D-45FF-8600-ED903803FFE1}"/>
+              </a:ext>
+            </a:extLst>
+          </p:cNvPr>
+          <p:cNvSpPr>
+            <a:spLocks noGrp="1"/>
+          </p:cNvSpPr>
+          <p:nvPr>
+            <p:ph type="sldNum" sz="quarter" idx="12"/>
+          </p:nvPr>
+        </p:nvSpPr>
+        <p:spPr/>
+        <p:txBody>
+          <a:bodyPr/>
+          <a:lstStyle/>
+          <a:p>
+            <a:fld id="{C263D6C4-4840-40CC-AC84-17E24B3B7BDE}" type="slidenum">
+              <a:rPr lang="en-US" smtClean="0"/>
+              <a:pPr/>
+              <a:t>25</a:t>
+            </a:fld>
+            <a:endParaRPr lang="en-US" dirty="0"/>
+          </a:p>
+        </p:txBody>
+      </p:sp>
+    </p:spTree>
+    <p:extLst>
+      <p:ext uri="{BB962C8B-B14F-4D97-AF65-F5344CB8AC3E}">
+        <p14:creationId xmlns:p14="http://schemas.microsoft.com/office/powerpoint/2010/main" val="451187730"/>
+      </p:ext>
+    </p:extLst>
+  </p:cSld>
+  <p:clrMapOvr>
+    <a:masterClrMapping/>
+  </p:clrMapOvr>
+  <mc:AlternateContent xmlns:mc="http://schemas.openxmlformats.org/markup-compatibility/2006" xmlns:p14="http://schemas.microsoft.com/office/powerpoint/2010/main">
+    <mc:Choice Requires="p14">
+      <p:transition spd="med" p14:dur="700">
+        <p:fade/>
+      </p:transition>
+    </mc:Choice>
+    <mc:Fallback xmlns="">
+      <p:transition spd="med">
+        <p:fade/>
+      </p:transition>
+    </mc:Fallback>
+  </mc:AlternateContent>
+</p:sld>
+</file>
+
+<file path=ppt/slides/slide26.xml><?xml version="1.0" encoding="utf-8"?>
+<p:sld xmlns:a="http://schemas.openxmlformats.org/drawingml/2006/main" xmlns:r="http://schemas.openxmlformats.org/officeDocument/2006/relationships" xmlns:p="http://schemas.openxmlformats.org/presentationml/2006/main">
+  <p:cSld>
+    <p:spTree>
+      <p:nvGrpSpPr>
+        <p:cNvPr id="1" name=""/>
+        <p:cNvGrpSpPr/>
+        <p:nvPr/>
+      </p:nvGrpSpPr>
+      <p:grpSpPr>
+        <a:xfrm>
+          <a:off x="0" y="0"/>
+          <a:ext cx="0" cy="0"/>
+          <a:chOff x="0" y="0"/>
+          <a:chExt cx="0" cy="0"/>
+        </a:xfrm>
+      </p:grpSpPr>
+      <p:sp>
+        <p:nvSpPr>
+          <p:cNvPr id="4" name="Title 3">
+            <a:extLst>
+              <a:ext uri="{FF2B5EF4-FFF2-40B4-BE49-F238E27FC236}">
+                <a16:creationId xmlns:a16="http://schemas.microsoft.com/office/drawing/2014/main" id="{315E3981-F0D7-482C-A8E0-6A57700BECA7}"/>
+              </a:ext>
+            </a:extLst>
+          </p:cNvPr>
+          <p:cNvSpPr>
+            <a:spLocks noGrp="1"/>
+          </p:cNvSpPr>
+          <p:nvPr>
+            <p:ph type="title"/>
+          </p:nvPr>
+        </p:nvSpPr>
+        <p:spPr/>
+        <p:txBody>
+          <a:bodyPr/>
+          <a:lstStyle/>
+          <a:p>
+            <a:r>
+              <a:rPr lang="en-US" dirty="0"/>
               <a:t>Content Title 04</a:t>
             </a:r>
           </a:p>
@@ -32905,7 +33708,7 @@
             <a:fld id="{C263D6C4-4840-40CC-AC84-17E24B3B7BDE}" type="slidenum">
               <a:rPr lang="en-US" smtClean="0"/>
               <a:pPr/>
-              <a:t>25</a:t>
+              <a:t>26</a:t>
             </a:fld>
             <a:endParaRPr lang="en-US" dirty="0"/>
           </a:p>
@@ -32936,7 +33739,7 @@
 </p:sld>
 </file>
 
-<file path=ppt/slides/slide26.xml><?xml version="1.0" encoding="utf-8"?>
+<file path=ppt/slides/slide27.xml><?xml version="1.0" encoding="utf-8"?>
 <p:sld xmlns:a="http://schemas.openxmlformats.org/drawingml/2006/main" xmlns:r="http://schemas.openxmlformats.org/officeDocument/2006/relationships" xmlns:p="http://schemas.openxmlformats.org/presentationml/2006/main">
   <p:cSld>
     <p:spTree>
@@ -34826,7 +35629,7 @@
             <a:fld id="{C263D6C4-4840-40CC-AC84-17E24B3B7BDE}" type="slidenum">
               <a:rPr lang="en-US" smtClean="0"/>
               <a:pPr/>
-              <a:t>26</a:t>
+              <a:t>27</a:t>
             </a:fld>
             <a:endParaRPr lang="en-US" dirty="0"/>
           </a:p>
@@ -34857,7 +35660,7 @@
 </p:sld>
 </file>
 
-<file path=ppt/slides/slide27.xml><?xml version="1.0" encoding="utf-8"?>
+<file path=ppt/slides/slide28.xml><?xml version="1.0" encoding="utf-8"?>
 <p:sld xmlns:a="http://schemas.openxmlformats.org/drawingml/2006/main" xmlns:r="http://schemas.openxmlformats.org/officeDocument/2006/relationships" xmlns:p="http://schemas.openxmlformats.org/presentationml/2006/main">
   <p:cSld>
     <p:spTree>
@@ -34954,7 +35757,7 @@
             <a:fld id="{C263D6C4-4840-40CC-AC84-17E24B3B7BDE}" type="slidenum">
               <a:rPr lang="en-US" smtClean="0"/>
               <a:pPr/>
-              <a:t>27</a:t>
+              <a:t>28</a:t>
             </a:fld>
             <a:endParaRPr lang="en-US" dirty="0"/>
           </a:p>
@@ -34985,7 +35788,7 @@
 </p:sld>
 </file>
 
-<file path=ppt/slides/slide28.xml><?xml version="1.0" encoding="utf-8"?>
+<file path=ppt/slides/slide29.xml><?xml version="1.0" encoding="utf-8"?>
 <p:sld xmlns:a="http://schemas.openxmlformats.org/drawingml/2006/main" xmlns:r="http://schemas.openxmlformats.org/officeDocument/2006/relationships" xmlns:p="http://schemas.openxmlformats.org/presentationml/2006/main">
   <p:cSld>
     <p:spTree>
@@ -35074,7 +35877,7 @@
             <a:fld id="{C263D6C4-4840-40CC-AC84-17E24B3B7BDE}" type="slidenum">
               <a:rPr lang="en-US" smtClean="0"/>
               <a:pPr/>
-              <a:t>28</a:t>
+              <a:t>29</a:t>
             </a:fld>
             <a:endParaRPr lang="en-US" dirty="0"/>
           </a:p>
@@ -35102,68 +35905,6 @@
       </p:transition>
     </mc:Fallback>
   </mc:AlternateContent>
-</p:sld>
-</file>
-
-<file path=ppt/slides/slide29.xml><?xml version="1.0" encoding="utf-8"?>
-<p:sld xmlns:a="http://schemas.openxmlformats.org/drawingml/2006/main" xmlns:r="http://schemas.openxmlformats.org/officeDocument/2006/relationships" xmlns:p="http://schemas.openxmlformats.org/presentationml/2006/main">
-  <p:cSld>
-    <p:spTree>
-      <p:nvGrpSpPr>
-        <p:cNvPr id="1" name=""/>
-        <p:cNvGrpSpPr/>
-        <p:nvPr/>
-      </p:nvGrpSpPr>
-      <p:grpSpPr>
-        <a:xfrm>
-          <a:off x="0" y="0"/>
-          <a:ext cx="0" cy="0"/>
-          <a:chOff x="0" y="0"/>
-          <a:chExt cx="0" cy="0"/>
-        </a:xfrm>
-      </p:grpSpPr>
-      <p:sp>
-        <p:nvSpPr>
-          <p:cNvPr id="2" name="Title 1">
-            <a:extLst>
-              <a:ext uri="{FF2B5EF4-FFF2-40B4-BE49-F238E27FC236}">
-                <a16:creationId xmlns:a16="http://schemas.microsoft.com/office/drawing/2014/main" id="{632BE5BF-9922-45FB-8F3F-4446D40A051B}"/>
-              </a:ext>
-            </a:extLst>
-          </p:cNvPr>
-          <p:cNvSpPr>
-            <a:spLocks noGrp="1"/>
-          </p:cNvSpPr>
-          <p:nvPr>
-            <p:ph type="ctrTitle"/>
-          </p:nvPr>
-        </p:nvSpPr>
-        <p:spPr/>
-        <p:txBody>
-          <a:bodyPr/>
-          <a:lstStyle/>
-          <a:p>
-            <a:r>
-              <a:rPr lang="en-US" dirty="0"/>
-              <a:t>Thank You 1</a:t>
-            </a:r>
-            <a:endParaRPr lang="en-GB" dirty="0"/>
-          </a:p>
-        </p:txBody>
-      </p:sp>
-    </p:spTree>
-    <p:extLst>
-      <p:ext uri="{BB962C8B-B14F-4D97-AF65-F5344CB8AC3E}">
-        <p14:creationId xmlns:p14="http://schemas.microsoft.com/office/powerpoint/2010/main" val="429771863"/>
-      </p:ext>
-    </p:extLst>
-  </p:cSld>
-  <p:clrMapOvr>
-    <a:masterClrMapping/>
-  </p:clrMapOvr>
-  <p:transition spd="slow">
-    <p:wipe/>
-  </p:transition>
 </p:sld>
 </file>
 
@@ -35391,6 +36132,68 @@
           <a:p>
             <a:r>
               <a:rPr lang="en-US" dirty="0"/>
+              <a:t>Thank You 1</a:t>
+            </a:r>
+            <a:endParaRPr lang="en-GB" dirty="0"/>
+          </a:p>
+        </p:txBody>
+      </p:sp>
+    </p:spTree>
+    <p:extLst>
+      <p:ext uri="{BB962C8B-B14F-4D97-AF65-F5344CB8AC3E}">
+        <p14:creationId xmlns:p14="http://schemas.microsoft.com/office/powerpoint/2010/main" val="429771863"/>
+      </p:ext>
+    </p:extLst>
+  </p:cSld>
+  <p:clrMapOvr>
+    <a:masterClrMapping/>
+  </p:clrMapOvr>
+  <p:transition spd="slow">
+    <p:wipe/>
+  </p:transition>
+</p:sld>
+</file>
+
+<file path=ppt/slides/slide31.xml><?xml version="1.0" encoding="utf-8"?>
+<p:sld xmlns:a="http://schemas.openxmlformats.org/drawingml/2006/main" xmlns:r="http://schemas.openxmlformats.org/officeDocument/2006/relationships" xmlns:p="http://schemas.openxmlformats.org/presentationml/2006/main">
+  <p:cSld>
+    <p:spTree>
+      <p:nvGrpSpPr>
+        <p:cNvPr id="1" name=""/>
+        <p:cNvGrpSpPr/>
+        <p:nvPr/>
+      </p:nvGrpSpPr>
+      <p:grpSpPr>
+        <a:xfrm>
+          <a:off x="0" y="0"/>
+          <a:ext cx="0" cy="0"/>
+          <a:chOff x="0" y="0"/>
+          <a:chExt cx="0" cy="0"/>
+        </a:xfrm>
+      </p:grpSpPr>
+      <p:sp>
+        <p:nvSpPr>
+          <p:cNvPr id="2" name="Title 1">
+            <a:extLst>
+              <a:ext uri="{FF2B5EF4-FFF2-40B4-BE49-F238E27FC236}">
+                <a16:creationId xmlns:a16="http://schemas.microsoft.com/office/drawing/2014/main" id="{632BE5BF-9922-45FB-8F3F-4446D40A051B}"/>
+              </a:ext>
+            </a:extLst>
+          </p:cNvPr>
+          <p:cNvSpPr>
+            <a:spLocks noGrp="1"/>
+          </p:cNvSpPr>
+          <p:nvPr>
+            <p:ph type="ctrTitle"/>
+          </p:nvPr>
+        </p:nvSpPr>
+        <p:spPr/>
+        <p:txBody>
+          <a:bodyPr/>
+          <a:lstStyle/>
+          <a:p>
+            <a:r>
+              <a:rPr lang="en-US" dirty="0"/>
               <a:t>Thank You 2</a:t>
             </a:r>
             <a:endParaRPr lang="en-GB" dirty="0"/>
@@ -35413,7 +36216,7 @@
 </p:sld>
 </file>
 
-<file path=ppt/slides/slide31.xml><?xml version="1.0" encoding="utf-8"?>
+<file path=ppt/slides/slide32.xml><?xml version="1.0" encoding="utf-8"?>
 <p:sld xmlns:a="http://schemas.openxmlformats.org/drawingml/2006/main" xmlns:r="http://schemas.openxmlformats.org/officeDocument/2006/relationships" xmlns:p="http://schemas.openxmlformats.org/presentationml/2006/main">
   <p:cSld>
     <p:spTree>
@@ -35482,7 +36285,7 @@
             <a:fld id="{C263D6C4-4840-40CC-AC84-17E24B3B7BDE}" type="slidenum">
               <a:rPr lang="en-US" smtClean="0"/>
               <a:pPr/>
-              <a:t>31</a:t>
+              <a:t>32</a:t>
             </a:fld>
             <a:endParaRPr lang="en-US" dirty="0"/>
           </a:p>
@@ -37055,6 +37858,189 @@
           <a:lstStyle/>
           <a:p>
             <a:r>
+              <a:rPr lang="en-US" dirty="0"/>
+              <a:t>When should you contribute a tip?</a:t>
+            </a:r>
+          </a:p>
+        </p:txBody>
+      </p:sp>
+      <p:sp>
+        <p:nvSpPr>
+          <p:cNvPr id="10" name="Text Placeholder 9">
+            <a:extLst>
+              <a:ext uri="{FF2B5EF4-FFF2-40B4-BE49-F238E27FC236}">
+                <a16:creationId xmlns:a16="http://schemas.microsoft.com/office/drawing/2014/main" id="{EF2BC084-E6DB-4DE7-B309-042A85EBA700}"/>
+              </a:ext>
+            </a:extLst>
+          </p:cNvPr>
+          <p:cNvSpPr>
+            <a:spLocks noGrp="1"/>
+          </p:cNvSpPr>
+          <p:nvPr>
+            <p:ph type="body" sz="quarter" idx="13"/>
+          </p:nvPr>
+        </p:nvSpPr>
+        <p:spPr>
+          <a:xfrm>
+            <a:off x="444499" y="1625385"/>
+            <a:ext cx="11467867" cy="4390951"/>
+          </a:xfrm>
+        </p:spPr>
+        <p:txBody>
+          <a:bodyPr/>
+          <a:lstStyle/>
+          <a:p>
+            <a:r>
+              <a:rPr lang="en-US" sz="2800" dirty="0"/>
+              <a:t>Learned something new about PowerShell</a:t>
+            </a:r>
+          </a:p>
+          <a:p>
+            <a:r>
+              <a:rPr lang="en-US" sz="2800" dirty="0"/>
+              <a:t>Promote your own scripts, modules, and </a:t>
+            </a:r>
+            <a:r>
+              <a:rPr lang="en-US" sz="2800" dirty="0" err="1"/>
+              <a:t>gists</a:t>
+            </a:r>
+            <a:endParaRPr lang="en-US" sz="2800" dirty="0"/>
+          </a:p>
+          <a:p>
+            <a:r>
+              <a:rPr lang="en-US" sz="2800" dirty="0"/>
+              <a:t>See a cool PowerShell-related post on social media</a:t>
+            </a:r>
+          </a:p>
+          <a:p>
+            <a:r>
+              <a:rPr lang="en-US" sz="2800" dirty="0"/>
+              <a:t>Blogged about something PowerShell related</a:t>
+            </a:r>
+          </a:p>
+          <a:p>
+            <a:endParaRPr lang="en-US" sz="2800" dirty="0"/>
+          </a:p>
+          <a:p>
+            <a:r>
+              <a:rPr lang="en-US" sz="2800" dirty="0"/>
+              <a:t>Tip:</a:t>
+            </a:r>
+          </a:p>
+          <a:p>
+            <a:pPr lvl="1"/>
+            <a:r>
+              <a:rPr lang="en-US" sz="2600" dirty="0"/>
+              <a:t>Fork </a:t>
+            </a:r>
+            <a:r>
+              <a:rPr lang="en-US" sz="2600" dirty="0" err="1"/>
+              <a:t>tiPS</a:t>
+            </a:r>
+            <a:r>
+              <a:rPr lang="en-US" sz="2600" dirty="0"/>
+              <a:t> and leave it cloned on your machine for easy PR submissions</a:t>
+            </a:r>
+          </a:p>
+          <a:p>
+            <a:endParaRPr lang="en-US" sz="2800" dirty="0"/>
+          </a:p>
+        </p:txBody>
+      </p:sp>
+      <p:sp>
+        <p:nvSpPr>
+          <p:cNvPr id="2" name="Slide Number Placeholder 1">
+            <a:extLst>
+              <a:ext uri="{FF2B5EF4-FFF2-40B4-BE49-F238E27FC236}">
+                <a16:creationId xmlns:a16="http://schemas.microsoft.com/office/drawing/2014/main" id="{BE9800F6-D571-48C4-8466-12AA1ADB6599}"/>
+              </a:ext>
+            </a:extLst>
+          </p:cNvPr>
+          <p:cNvSpPr>
+            <a:spLocks noGrp="1"/>
+          </p:cNvSpPr>
+          <p:nvPr>
+            <p:ph type="sldNum" sz="quarter" idx="12"/>
+          </p:nvPr>
+        </p:nvSpPr>
+        <p:spPr/>
+        <p:txBody>
+          <a:bodyPr/>
+          <a:lstStyle/>
+          <a:p>
+            <a:fld id="{C263D6C4-4840-40CC-AC84-17E24B3B7BDE}" type="slidenum">
+              <a:rPr lang="en-US" smtClean="0"/>
+              <a:pPr/>
+              <a:t>8</a:t>
+            </a:fld>
+            <a:endParaRPr lang="en-US" dirty="0"/>
+          </a:p>
+        </p:txBody>
+      </p:sp>
+    </p:spTree>
+    <p:extLst>
+      <p:ext uri="{BB962C8B-B14F-4D97-AF65-F5344CB8AC3E}">
+        <p14:creationId xmlns:p14="http://schemas.microsoft.com/office/powerpoint/2010/main" val="3336940135"/>
+      </p:ext>
+    </p:extLst>
+  </p:cSld>
+  <p:clrMapOvr>
+    <a:masterClrMapping/>
+  </p:clrMapOvr>
+  <mc:AlternateContent xmlns:mc="http://schemas.openxmlformats.org/markup-compatibility/2006" xmlns:p14="http://schemas.microsoft.com/office/powerpoint/2010/main">
+    <mc:Choice Requires="p14">
+      <p:transition spd="med" p14:dur="700">
+        <p:fade/>
+      </p:transition>
+    </mc:Choice>
+    <mc:Fallback xmlns="">
+      <p:transition spd="med">
+        <p:fade/>
+      </p:transition>
+    </mc:Fallback>
+  </mc:AlternateContent>
+</p:sld>
+</file>
+
+<file path=ppt/slides/slide9.xml><?xml version="1.0" encoding="utf-8"?>
+<p:sld xmlns:a="http://schemas.openxmlformats.org/drawingml/2006/main" xmlns:r="http://schemas.openxmlformats.org/officeDocument/2006/relationships" xmlns:p="http://schemas.openxmlformats.org/presentationml/2006/main">
+  <p:cSld>
+    <p:spTree>
+      <p:nvGrpSpPr>
+        <p:cNvPr id="1" name=""/>
+        <p:cNvGrpSpPr/>
+        <p:nvPr/>
+      </p:nvGrpSpPr>
+      <p:grpSpPr>
+        <a:xfrm>
+          <a:off x="0" y="0"/>
+          <a:ext cx="0" cy="0"/>
+          <a:chOff x="0" y="0"/>
+          <a:chExt cx="0" cy="0"/>
+        </a:xfrm>
+      </p:grpSpPr>
+      <p:sp>
+        <p:nvSpPr>
+          <p:cNvPr id="7" name="Title 6">
+            <a:extLst>
+              <a:ext uri="{FF2B5EF4-FFF2-40B4-BE49-F238E27FC236}">
+                <a16:creationId xmlns:a16="http://schemas.microsoft.com/office/drawing/2014/main" id="{7875C19A-1AAE-476A-A316-A2CF92D763D3}"/>
+              </a:ext>
+            </a:extLst>
+          </p:cNvPr>
+          <p:cNvSpPr>
+            <a:spLocks noGrp="1"/>
+          </p:cNvSpPr>
+          <p:nvPr>
+            <p:ph type="title"/>
+          </p:nvPr>
+        </p:nvSpPr>
+        <p:spPr/>
+        <p:txBody>
+          <a:bodyPr/>
+          <a:lstStyle/>
+          <a:p>
+            <a:r>
               <a:rPr lang="en-US" dirty="0" err="1"/>
               <a:t>tiPS</a:t>
             </a:r>
@@ -37140,7 +38126,7 @@
             <a:fld id="{C263D6C4-4840-40CC-AC84-17E24B3B7BDE}" type="slidenum">
               <a:rPr lang="en-US" smtClean="0"/>
               <a:pPr/>
-              <a:t>8</a:t>
+              <a:t>9</a:t>
             </a:fld>
             <a:endParaRPr lang="en-US" dirty="0"/>
           </a:p>
@@ -37533,482 +38519,6 @@
                                           <p:spTgt spid="10">
                                             <p:txEl>
                                               <p:pRg st="1" end="1"/>
-                                            </p:txEl>
-                                          </p:spTgt>
-                                        </p:tgtEl>
-                                      </p:cBhvr>
-                                    </p:animEffect>
-                                  </p:childTnLst>
-                                </p:cTn>
-                              </p:par>
-                            </p:childTnLst>
-                          </p:cTn>
-                        </p:par>
-                      </p:childTnLst>
-                    </p:cTn>
-                  </p:par>
-                </p:childTnLst>
-              </p:cTn>
-              <p:prevCondLst>
-                <p:cond evt="onPrev" delay="0">
-                  <p:tgtEl>
-                    <p:sldTgt/>
-                  </p:tgtEl>
-                </p:cond>
-              </p:prevCondLst>
-              <p:nextCondLst>
-                <p:cond evt="onNext" delay="0">
-                  <p:tgtEl>
-                    <p:sldTgt/>
-                  </p:tgtEl>
-                </p:cond>
-              </p:nextCondLst>
-            </p:seq>
-          </p:childTnLst>
-        </p:cTn>
-      </p:par>
-    </p:tnLst>
-    <p:bldLst>
-      <p:bldP spid="10" grpId="0" uiExpand="1" build="p"/>
-    </p:bldLst>
-  </p:timing>
-</p:sld>
-</file>
-
-<file path=ppt/slides/slide9.xml><?xml version="1.0" encoding="utf-8"?>
-<p:sld xmlns:a="http://schemas.openxmlformats.org/drawingml/2006/main" xmlns:r="http://schemas.openxmlformats.org/officeDocument/2006/relationships" xmlns:p="http://schemas.openxmlformats.org/presentationml/2006/main">
-  <p:cSld>
-    <p:spTree>
-      <p:nvGrpSpPr>
-        <p:cNvPr id="1" name=""/>
-        <p:cNvGrpSpPr/>
-        <p:nvPr/>
-      </p:nvGrpSpPr>
-      <p:grpSpPr>
-        <a:xfrm>
-          <a:off x="0" y="0"/>
-          <a:ext cx="0" cy="0"/>
-          <a:chOff x="0" y="0"/>
-          <a:chExt cx="0" cy="0"/>
-        </a:xfrm>
-      </p:grpSpPr>
-      <p:sp>
-        <p:nvSpPr>
-          <p:cNvPr id="7" name="Title 6">
-            <a:extLst>
-              <a:ext uri="{FF2B5EF4-FFF2-40B4-BE49-F238E27FC236}">
-                <a16:creationId xmlns:a16="http://schemas.microsoft.com/office/drawing/2014/main" id="{7875C19A-1AAE-476A-A316-A2CF92D763D3}"/>
-              </a:ext>
-            </a:extLst>
-          </p:cNvPr>
-          <p:cNvSpPr>
-            <a:spLocks noGrp="1"/>
-          </p:cNvSpPr>
-          <p:nvPr>
-            <p:ph type="title"/>
-          </p:nvPr>
-        </p:nvSpPr>
-        <p:spPr/>
-        <p:txBody>
-          <a:bodyPr/>
-          <a:lstStyle/>
-          <a:p>
-            <a:r>
-              <a:rPr lang="en-US" dirty="0" err="1"/>
-              <a:t>tiPS</a:t>
-            </a:r>
-            <a:r>
-              <a:rPr lang="en-US" dirty="0"/>
-              <a:t> Decisions</a:t>
-            </a:r>
-          </a:p>
-        </p:txBody>
-      </p:sp>
-      <p:sp>
-        <p:nvSpPr>
-          <p:cNvPr id="10" name="Text Placeholder 9">
-            <a:extLst>
-              <a:ext uri="{FF2B5EF4-FFF2-40B4-BE49-F238E27FC236}">
-                <a16:creationId xmlns:a16="http://schemas.microsoft.com/office/drawing/2014/main" id="{EF2BC084-E6DB-4DE7-B309-042A85EBA700}"/>
-              </a:ext>
-            </a:extLst>
-          </p:cNvPr>
-          <p:cNvSpPr>
-            <a:spLocks noGrp="1"/>
-          </p:cNvSpPr>
-          <p:nvPr>
-            <p:ph type="body" sz="quarter" idx="13"/>
-          </p:nvPr>
-        </p:nvSpPr>
-        <p:spPr>
-          <a:xfrm>
-            <a:off x="444499" y="1625385"/>
-            <a:ext cx="11467867" cy="4390951"/>
-          </a:xfrm>
-        </p:spPr>
-        <p:txBody>
-          <a:bodyPr/>
-          <a:lstStyle/>
-          <a:p>
-            <a:r>
-              <a:rPr lang="en-US" sz="2800" dirty="0"/>
-              <a:t>Architecture Decision Records (ADRs)</a:t>
-            </a:r>
-          </a:p>
-          <a:p>
-            <a:endParaRPr lang="en-US" sz="2800" dirty="0"/>
-          </a:p>
-          <a:p>
-            <a:r>
-              <a:rPr lang="en-US" sz="2800" dirty="0"/>
-              <a:t>Written in PowerShell instead of C# for community support</a:t>
-            </a:r>
-          </a:p>
-          <a:p>
-            <a:r>
-              <a:rPr lang="en-US" sz="2800" dirty="0"/>
-              <a:t>Combine files into a single .psm1 file during build for performance</a:t>
-            </a:r>
-          </a:p>
-          <a:p>
-            <a:r>
-              <a:rPr lang="en-US" sz="2800" dirty="0"/>
-              <a:t>Compile classes to C# assembly for performance</a:t>
-            </a:r>
-          </a:p>
-          <a:p>
-            <a:endParaRPr lang="en-US" sz="2800" dirty="0"/>
-          </a:p>
-          <a:p>
-            <a:r>
-              <a:rPr lang="en-US" sz="2800" dirty="0">
-                <a:solidFill>
-                  <a:schemeClr val="accent1">
-                    <a:lumMod val="60000"/>
-                    <a:lumOff val="40000"/>
-                  </a:schemeClr>
-                </a:solidFill>
-                <a:hlinkClick r:id="rId3">
-                  <a:extLst>
-                    <a:ext uri="{A12FA001-AC4F-418D-AE19-62706E023703}">
-                      <ahyp:hlinkClr xmlns:ahyp="http://schemas.microsoft.com/office/drawing/2018/hyperlinkcolor" val="tx"/>
-                    </a:ext>
-                  </a:extLst>
-                </a:hlinkClick>
-              </a:rPr>
-              <a:t>https://github.com/deadlydog/PowerShell.Experiment.ClassPerformanceComparison</a:t>
-            </a:r>
-            <a:r>
-              <a:rPr lang="en-US" sz="2800" dirty="0">
-                <a:solidFill>
-                  <a:schemeClr val="accent1">
-                    <a:lumMod val="60000"/>
-                    <a:lumOff val="40000"/>
-                  </a:schemeClr>
-                </a:solidFill>
-              </a:rPr>
-              <a:t> </a:t>
-            </a:r>
-          </a:p>
-        </p:txBody>
-      </p:sp>
-      <p:sp>
-        <p:nvSpPr>
-          <p:cNvPr id="2" name="Slide Number Placeholder 1">
-            <a:extLst>
-              <a:ext uri="{FF2B5EF4-FFF2-40B4-BE49-F238E27FC236}">
-                <a16:creationId xmlns:a16="http://schemas.microsoft.com/office/drawing/2014/main" id="{BE9800F6-D571-48C4-8466-12AA1ADB6599}"/>
-              </a:ext>
-            </a:extLst>
-          </p:cNvPr>
-          <p:cNvSpPr>
-            <a:spLocks noGrp="1"/>
-          </p:cNvSpPr>
-          <p:nvPr>
-            <p:ph type="sldNum" sz="quarter" idx="12"/>
-          </p:nvPr>
-        </p:nvSpPr>
-        <p:spPr/>
-        <p:txBody>
-          <a:bodyPr/>
-          <a:lstStyle/>
-          <a:p>
-            <a:fld id="{C263D6C4-4840-40CC-AC84-17E24B3B7BDE}" type="slidenum">
-              <a:rPr lang="en-US" smtClean="0"/>
-              <a:pPr/>
-              <a:t>9</a:t>
-            </a:fld>
-            <a:endParaRPr lang="en-US" dirty="0"/>
-          </a:p>
-        </p:txBody>
-      </p:sp>
-    </p:spTree>
-    <p:extLst>
-      <p:ext uri="{BB962C8B-B14F-4D97-AF65-F5344CB8AC3E}">
-        <p14:creationId xmlns:p14="http://schemas.microsoft.com/office/powerpoint/2010/main" val="430754784"/>
-      </p:ext>
-    </p:extLst>
-  </p:cSld>
-  <p:clrMapOvr>
-    <a:masterClrMapping/>
-  </p:clrMapOvr>
-  <mc:AlternateContent xmlns:mc="http://schemas.openxmlformats.org/markup-compatibility/2006" xmlns:p14="http://schemas.microsoft.com/office/powerpoint/2010/main">
-    <mc:Choice Requires="p14">
-      <p:transition spd="med" p14:dur="700">
-        <p:fade/>
-      </p:transition>
-    </mc:Choice>
-    <mc:Fallback xmlns="">
-      <p:transition spd="med">
-        <p:fade/>
-      </p:transition>
-    </mc:Fallback>
-  </mc:AlternateContent>
-  <p:timing>
-    <p:tnLst>
-      <p:par>
-        <p:cTn id="1" dur="indefinite" restart="never" nodeType="tmRoot">
-          <p:childTnLst>
-            <p:seq concurrent="1" nextAc="seek">
-              <p:cTn id="2" dur="indefinite" nodeType="mainSeq">
-                <p:childTnLst>
-                  <p:par>
-                    <p:cTn id="3" fill="hold">
-                      <p:stCondLst>
-                        <p:cond delay="indefinite"/>
-                      </p:stCondLst>
-                      <p:childTnLst>
-                        <p:par>
-                          <p:cTn id="4" fill="hold">
-                            <p:stCondLst>
-                              <p:cond delay="0"/>
-                            </p:stCondLst>
-                            <p:childTnLst>
-                              <p:par>
-                                <p:cTn id="5" presetID="10" presetClass="entr" presetSubtype="0" fill="hold" grpId="0" nodeType="clickEffect">
-                                  <p:stCondLst>
-                                    <p:cond delay="0"/>
-                                  </p:stCondLst>
-                                  <p:childTnLst>
-                                    <p:set>
-                                      <p:cBhvr>
-                                        <p:cTn id="6" dur="1" fill="hold">
-                                          <p:stCondLst>
-                                            <p:cond delay="0"/>
-                                          </p:stCondLst>
-                                        </p:cTn>
-                                        <p:tgtEl>
-                                          <p:spTgt spid="10">
-                                            <p:txEl>
-                                              <p:pRg st="0" end="0"/>
-                                            </p:txEl>
-                                          </p:spTgt>
-                                        </p:tgtEl>
-                                        <p:attrNameLst>
-                                          <p:attrName>style.visibility</p:attrName>
-                                        </p:attrNameLst>
-                                      </p:cBhvr>
-                                      <p:to>
-                                        <p:strVal val="visible"/>
-                                      </p:to>
-                                    </p:set>
-                                    <p:animEffect transition="in" filter="fade">
-                                      <p:cBhvr>
-                                        <p:cTn id="7" dur="500"/>
-                                        <p:tgtEl>
-                                          <p:spTgt spid="10">
-                                            <p:txEl>
-                                              <p:pRg st="0" end="0"/>
-                                            </p:txEl>
-                                          </p:spTgt>
-                                        </p:tgtEl>
-                                      </p:cBhvr>
-                                    </p:animEffect>
-                                  </p:childTnLst>
-                                </p:cTn>
-                              </p:par>
-                            </p:childTnLst>
-                          </p:cTn>
-                        </p:par>
-                      </p:childTnLst>
-                    </p:cTn>
-                  </p:par>
-                  <p:par>
-                    <p:cTn id="8" fill="hold">
-                      <p:stCondLst>
-                        <p:cond delay="indefinite"/>
-                      </p:stCondLst>
-                      <p:childTnLst>
-                        <p:par>
-                          <p:cTn id="9" fill="hold">
-                            <p:stCondLst>
-                              <p:cond delay="0"/>
-                            </p:stCondLst>
-                            <p:childTnLst>
-                              <p:par>
-                                <p:cTn id="10" presetID="10" presetClass="entr" presetSubtype="0" fill="hold" grpId="0" nodeType="clickEffect">
-                                  <p:stCondLst>
-                                    <p:cond delay="0"/>
-                                  </p:stCondLst>
-                                  <p:childTnLst>
-                                    <p:set>
-                                      <p:cBhvr>
-                                        <p:cTn id="11" dur="1" fill="hold">
-                                          <p:stCondLst>
-                                            <p:cond delay="0"/>
-                                          </p:stCondLst>
-                                        </p:cTn>
-                                        <p:tgtEl>
-                                          <p:spTgt spid="10">
-                                            <p:txEl>
-                                              <p:pRg st="2" end="2"/>
-                                            </p:txEl>
-                                          </p:spTgt>
-                                        </p:tgtEl>
-                                        <p:attrNameLst>
-                                          <p:attrName>style.visibility</p:attrName>
-                                        </p:attrNameLst>
-                                      </p:cBhvr>
-                                      <p:to>
-                                        <p:strVal val="visible"/>
-                                      </p:to>
-                                    </p:set>
-                                    <p:animEffect transition="in" filter="fade">
-                                      <p:cBhvr>
-                                        <p:cTn id="12" dur="500"/>
-                                        <p:tgtEl>
-                                          <p:spTgt spid="10">
-                                            <p:txEl>
-                                              <p:pRg st="2" end="2"/>
-                                            </p:txEl>
-                                          </p:spTgt>
-                                        </p:tgtEl>
-                                      </p:cBhvr>
-                                    </p:animEffect>
-                                  </p:childTnLst>
-                                </p:cTn>
-                              </p:par>
-                              <p:par>
-                                <p:cTn id="13" presetID="10" presetClass="entr" presetSubtype="0" fill="hold" grpId="0" nodeType="withEffect">
-                                  <p:stCondLst>
-                                    <p:cond delay="0"/>
-                                  </p:stCondLst>
-                                  <p:childTnLst>
-                                    <p:set>
-                                      <p:cBhvr>
-                                        <p:cTn id="14" dur="1" fill="hold">
-                                          <p:stCondLst>
-                                            <p:cond delay="0"/>
-                                          </p:stCondLst>
-                                        </p:cTn>
-                                        <p:tgtEl>
-                                          <p:spTgt spid="10">
-                                            <p:txEl>
-                                              <p:pRg st="3" end="3"/>
-                                            </p:txEl>
-                                          </p:spTgt>
-                                        </p:tgtEl>
-                                        <p:attrNameLst>
-                                          <p:attrName>style.visibility</p:attrName>
-                                        </p:attrNameLst>
-                                      </p:cBhvr>
-                                      <p:to>
-                                        <p:strVal val="visible"/>
-                                      </p:to>
-                                    </p:set>
-                                    <p:animEffect transition="in" filter="fade">
-                                      <p:cBhvr>
-                                        <p:cTn id="15" dur="500"/>
-                                        <p:tgtEl>
-                                          <p:spTgt spid="10">
-                                            <p:txEl>
-                                              <p:pRg st="3" end="3"/>
-                                            </p:txEl>
-                                          </p:spTgt>
-                                        </p:tgtEl>
-                                      </p:cBhvr>
-                                    </p:animEffect>
-                                  </p:childTnLst>
-                                </p:cTn>
-                              </p:par>
-                              <p:par>
-                                <p:cTn id="16" presetID="10" presetClass="entr" presetSubtype="0" fill="hold" grpId="0" nodeType="withEffect">
-                                  <p:stCondLst>
-                                    <p:cond delay="0"/>
-                                  </p:stCondLst>
-                                  <p:childTnLst>
-                                    <p:set>
-                                      <p:cBhvr>
-                                        <p:cTn id="17" dur="1" fill="hold">
-                                          <p:stCondLst>
-                                            <p:cond delay="0"/>
-                                          </p:stCondLst>
-                                        </p:cTn>
-                                        <p:tgtEl>
-                                          <p:spTgt spid="10">
-                                            <p:txEl>
-                                              <p:pRg st="4" end="4"/>
-                                            </p:txEl>
-                                          </p:spTgt>
-                                        </p:tgtEl>
-                                        <p:attrNameLst>
-                                          <p:attrName>style.visibility</p:attrName>
-                                        </p:attrNameLst>
-                                      </p:cBhvr>
-                                      <p:to>
-                                        <p:strVal val="visible"/>
-                                      </p:to>
-                                    </p:set>
-                                    <p:animEffect transition="in" filter="fade">
-                                      <p:cBhvr>
-                                        <p:cTn id="18" dur="500"/>
-                                        <p:tgtEl>
-                                          <p:spTgt spid="10">
-                                            <p:txEl>
-                                              <p:pRg st="4" end="4"/>
-                                            </p:txEl>
-                                          </p:spTgt>
-                                        </p:tgtEl>
-                                      </p:cBhvr>
-                                    </p:animEffect>
-                                  </p:childTnLst>
-                                </p:cTn>
-                              </p:par>
-                              <p:par>
-                                <p:cTn id="19" presetID="10" presetClass="entr" presetSubtype="0" fill="hold" grpId="0" nodeType="withEffect">
-                                  <p:stCondLst>
-                                    <p:cond delay="0"/>
-                                  </p:stCondLst>
-                                  <p:childTnLst>
-                                    <p:set>
-                                      <p:cBhvr>
-                                        <p:cTn id="20" dur="1" fill="hold">
-                                          <p:stCondLst>
-                                            <p:cond delay="0"/>
-                                          </p:stCondLst>
-                                        </p:cTn>
-                                        <p:tgtEl>
-                                          <p:spTgt spid="10">
-                                            <p:txEl>
-                                              <p:pRg st="6" end="6"/>
-                                            </p:txEl>
-                                          </p:spTgt>
-                                        </p:tgtEl>
-                                        <p:attrNameLst>
-                                          <p:attrName>style.visibility</p:attrName>
-                                        </p:attrNameLst>
-                                      </p:cBhvr>
-                                      <p:to>
-                                        <p:strVal val="visible"/>
-                                      </p:to>
-                                    </p:set>
-                                    <p:animEffect transition="in" filter="fade">
-                                      <p:cBhvr>
-                                        <p:cTn id="21" dur="500"/>
-                                        <p:tgtEl>
-                                          <p:spTgt spid="10">
-                                            <p:txEl>
-                                              <p:pRg st="6" end="6"/>
                                             </p:txEl>
                                           </p:spTgt>
                                         </p:tgtEl>

</xml_diff>

<commit_message>
Final touch on PowerPoint presentation
</commit_message>
<xml_diff>
--- a/src/tiPS Welcome.pptx
+++ b/src/tiPS Welcome.pptx
@@ -1509,6 +1509,14 @@
               <a:buFontTx/>
               <a:buChar char="-"/>
             </a:pPr>
+            <a:r>
+              <a:rPr lang="en-US" dirty="0"/>
+              <a:t>Poll: Did you </a:t>
+            </a:r>
+            <a:r>
+              <a:rPr lang="en-US"/>
+              <a:t>learn something?</a:t>
+            </a:r>
             <a:endParaRPr lang="en-US" dirty="0"/>
           </a:p>
         </p:txBody>

</xml_diff>